<commit_message>
fixed repro; it's now total hits
</commit_message>
<xml_diff>
--- a/results.pptx
+++ b/results.pptx
@@ -200,7 +200,7 @@
           <a:p>
             <a:fld id="{8B9DAE71-14C6-43BF-8377-DCBB177C1E2D}" type="datetimeFigureOut">
               <a:rPr lang="en-US" smtClean="0"/>
-              <a:t>2019/06/27</a:t>
+              <a:t>2019/07/02</a:t>
             </a:fld>
             <a:endParaRPr lang="en-US"/>
           </a:p>
@@ -935,7 +935,7 @@
           <a:p>
             <a:fld id="{7BD11EC7-BF2A-4653-B12A-BDCEC9BF7A38}" type="datetimeFigureOut">
               <a:rPr lang="en-US" smtClean="0"/>
-              <a:t>2019/06/27</a:t>
+              <a:t>2019/07/02</a:t>
             </a:fld>
             <a:endParaRPr lang="en-US"/>
           </a:p>
@@ -1105,7 +1105,7 @@
           <a:p>
             <a:fld id="{7BD11EC7-BF2A-4653-B12A-BDCEC9BF7A38}" type="datetimeFigureOut">
               <a:rPr lang="en-US" smtClean="0"/>
-              <a:t>2019/06/27</a:t>
+              <a:t>2019/07/02</a:t>
             </a:fld>
             <a:endParaRPr lang="en-US"/>
           </a:p>
@@ -1285,7 +1285,7 @@
           <a:p>
             <a:fld id="{7BD11EC7-BF2A-4653-B12A-BDCEC9BF7A38}" type="datetimeFigureOut">
               <a:rPr lang="en-US" smtClean="0"/>
-              <a:t>2019/06/27</a:t>
+              <a:t>2019/07/02</a:t>
             </a:fld>
             <a:endParaRPr lang="en-US"/>
           </a:p>
@@ -1455,7 +1455,7 @@
           <a:p>
             <a:fld id="{7BD11EC7-BF2A-4653-B12A-BDCEC9BF7A38}" type="datetimeFigureOut">
               <a:rPr lang="en-US" smtClean="0"/>
-              <a:t>2019/06/27</a:t>
+              <a:t>2019/07/02</a:t>
             </a:fld>
             <a:endParaRPr lang="en-US"/>
           </a:p>
@@ -1701,7 +1701,7 @@
           <a:p>
             <a:fld id="{7BD11EC7-BF2A-4653-B12A-BDCEC9BF7A38}" type="datetimeFigureOut">
               <a:rPr lang="en-US" smtClean="0"/>
-              <a:t>2019/06/27</a:t>
+              <a:t>2019/07/02</a:t>
             </a:fld>
             <a:endParaRPr lang="en-US"/>
           </a:p>
@@ -1933,7 +1933,7 @@
           <a:p>
             <a:fld id="{7BD11EC7-BF2A-4653-B12A-BDCEC9BF7A38}" type="datetimeFigureOut">
               <a:rPr lang="en-US" smtClean="0"/>
-              <a:t>2019/06/27</a:t>
+              <a:t>2019/07/02</a:t>
             </a:fld>
             <a:endParaRPr lang="en-US"/>
           </a:p>
@@ -2300,7 +2300,7 @@
           <a:p>
             <a:fld id="{7BD11EC7-BF2A-4653-B12A-BDCEC9BF7A38}" type="datetimeFigureOut">
               <a:rPr lang="en-US" smtClean="0"/>
-              <a:t>2019/06/27</a:t>
+              <a:t>2019/07/02</a:t>
             </a:fld>
             <a:endParaRPr lang="en-US"/>
           </a:p>
@@ -2418,7 +2418,7 @@
           <a:p>
             <a:fld id="{7BD11EC7-BF2A-4653-B12A-BDCEC9BF7A38}" type="datetimeFigureOut">
               <a:rPr lang="en-US" smtClean="0"/>
-              <a:t>2019/06/27</a:t>
+              <a:t>2019/07/02</a:t>
             </a:fld>
             <a:endParaRPr lang="en-US"/>
           </a:p>
@@ -2513,7 +2513,7 @@
           <a:p>
             <a:fld id="{7BD11EC7-BF2A-4653-B12A-BDCEC9BF7A38}" type="datetimeFigureOut">
               <a:rPr lang="en-US" smtClean="0"/>
-              <a:t>2019/06/27</a:t>
+              <a:t>2019/07/02</a:t>
             </a:fld>
             <a:endParaRPr lang="en-US"/>
           </a:p>
@@ -2790,7 +2790,7 @@
           <a:p>
             <a:fld id="{7BD11EC7-BF2A-4653-B12A-BDCEC9BF7A38}" type="datetimeFigureOut">
               <a:rPr lang="en-US" smtClean="0"/>
-              <a:t>2019/06/27</a:t>
+              <a:t>2019/07/02</a:t>
             </a:fld>
             <a:endParaRPr lang="en-US"/>
           </a:p>
@@ -3043,7 +3043,7 @@
           <a:p>
             <a:fld id="{7BD11EC7-BF2A-4653-B12A-BDCEC9BF7A38}" type="datetimeFigureOut">
               <a:rPr lang="en-US" smtClean="0"/>
-              <a:t>2019/06/27</a:t>
+              <a:t>2019/07/02</a:t>
             </a:fld>
             <a:endParaRPr lang="en-US"/>
           </a:p>
@@ -3256,7 +3256,7 @@
           <a:p>
             <a:fld id="{7BD11EC7-BF2A-4653-B12A-BDCEC9BF7A38}" type="datetimeFigureOut">
               <a:rPr lang="en-US" smtClean="0"/>
-              <a:t>2019/06/27</a:t>
+              <a:t>2019/07/02</a:t>
             </a:fld>
             <a:endParaRPr lang="en-US"/>
           </a:p>
@@ -3663,7 +3663,7 @@
       </p:grpSpPr>
       <p:pic>
         <p:nvPicPr>
-          <p:cNvPr id="4" name="Picture 3"/>
+          <p:cNvPr id="2" name="Picture 1"/>
           <p:cNvPicPr>
             <a:picLocks noChangeAspect="1"/>
           </p:cNvPicPr>
@@ -3683,8 +3683,8 @@
         </p:blipFill>
         <p:spPr>
           <a:xfrm>
-            <a:off x="-2" y="796413"/>
-            <a:ext cx="6951407" cy="5004619"/>
+            <a:off x="0" y="796412"/>
+            <a:ext cx="6882581" cy="4925961"/>
           </a:xfrm>
           <a:prstGeom prst="rect">
             <a:avLst/>
@@ -3771,7 +3771,7 @@
       </p:grpSpPr>
       <p:pic>
         <p:nvPicPr>
-          <p:cNvPr id="6" name="Picture 5"/>
+          <p:cNvPr id="8" name="Picture 7"/>
           <p:cNvPicPr>
             <a:picLocks noChangeAspect="1"/>
           </p:cNvPicPr>
@@ -3791,8 +3791,8 @@
         </p:blipFill>
         <p:spPr>
           <a:xfrm>
-            <a:off x="0" y="890407"/>
-            <a:ext cx="6794090" cy="4674651"/>
+            <a:off x="591171" y="762720"/>
+            <a:ext cx="6506483" cy="5096586"/>
           </a:xfrm>
           <a:prstGeom prst="rect">
             <a:avLst/>
@@ -3801,13 +3801,13 @@
       </p:pic>
       <p:pic>
         <p:nvPicPr>
-          <p:cNvPr id="2" name="Picture 1"/>
+          <p:cNvPr id="9" name="Picture 8"/>
           <p:cNvPicPr>
             <a:picLocks noChangeAspect="1"/>
           </p:cNvPicPr>
           <p:nvPr/>
         </p:nvPicPr>
-        <p:blipFill rotWithShape="1">
+        <p:blipFill>
           <a:blip r:embed="rId4">
             <a:extLst>
               <a:ext uri="{28A0092B-C50C-407E-A947-70E740481C1C}">
@@ -3815,13 +3815,14 @@
               </a:ext>
             </a:extLst>
           </a:blip>
-          <a:srcRect l="4564"/>
-          <a:stretch/>
+          <a:stretch>
+            <a:fillRect/>
+          </a:stretch>
         </p:blipFill>
         <p:spPr>
           <a:xfrm>
-            <a:off x="5388077" y="890407"/>
-            <a:ext cx="6931742" cy="4641882"/>
+            <a:off x="5300822" y="762720"/>
+            <a:ext cx="6506483" cy="5096586"/>
           </a:xfrm>
           <a:prstGeom prst="rect">
             <a:avLst/>
@@ -3911,7 +3912,7 @@
           <p:cNvPr id="2" name="Group 1">
             <a:extLst>
               <a:ext uri="{FF2B5EF4-FFF2-40B4-BE49-F238E27FC236}">
-                <a16:creationId xmlns:a16="http://schemas.microsoft.com/office/drawing/2014/main" xmlns="" id="{AFB5539E-9F87-4F16-BA84-99727D7DEDEC}"/>
+                <a16:creationId xmlns="" xmlns:a16="http://schemas.microsoft.com/office/drawing/2014/main" id="{AFB5539E-9F87-4F16-BA84-99727D7DEDEC}"/>
               </a:ext>
             </a:extLst>
           </p:cNvPr>
@@ -4314,7 +4315,7 @@
             <p:cNvPr id="96" name="TextBox 95">
               <a:extLst>
                 <a:ext uri="{FF2B5EF4-FFF2-40B4-BE49-F238E27FC236}">
-                  <a16:creationId xmlns:a16="http://schemas.microsoft.com/office/drawing/2014/main" xmlns="" id="{8D1A075D-964B-4005-9D84-409E89B43BA2}"/>
+                  <a16:creationId xmlns="" xmlns:a16="http://schemas.microsoft.com/office/drawing/2014/main" id="{8D1A075D-964B-4005-9D84-409E89B43BA2}"/>
                 </a:ext>
               </a:extLst>
             </p:cNvPr>
@@ -4358,7 +4359,7 @@
             <p:cNvPr id="123" name="TextBox 122">
               <a:extLst>
                 <a:ext uri="{FF2B5EF4-FFF2-40B4-BE49-F238E27FC236}">
-                  <a16:creationId xmlns:a16="http://schemas.microsoft.com/office/drawing/2014/main" xmlns="" id="{7FC13A6C-A90F-4710-A2D9-6C8D802FB483}"/>
+                  <a16:creationId xmlns="" xmlns:a16="http://schemas.microsoft.com/office/drawing/2014/main" id="{7FC13A6C-A90F-4710-A2D9-6C8D802FB483}"/>
                 </a:ext>
               </a:extLst>
             </p:cNvPr>
@@ -4402,7 +4403,7 @@
           <p:cNvPr id="25" name="Group 24">
             <a:extLst>
               <a:ext uri="{FF2B5EF4-FFF2-40B4-BE49-F238E27FC236}">
-                <a16:creationId xmlns:a16="http://schemas.microsoft.com/office/drawing/2014/main" xmlns="" id="{79BC88F8-8827-4E23-B62F-1D2FCA25A51C}"/>
+                <a16:creationId xmlns="" xmlns:a16="http://schemas.microsoft.com/office/drawing/2014/main" id="{79BC88F8-8827-4E23-B62F-1D2FCA25A51C}"/>
               </a:ext>
             </a:extLst>
           </p:cNvPr>
@@ -4422,7 +4423,7 @@
             <p:cNvPr id="30" name="Group 29">
               <a:extLst>
                 <a:ext uri="{FF2B5EF4-FFF2-40B4-BE49-F238E27FC236}">
-                  <a16:creationId xmlns:a16="http://schemas.microsoft.com/office/drawing/2014/main" xmlns="" id="{DFE08800-98D0-4D7B-9D2D-4A209B056808}"/>
+                  <a16:creationId xmlns="" xmlns:a16="http://schemas.microsoft.com/office/drawing/2014/main" id="{DFE08800-98D0-4D7B-9D2D-4A209B056808}"/>
                 </a:ext>
               </a:extLst>
             </p:cNvPr>
@@ -4442,7 +4443,7 @@
               <p:cNvPr id="32" name="Group 31">
                 <a:extLst>
                   <a:ext uri="{FF2B5EF4-FFF2-40B4-BE49-F238E27FC236}">
-                    <a16:creationId xmlns:a16="http://schemas.microsoft.com/office/drawing/2014/main" xmlns="" id="{AE71805E-9D2C-4B4A-893B-906D6EF27CB5}"/>
+                    <a16:creationId xmlns="" xmlns:a16="http://schemas.microsoft.com/office/drawing/2014/main" id="{AE71805E-9D2C-4B4A-893B-906D6EF27CB5}"/>
                   </a:ext>
                 </a:extLst>
               </p:cNvPr>
@@ -4462,7 +4463,7 @@
                 <p:cNvPr id="36" name="Oval 35">
                   <a:extLst>
                     <a:ext uri="{FF2B5EF4-FFF2-40B4-BE49-F238E27FC236}">
-                      <a16:creationId xmlns:a16="http://schemas.microsoft.com/office/drawing/2014/main" xmlns="" id="{4F8D708F-A651-4889-BE36-520D7985AA6F}"/>
+                      <a16:creationId xmlns="" xmlns:a16="http://schemas.microsoft.com/office/drawing/2014/main" id="{4F8D708F-A651-4889-BE36-520D7985AA6F}"/>
                     </a:ext>
                   </a:extLst>
                 </p:cNvPr>
@@ -4519,7 +4520,7 @@
                 <p:cNvPr id="37" name="Oval 36">
                   <a:extLst>
                     <a:ext uri="{FF2B5EF4-FFF2-40B4-BE49-F238E27FC236}">
-                      <a16:creationId xmlns:a16="http://schemas.microsoft.com/office/drawing/2014/main" xmlns="" id="{06B17F9C-980C-46E5-8382-B83E3A6D8661}"/>
+                      <a16:creationId xmlns="" xmlns:a16="http://schemas.microsoft.com/office/drawing/2014/main" id="{06B17F9C-980C-46E5-8382-B83E3A6D8661}"/>
                     </a:ext>
                   </a:extLst>
                 </p:cNvPr>
@@ -4576,7 +4577,7 @@
                 <p:cNvPr id="38" name="Oval 37">
                   <a:extLst>
                     <a:ext uri="{FF2B5EF4-FFF2-40B4-BE49-F238E27FC236}">
-                      <a16:creationId xmlns:a16="http://schemas.microsoft.com/office/drawing/2014/main" xmlns="" id="{E963169B-6C58-4DBA-BE20-C599E305B034}"/>
+                      <a16:creationId xmlns="" xmlns:a16="http://schemas.microsoft.com/office/drawing/2014/main" id="{E963169B-6C58-4DBA-BE20-C599E305B034}"/>
                     </a:ext>
                   </a:extLst>
                 </p:cNvPr>
@@ -4634,7 +4635,7 @@
                 <p:cNvPr id="39" name="Oval 38">
                   <a:extLst>
                     <a:ext uri="{FF2B5EF4-FFF2-40B4-BE49-F238E27FC236}">
-                      <a16:creationId xmlns:a16="http://schemas.microsoft.com/office/drawing/2014/main" xmlns="" id="{5A87E780-B71E-4FBF-9498-7D567A6D53A7}"/>
+                      <a16:creationId xmlns="" xmlns:a16="http://schemas.microsoft.com/office/drawing/2014/main" id="{5A87E780-B71E-4FBF-9498-7D567A6D53A7}"/>
                     </a:ext>
                   </a:extLst>
                 </p:cNvPr>
@@ -4696,7 +4697,7 @@
               <p:cNvPr id="33" name="TextBox 32">
                 <a:extLst>
                   <a:ext uri="{FF2B5EF4-FFF2-40B4-BE49-F238E27FC236}">
-                    <a16:creationId xmlns:a16="http://schemas.microsoft.com/office/drawing/2014/main" xmlns="" id="{EA708170-321E-46CF-8EA1-07CCF97AE2E1}"/>
+                    <a16:creationId xmlns="" xmlns:a16="http://schemas.microsoft.com/office/drawing/2014/main" id="{EA708170-321E-46CF-8EA1-07CCF97AE2E1}"/>
                   </a:ext>
                 </a:extLst>
               </p:cNvPr>
@@ -4740,7 +4741,7 @@
               <p:cNvPr id="34" name="TextBox 33">
                 <a:extLst>
                   <a:ext uri="{FF2B5EF4-FFF2-40B4-BE49-F238E27FC236}">
-                    <a16:creationId xmlns:a16="http://schemas.microsoft.com/office/drawing/2014/main" xmlns="" id="{6DA641AC-1D5E-4808-B466-4A26CFB88262}"/>
+                    <a16:creationId xmlns="" xmlns:a16="http://schemas.microsoft.com/office/drawing/2014/main" id="{6DA641AC-1D5E-4808-B466-4A26CFB88262}"/>
                   </a:ext>
                 </a:extLst>
               </p:cNvPr>
@@ -4784,7 +4785,7 @@
               <p:cNvPr id="35" name="TextBox 34">
                 <a:extLst>
                   <a:ext uri="{FF2B5EF4-FFF2-40B4-BE49-F238E27FC236}">
-                    <a16:creationId xmlns:a16="http://schemas.microsoft.com/office/drawing/2014/main" xmlns="" id="{EE2B61B5-7684-49C0-9906-EB0117114C82}"/>
+                    <a16:creationId xmlns="" xmlns:a16="http://schemas.microsoft.com/office/drawing/2014/main" id="{EE2B61B5-7684-49C0-9906-EB0117114C82}"/>
                   </a:ext>
                 </a:extLst>
               </p:cNvPr>
@@ -4825,7 +4826,7 @@
             <p:cNvPr id="31" name="TextBox 30">
               <a:extLst>
                 <a:ext uri="{FF2B5EF4-FFF2-40B4-BE49-F238E27FC236}">
-                  <a16:creationId xmlns:a16="http://schemas.microsoft.com/office/drawing/2014/main" xmlns="" id="{C75CBEE4-98E1-481B-A2FB-D30736FCEA45}"/>
+                  <a16:creationId xmlns="" xmlns:a16="http://schemas.microsoft.com/office/drawing/2014/main" id="{C75CBEE4-98E1-481B-A2FB-D30736FCEA45}"/>
                 </a:ext>
               </a:extLst>
             </p:cNvPr>
@@ -4870,7 +4871,7 @@
           <p:cNvPr id="40" name="Group 39">
             <a:extLst>
               <a:ext uri="{FF2B5EF4-FFF2-40B4-BE49-F238E27FC236}">
-                <a16:creationId xmlns:a16="http://schemas.microsoft.com/office/drawing/2014/main" xmlns="" id="{0C264D77-77ED-4C50-9078-D9588FCAE302}"/>
+                <a16:creationId xmlns="" xmlns:a16="http://schemas.microsoft.com/office/drawing/2014/main" id="{0C264D77-77ED-4C50-9078-D9588FCAE302}"/>
               </a:ext>
             </a:extLst>
           </p:cNvPr>
@@ -4890,7 +4891,7 @@
             <p:cNvPr id="41" name="Group 40">
               <a:extLst>
                 <a:ext uri="{FF2B5EF4-FFF2-40B4-BE49-F238E27FC236}">
-                  <a16:creationId xmlns:a16="http://schemas.microsoft.com/office/drawing/2014/main" xmlns="" id="{B4C4485E-0D59-4AB0-B0A4-74A1DD1834E6}"/>
+                  <a16:creationId xmlns="" xmlns:a16="http://schemas.microsoft.com/office/drawing/2014/main" id="{B4C4485E-0D59-4AB0-B0A4-74A1DD1834E6}"/>
                 </a:ext>
               </a:extLst>
             </p:cNvPr>
@@ -4910,7 +4911,7 @@
               <p:cNvPr id="43" name="Group 42">
                 <a:extLst>
                   <a:ext uri="{FF2B5EF4-FFF2-40B4-BE49-F238E27FC236}">
-                    <a16:creationId xmlns:a16="http://schemas.microsoft.com/office/drawing/2014/main" xmlns="" id="{72BDA222-9848-4E26-BEE2-6574659C2580}"/>
+                    <a16:creationId xmlns="" xmlns:a16="http://schemas.microsoft.com/office/drawing/2014/main" id="{72BDA222-9848-4E26-BEE2-6574659C2580}"/>
                   </a:ext>
                 </a:extLst>
               </p:cNvPr>
@@ -4930,7 +4931,7 @@
                 <p:cNvPr id="45" name="Group 44">
                   <a:extLst>
                     <a:ext uri="{FF2B5EF4-FFF2-40B4-BE49-F238E27FC236}">
-                      <a16:creationId xmlns:a16="http://schemas.microsoft.com/office/drawing/2014/main" xmlns="" id="{D903E7EA-24E1-4D93-914D-A68B039D5F3D}"/>
+                      <a16:creationId xmlns="" xmlns:a16="http://schemas.microsoft.com/office/drawing/2014/main" id="{D903E7EA-24E1-4D93-914D-A68B039D5F3D}"/>
                     </a:ext>
                   </a:extLst>
                 </p:cNvPr>
@@ -4950,7 +4951,7 @@
                   <p:cNvPr id="52" name="Oval 51">
                     <a:extLst>
                       <a:ext uri="{FF2B5EF4-FFF2-40B4-BE49-F238E27FC236}">
-                        <a16:creationId xmlns:a16="http://schemas.microsoft.com/office/drawing/2014/main" xmlns="" id="{C2F43FC0-C549-4856-8921-A7E64B0F39C5}"/>
+                        <a16:creationId xmlns="" xmlns:a16="http://schemas.microsoft.com/office/drawing/2014/main" id="{C2F43FC0-C549-4856-8921-A7E64B0F39C5}"/>
                       </a:ext>
                     </a:extLst>
                   </p:cNvPr>
@@ -5007,7 +5008,7 @@
                   <p:cNvPr id="54" name="Oval 53">
                     <a:extLst>
                       <a:ext uri="{FF2B5EF4-FFF2-40B4-BE49-F238E27FC236}">
-                        <a16:creationId xmlns:a16="http://schemas.microsoft.com/office/drawing/2014/main" xmlns="" id="{51D6D3D3-8047-4691-9EA0-34F877FC6C15}"/>
+                        <a16:creationId xmlns="" xmlns:a16="http://schemas.microsoft.com/office/drawing/2014/main" id="{51D6D3D3-8047-4691-9EA0-34F877FC6C15}"/>
                       </a:ext>
                     </a:extLst>
                   </p:cNvPr>
@@ -5064,7 +5065,7 @@
                   <p:cNvPr id="55" name="Oval 54">
                     <a:extLst>
                       <a:ext uri="{FF2B5EF4-FFF2-40B4-BE49-F238E27FC236}">
-                        <a16:creationId xmlns:a16="http://schemas.microsoft.com/office/drawing/2014/main" xmlns="" id="{49301636-2137-4DA6-97FA-F12DB9822206}"/>
+                        <a16:creationId xmlns="" xmlns:a16="http://schemas.microsoft.com/office/drawing/2014/main" id="{49301636-2137-4DA6-97FA-F12DB9822206}"/>
                       </a:ext>
                     </a:extLst>
                   </p:cNvPr>
@@ -5122,7 +5123,7 @@
                   <p:cNvPr id="56" name="Oval 55">
                     <a:extLst>
                       <a:ext uri="{FF2B5EF4-FFF2-40B4-BE49-F238E27FC236}">
-                        <a16:creationId xmlns:a16="http://schemas.microsoft.com/office/drawing/2014/main" xmlns="" id="{7A908F5C-AB6F-423E-B6A4-B701D6947F28}"/>
+                        <a16:creationId xmlns="" xmlns:a16="http://schemas.microsoft.com/office/drawing/2014/main" id="{7A908F5C-AB6F-423E-B6A4-B701D6947F28}"/>
                       </a:ext>
                     </a:extLst>
                   </p:cNvPr>
@@ -5184,7 +5185,7 @@
                 <p:cNvPr id="46" name="TextBox 45">
                   <a:extLst>
                     <a:ext uri="{FF2B5EF4-FFF2-40B4-BE49-F238E27FC236}">
-                      <a16:creationId xmlns:a16="http://schemas.microsoft.com/office/drawing/2014/main" xmlns="" id="{C95ECD21-DB51-48EC-AE7B-C786BD07934A}"/>
+                      <a16:creationId xmlns="" xmlns:a16="http://schemas.microsoft.com/office/drawing/2014/main" id="{C95ECD21-DB51-48EC-AE7B-C786BD07934A}"/>
                     </a:ext>
                   </a:extLst>
                 </p:cNvPr>
@@ -5224,7 +5225,7 @@
                 <p:cNvPr id="47" name="TextBox 46">
                   <a:extLst>
                     <a:ext uri="{FF2B5EF4-FFF2-40B4-BE49-F238E27FC236}">
-                      <a16:creationId xmlns:a16="http://schemas.microsoft.com/office/drawing/2014/main" xmlns="" id="{E5B5A626-B60C-4ABF-BAC2-E00677A5E0A5}"/>
+                      <a16:creationId xmlns="" xmlns:a16="http://schemas.microsoft.com/office/drawing/2014/main" id="{E5B5A626-B60C-4ABF-BAC2-E00677A5E0A5}"/>
                     </a:ext>
                   </a:extLst>
                 </p:cNvPr>
@@ -5269,7 +5270,7 @@
               <p:cNvPr id="44" name="TextBox 43">
                 <a:extLst>
                   <a:ext uri="{FF2B5EF4-FFF2-40B4-BE49-F238E27FC236}">
-                    <a16:creationId xmlns:a16="http://schemas.microsoft.com/office/drawing/2014/main" xmlns="" id="{B0C7B0D5-BCE0-4101-84A1-DC4A0D11F928}"/>
+                    <a16:creationId xmlns="" xmlns:a16="http://schemas.microsoft.com/office/drawing/2014/main" id="{B0C7B0D5-BCE0-4101-84A1-DC4A0D11F928}"/>
                   </a:ext>
                 </a:extLst>
               </p:cNvPr>
@@ -5310,7 +5311,7 @@
             <p:cNvPr id="42" name="TextBox 41">
               <a:extLst>
                 <a:ext uri="{FF2B5EF4-FFF2-40B4-BE49-F238E27FC236}">
-                  <a16:creationId xmlns:a16="http://schemas.microsoft.com/office/drawing/2014/main" xmlns="" id="{2C986E37-CCFD-44EC-A0A3-2B0105C1883E}"/>
+                  <a16:creationId xmlns="" xmlns:a16="http://schemas.microsoft.com/office/drawing/2014/main" id="{2C986E37-CCFD-44EC-A0A3-2B0105C1883E}"/>
                 </a:ext>
               </a:extLst>
             </p:cNvPr>
@@ -5355,7 +5356,7 @@
           <p:cNvPr id="57" name="Group 56">
             <a:extLst>
               <a:ext uri="{FF2B5EF4-FFF2-40B4-BE49-F238E27FC236}">
-                <a16:creationId xmlns:a16="http://schemas.microsoft.com/office/drawing/2014/main" xmlns="" id="{6172E669-0C84-480F-B4D0-37F8C37E17B3}"/>
+                <a16:creationId xmlns="" xmlns:a16="http://schemas.microsoft.com/office/drawing/2014/main" id="{6172E669-0C84-480F-B4D0-37F8C37E17B3}"/>
               </a:ext>
             </a:extLst>
           </p:cNvPr>
@@ -5375,7 +5376,7 @@
             <p:cNvPr id="58" name="Group 57">
               <a:extLst>
                 <a:ext uri="{FF2B5EF4-FFF2-40B4-BE49-F238E27FC236}">
-                  <a16:creationId xmlns:a16="http://schemas.microsoft.com/office/drawing/2014/main" xmlns="" id="{D7958CB9-7843-462F-BA3B-5D623FA96BAC}"/>
+                  <a16:creationId xmlns="" xmlns:a16="http://schemas.microsoft.com/office/drawing/2014/main" id="{D7958CB9-7843-462F-BA3B-5D623FA96BAC}"/>
                 </a:ext>
               </a:extLst>
             </p:cNvPr>
@@ -5395,7 +5396,7 @@
               <p:cNvPr id="60" name="Group 59">
                 <a:extLst>
                   <a:ext uri="{FF2B5EF4-FFF2-40B4-BE49-F238E27FC236}">
-                    <a16:creationId xmlns:a16="http://schemas.microsoft.com/office/drawing/2014/main" xmlns="" id="{1589486B-CC81-4834-BCE0-3E29F0CFCAC2}"/>
+                    <a16:creationId xmlns="" xmlns:a16="http://schemas.microsoft.com/office/drawing/2014/main" id="{1589486B-CC81-4834-BCE0-3E29F0CFCAC2}"/>
                   </a:ext>
                 </a:extLst>
               </p:cNvPr>
@@ -5415,7 +5416,7 @@
                 <p:cNvPr id="62" name="Group 61">
                   <a:extLst>
                     <a:ext uri="{FF2B5EF4-FFF2-40B4-BE49-F238E27FC236}">
-                      <a16:creationId xmlns:a16="http://schemas.microsoft.com/office/drawing/2014/main" xmlns="" id="{024EDD71-2465-47E5-A6AC-2C9C6EAB24EB}"/>
+                      <a16:creationId xmlns="" xmlns:a16="http://schemas.microsoft.com/office/drawing/2014/main" id="{024EDD71-2465-47E5-A6AC-2C9C6EAB24EB}"/>
                     </a:ext>
                   </a:extLst>
                 </p:cNvPr>
@@ -5435,7 +5436,7 @@
                   <p:cNvPr id="65" name="Oval 64">
                     <a:extLst>
                       <a:ext uri="{FF2B5EF4-FFF2-40B4-BE49-F238E27FC236}">
-                        <a16:creationId xmlns:a16="http://schemas.microsoft.com/office/drawing/2014/main" xmlns="" id="{69680FB8-66D2-4D99-BAB3-62BCD2D0BFF7}"/>
+                        <a16:creationId xmlns="" xmlns:a16="http://schemas.microsoft.com/office/drawing/2014/main" id="{69680FB8-66D2-4D99-BAB3-62BCD2D0BFF7}"/>
                       </a:ext>
                     </a:extLst>
                   </p:cNvPr>
@@ -5492,7 +5493,7 @@
                   <p:cNvPr id="66" name="Oval 65">
                     <a:extLst>
                       <a:ext uri="{FF2B5EF4-FFF2-40B4-BE49-F238E27FC236}">
-                        <a16:creationId xmlns:a16="http://schemas.microsoft.com/office/drawing/2014/main" xmlns="" id="{E598F5E5-E123-4599-AC9D-9E662BC4BD20}"/>
+                        <a16:creationId xmlns="" xmlns:a16="http://schemas.microsoft.com/office/drawing/2014/main" id="{E598F5E5-E123-4599-AC9D-9E662BC4BD20}"/>
                       </a:ext>
                     </a:extLst>
                   </p:cNvPr>
@@ -5549,7 +5550,7 @@
                   <p:cNvPr id="67" name="Oval 66">
                     <a:extLst>
                       <a:ext uri="{FF2B5EF4-FFF2-40B4-BE49-F238E27FC236}">
-                        <a16:creationId xmlns:a16="http://schemas.microsoft.com/office/drawing/2014/main" xmlns="" id="{2122066F-BB99-4D98-8FA1-5A7509C4DE05}"/>
+                        <a16:creationId xmlns="" xmlns:a16="http://schemas.microsoft.com/office/drawing/2014/main" id="{2122066F-BB99-4D98-8FA1-5A7509C4DE05}"/>
                       </a:ext>
                     </a:extLst>
                   </p:cNvPr>
@@ -5607,7 +5608,7 @@
                   <p:cNvPr id="68" name="Oval 67">
                     <a:extLst>
                       <a:ext uri="{FF2B5EF4-FFF2-40B4-BE49-F238E27FC236}">
-                        <a16:creationId xmlns:a16="http://schemas.microsoft.com/office/drawing/2014/main" xmlns="" id="{28FF4018-9841-4E38-AD2A-1E2017A1F6EE}"/>
+                        <a16:creationId xmlns="" xmlns:a16="http://schemas.microsoft.com/office/drawing/2014/main" id="{28FF4018-9841-4E38-AD2A-1E2017A1F6EE}"/>
                       </a:ext>
                     </a:extLst>
                   </p:cNvPr>
@@ -5669,7 +5670,7 @@
                 <p:cNvPr id="63" name="TextBox 62">
                   <a:extLst>
                     <a:ext uri="{FF2B5EF4-FFF2-40B4-BE49-F238E27FC236}">
-                      <a16:creationId xmlns:a16="http://schemas.microsoft.com/office/drawing/2014/main" xmlns="" id="{3C65F029-D30A-409D-8DE0-2AEC7FABCD39}"/>
+                      <a16:creationId xmlns="" xmlns:a16="http://schemas.microsoft.com/office/drawing/2014/main" id="{3C65F029-D30A-409D-8DE0-2AEC7FABCD39}"/>
                     </a:ext>
                   </a:extLst>
                 </p:cNvPr>
@@ -5709,7 +5710,7 @@
                 <p:cNvPr id="64" name="TextBox 63">
                   <a:extLst>
                     <a:ext uri="{FF2B5EF4-FFF2-40B4-BE49-F238E27FC236}">
-                      <a16:creationId xmlns:a16="http://schemas.microsoft.com/office/drawing/2014/main" xmlns="" id="{19491279-FDE4-4177-ABC7-4FE6828EC23F}"/>
+                      <a16:creationId xmlns="" xmlns:a16="http://schemas.microsoft.com/office/drawing/2014/main" id="{19491279-FDE4-4177-ABC7-4FE6828EC23F}"/>
                     </a:ext>
                   </a:extLst>
                 </p:cNvPr>
@@ -5750,7 +5751,7 @@
               <p:cNvPr id="61" name="TextBox 60">
                 <a:extLst>
                   <a:ext uri="{FF2B5EF4-FFF2-40B4-BE49-F238E27FC236}">
-                    <a16:creationId xmlns:a16="http://schemas.microsoft.com/office/drawing/2014/main" xmlns="" id="{DFA863E0-51CC-4A85-B421-8753FDA2BED6}"/>
+                    <a16:creationId xmlns="" xmlns:a16="http://schemas.microsoft.com/office/drawing/2014/main" id="{DFA863E0-51CC-4A85-B421-8753FDA2BED6}"/>
                   </a:ext>
                 </a:extLst>
               </p:cNvPr>
@@ -5791,7 +5792,7 @@
             <p:cNvPr id="59" name="TextBox 58">
               <a:extLst>
                 <a:ext uri="{FF2B5EF4-FFF2-40B4-BE49-F238E27FC236}">
-                  <a16:creationId xmlns:a16="http://schemas.microsoft.com/office/drawing/2014/main" xmlns="" id="{DD09A2CC-70F9-46EB-96F3-23E5D146D6DB}"/>
+                  <a16:creationId xmlns="" xmlns:a16="http://schemas.microsoft.com/office/drawing/2014/main" id="{DD09A2CC-70F9-46EB-96F3-23E5D146D6DB}"/>
                 </a:ext>
               </a:extLst>
             </p:cNvPr>
@@ -5836,7 +5837,7 @@
           <p:cNvPr id="69" name="Group 68">
             <a:extLst>
               <a:ext uri="{FF2B5EF4-FFF2-40B4-BE49-F238E27FC236}">
-                <a16:creationId xmlns:a16="http://schemas.microsoft.com/office/drawing/2014/main" xmlns="" id="{63A5CEB2-DC7C-41BA-B258-91F0D02711AA}"/>
+                <a16:creationId xmlns="" xmlns:a16="http://schemas.microsoft.com/office/drawing/2014/main" id="{63A5CEB2-DC7C-41BA-B258-91F0D02711AA}"/>
               </a:ext>
             </a:extLst>
           </p:cNvPr>
@@ -5856,7 +5857,7 @@
             <p:cNvPr id="70" name="Group 69">
               <a:extLst>
                 <a:ext uri="{FF2B5EF4-FFF2-40B4-BE49-F238E27FC236}">
-                  <a16:creationId xmlns:a16="http://schemas.microsoft.com/office/drawing/2014/main" xmlns="" id="{5BB46108-4114-42A0-AA0E-B7ED860FEEA8}"/>
+                  <a16:creationId xmlns="" xmlns:a16="http://schemas.microsoft.com/office/drawing/2014/main" id="{5BB46108-4114-42A0-AA0E-B7ED860FEEA8}"/>
                 </a:ext>
               </a:extLst>
             </p:cNvPr>
@@ -5876,7 +5877,7 @@
               <p:cNvPr id="72" name="Group 71">
                 <a:extLst>
                   <a:ext uri="{FF2B5EF4-FFF2-40B4-BE49-F238E27FC236}">
-                    <a16:creationId xmlns:a16="http://schemas.microsoft.com/office/drawing/2014/main" xmlns="" id="{9E8C7DF2-A39A-42E2-8254-137400028F4D}"/>
+                    <a16:creationId xmlns="" xmlns:a16="http://schemas.microsoft.com/office/drawing/2014/main" id="{9E8C7DF2-A39A-42E2-8254-137400028F4D}"/>
                   </a:ext>
                 </a:extLst>
               </p:cNvPr>
@@ -5896,7 +5897,7 @@
                 <p:cNvPr id="74" name="Group 73">
                   <a:extLst>
                     <a:ext uri="{FF2B5EF4-FFF2-40B4-BE49-F238E27FC236}">
-                      <a16:creationId xmlns:a16="http://schemas.microsoft.com/office/drawing/2014/main" xmlns="" id="{C756AE42-2360-4676-92F7-D1D5FC5062E4}"/>
+                      <a16:creationId xmlns="" xmlns:a16="http://schemas.microsoft.com/office/drawing/2014/main" id="{C756AE42-2360-4676-92F7-D1D5FC5062E4}"/>
                     </a:ext>
                   </a:extLst>
                 </p:cNvPr>
@@ -5916,7 +5917,7 @@
                   <p:cNvPr id="77" name="Oval 76">
                     <a:extLst>
                       <a:ext uri="{FF2B5EF4-FFF2-40B4-BE49-F238E27FC236}">
-                        <a16:creationId xmlns:a16="http://schemas.microsoft.com/office/drawing/2014/main" xmlns="" id="{68A84D6A-9A25-46B5-ACE6-0F0FFCE3529E}"/>
+                        <a16:creationId xmlns="" xmlns:a16="http://schemas.microsoft.com/office/drawing/2014/main" id="{68A84D6A-9A25-46B5-ACE6-0F0FFCE3529E}"/>
                       </a:ext>
                     </a:extLst>
                   </p:cNvPr>
@@ -5973,7 +5974,7 @@
                   <p:cNvPr id="78" name="Oval 77">
                     <a:extLst>
                       <a:ext uri="{FF2B5EF4-FFF2-40B4-BE49-F238E27FC236}">
-                        <a16:creationId xmlns:a16="http://schemas.microsoft.com/office/drawing/2014/main" xmlns="" id="{559632C6-330D-41FB-823F-AB43D839BD3F}"/>
+                        <a16:creationId xmlns="" xmlns:a16="http://schemas.microsoft.com/office/drawing/2014/main" id="{559632C6-330D-41FB-823F-AB43D839BD3F}"/>
                       </a:ext>
                     </a:extLst>
                   </p:cNvPr>
@@ -6030,7 +6031,7 @@
                   <p:cNvPr id="79" name="Oval 78">
                     <a:extLst>
                       <a:ext uri="{FF2B5EF4-FFF2-40B4-BE49-F238E27FC236}">
-                        <a16:creationId xmlns:a16="http://schemas.microsoft.com/office/drawing/2014/main" xmlns="" id="{A7E3E3EF-43B0-4B4D-BE5F-77EE7B997F02}"/>
+                        <a16:creationId xmlns="" xmlns:a16="http://schemas.microsoft.com/office/drawing/2014/main" id="{A7E3E3EF-43B0-4B4D-BE5F-77EE7B997F02}"/>
                       </a:ext>
                     </a:extLst>
                   </p:cNvPr>
@@ -6088,7 +6089,7 @@
                   <p:cNvPr id="80" name="Oval 79">
                     <a:extLst>
                       <a:ext uri="{FF2B5EF4-FFF2-40B4-BE49-F238E27FC236}">
-                        <a16:creationId xmlns:a16="http://schemas.microsoft.com/office/drawing/2014/main" xmlns="" id="{76135C05-B2B3-4BFD-86D2-6F1F849E25DD}"/>
+                        <a16:creationId xmlns="" xmlns:a16="http://schemas.microsoft.com/office/drawing/2014/main" id="{76135C05-B2B3-4BFD-86D2-6F1F849E25DD}"/>
                       </a:ext>
                     </a:extLst>
                   </p:cNvPr>
@@ -6150,7 +6151,7 @@
                 <p:cNvPr id="75" name="TextBox 74">
                   <a:extLst>
                     <a:ext uri="{FF2B5EF4-FFF2-40B4-BE49-F238E27FC236}">
-                      <a16:creationId xmlns:a16="http://schemas.microsoft.com/office/drawing/2014/main" xmlns="" id="{1C1547DF-5385-4AAE-AF5D-720A02624C9B}"/>
+                      <a16:creationId xmlns="" xmlns:a16="http://schemas.microsoft.com/office/drawing/2014/main" id="{1C1547DF-5385-4AAE-AF5D-720A02624C9B}"/>
                     </a:ext>
                   </a:extLst>
                 </p:cNvPr>
@@ -6190,7 +6191,7 @@
                 <p:cNvPr id="76" name="TextBox 75">
                   <a:extLst>
                     <a:ext uri="{FF2B5EF4-FFF2-40B4-BE49-F238E27FC236}">
-                      <a16:creationId xmlns:a16="http://schemas.microsoft.com/office/drawing/2014/main" xmlns="" id="{A36D01E8-18DC-4975-B808-15A72D8A2681}"/>
+                      <a16:creationId xmlns="" xmlns:a16="http://schemas.microsoft.com/office/drawing/2014/main" id="{A36D01E8-18DC-4975-B808-15A72D8A2681}"/>
                     </a:ext>
                   </a:extLst>
                 </p:cNvPr>
@@ -6231,7 +6232,7 @@
               <p:cNvPr id="73" name="TextBox 72">
                 <a:extLst>
                   <a:ext uri="{FF2B5EF4-FFF2-40B4-BE49-F238E27FC236}">
-                    <a16:creationId xmlns:a16="http://schemas.microsoft.com/office/drawing/2014/main" xmlns="" id="{00B5F9ED-AECA-4891-9995-86230A56B813}"/>
+                    <a16:creationId xmlns="" xmlns:a16="http://schemas.microsoft.com/office/drawing/2014/main" id="{00B5F9ED-AECA-4891-9995-86230A56B813}"/>
                   </a:ext>
                 </a:extLst>
               </p:cNvPr>
@@ -6271,7 +6272,7 @@
             <p:cNvPr id="71" name="TextBox 70">
               <a:extLst>
                 <a:ext uri="{FF2B5EF4-FFF2-40B4-BE49-F238E27FC236}">
-                  <a16:creationId xmlns:a16="http://schemas.microsoft.com/office/drawing/2014/main" xmlns="" id="{D09EF65C-57D9-4BBE-8E46-F76D7392B51B}"/>
+                  <a16:creationId xmlns="" xmlns:a16="http://schemas.microsoft.com/office/drawing/2014/main" id="{D09EF65C-57D9-4BBE-8E46-F76D7392B51B}"/>
                 </a:ext>
               </a:extLst>
             </p:cNvPr>
@@ -6316,7 +6317,7 @@
           <p:cNvPr id="81" name="Group 80">
             <a:extLst>
               <a:ext uri="{FF2B5EF4-FFF2-40B4-BE49-F238E27FC236}">
-                <a16:creationId xmlns:a16="http://schemas.microsoft.com/office/drawing/2014/main" xmlns="" id="{2A04061C-4A9D-4367-A463-1D80B0E5FA86}"/>
+                <a16:creationId xmlns="" xmlns:a16="http://schemas.microsoft.com/office/drawing/2014/main" id="{2A04061C-4A9D-4367-A463-1D80B0E5FA86}"/>
               </a:ext>
             </a:extLst>
           </p:cNvPr>
@@ -6336,7 +6337,7 @@
             <p:cNvPr id="82" name="Group 81">
               <a:extLst>
                 <a:ext uri="{FF2B5EF4-FFF2-40B4-BE49-F238E27FC236}">
-                  <a16:creationId xmlns:a16="http://schemas.microsoft.com/office/drawing/2014/main" xmlns="" id="{45235B47-2D23-40AB-930F-A57AD944434E}"/>
+                  <a16:creationId xmlns="" xmlns:a16="http://schemas.microsoft.com/office/drawing/2014/main" id="{45235B47-2D23-40AB-930F-A57AD944434E}"/>
                 </a:ext>
               </a:extLst>
             </p:cNvPr>
@@ -6356,7 +6357,7 @@
               <p:cNvPr id="84" name="Group 83">
                 <a:extLst>
                   <a:ext uri="{FF2B5EF4-FFF2-40B4-BE49-F238E27FC236}">
-                    <a16:creationId xmlns:a16="http://schemas.microsoft.com/office/drawing/2014/main" xmlns="" id="{813CE9B1-FE5C-4148-97F5-2C31F79DB8CC}"/>
+                    <a16:creationId xmlns="" xmlns:a16="http://schemas.microsoft.com/office/drawing/2014/main" id="{813CE9B1-FE5C-4148-97F5-2C31F79DB8CC}"/>
                   </a:ext>
                 </a:extLst>
               </p:cNvPr>
@@ -6376,7 +6377,7 @@
                 <p:cNvPr id="86" name="Group 85">
                   <a:extLst>
                     <a:ext uri="{FF2B5EF4-FFF2-40B4-BE49-F238E27FC236}">
-                      <a16:creationId xmlns:a16="http://schemas.microsoft.com/office/drawing/2014/main" xmlns="" id="{CF1BDC8A-BAB3-4522-9F97-33C0FEF3C393}"/>
+                      <a16:creationId xmlns="" xmlns:a16="http://schemas.microsoft.com/office/drawing/2014/main" id="{CF1BDC8A-BAB3-4522-9F97-33C0FEF3C393}"/>
                     </a:ext>
                   </a:extLst>
                 </p:cNvPr>
@@ -6396,7 +6397,7 @@
                   <p:cNvPr id="88" name="Group 87">
                     <a:extLst>
                       <a:ext uri="{FF2B5EF4-FFF2-40B4-BE49-F238E27FC236}">
-                        <a16:creationId xmlns:a16="http://schemas.microsoft.com/office/drawing/2014/main" xmlns="" id="{B06A5FD4-698F-42BF-BAD1-F3A1FD142E38}"/>
+                        <a16:creationId xmlns="" xmlns:a16="http://schemas.microsoft.com/office/drawing/2014/main" id="{B06A5FD4-698F-42BF-BAD1-F3A1FD142E38}"/>
                       </a:ext>
                     </a:extLst>
                   </p:cNvPr>
@@ -6416,7 +6417,7 @@
                     <p:cNvPr id="92" name="Oval 91">
                       <a:extLst>
                         <a:ext uri="{FF2B5EF4-FFF2-40B4-BE49-F238E27FC236}">
-                          <a16:creationId xmlns:a16="http://schemas.microsoft.com/office/drawing/2014/main" xmlns="" id="{6FB8DF73-690F-48CC-9E6B-5C6C58035808}"/>
+                          <a16:creationId xmlns="" xmlns:a16="http://schemas.microsoft.com/office/drawing/2014/main" id="{6FB8DF73-690F-48CC-9E6B-5C6C58035808}"/>
                         </a:ext>
                       </a:extLst>
                     </p:cNvPr>
@@ -6473,7 +6474,7 @@
                     <p:cNvPr id="93" name="Oval 92">
                       <a:extLst>
                         <a:ext uri="{FF2B5EF4-FFF2-40B4-BE49-F238E27FC236}">
-                          <a16:creationId xmlns:a16="http://schemas.microsoft.com/office/drawing/2014/main" xmlns="" id="{8B9A1E3F-43ED-4A11-8278-6F517381E215}"/>
+                          <a16:creationId xmlns="" xmlns:a16="http://schemas.microsoft.com/office/drawing/2014/main" id="{8B9A1E3F-43ED-4A11-8278-6F517381E215}"/>
                         </a:ext>
                       </a:extLst>
                     </p:cNvPr>
@@ -6530,7 +6531,7 @@
                     <p:cNvPr id="94" name="Oval 93">
                       <a:extLst>
                         <a:ext uri="{FF2B5EF4-FFF2-40B4-BE49-F238E27FC236}">
-                          <a16:creationId xmlns:a16="http://schemas.microsoft.com/office/drawing/2014/main" xmlns="" id="{6C5F675E-E9ED-4257-A4B1-6967ACFAEEBD}"/>
+                          <a16:creationId xmlns="" xmlns:a16="http://schemas.microsoft.com/office/drawing/2014/main" id="{6C5F675E-E9ED-4257-A4B1-6967ACFAEEBD}"/>
                         </a:ext>
                       </a:extLst>
                     </p:cNvPr>
@@ -6588,7 +6589,7 @@
                     <p:cNvPr id="95" name="Oval 94">
                       <a:extLst>
                         <a:ext uri="{FF2B5EF4-FFF2-40B4-BE49-F238E27FC236}">
-                          <a16:creationId xmlns:a16="http://schemas.microsoft.com/office/drawing/2014/main" xmlns="" id="{8B0019AD-26DD-4D55-B6F3-28C6FA61B22A}"/>
+                          <a16:creationId xmlns="" xmlns:a16="http://schemas.microsoft.com/office/drawing/2014/main" id="{8B0019AD-26DD-4D55-B6F3-28C6FA61B22A}"/>
                         </a:ext>
                       </a:extLst>
                     </p:cNvPr>
@@ -6650,7 +6651,7 @@
                   <p:cNvPr id="89" name="TextBox 88">
                     <a:extLst>
                       <a:ext uri="{FF2B5EF4-FFF2-40B4-BE49-F238E27FC236}">
-                        <a16:creationId xmlns:a16="http://schemas.microsoft.com/office/drawing/2014/main" xmlns="" id="{769F6646-723D-4B62-90E2-4FDD4C0F3BE1}"/>
+                        <a16:creationId xmlns="" xmlns:a16="http://schemas.microsoft.com/office/drawing/2014/main" id="{769F6646-723D-4B62-90E2-4FDD4C0F3BE1}"/>
                       </a:ext>
                     </a:extLst>
                   </p:cNvPr>
@@ -6690,7 +6691,7 @@
                   <p:cNvPr id="90" name="TextBox 89">
                     <a:extLst>
                       <a:ext uri="{FF2B5EF4-FFF2-40B4-BE49-F238E27FC236}">
-                        <a16:creationId xmlns:a16="http://schemas.microsoft.com/office/drawing/2014/main" xmlns="" id="{B5FCEA77-DB72-4B9B-896F-CAF0FBB8824F}"/>
+                        <a16:creationId xmlns="" xmlns:a16="http://schemas.microsoft.com/office/drawing/2014/main" id="{B5FCEA77-DB72-4B9B-896F-CAF0FBB8824F}"/>
                       </a:ext>
                     </a:extLst>
                   </p:cNvPr>
@@ -6731,7 +6732,7 @@
                 <p:cNvPr id="87" name="TextBox 86">
                   <a:extLst>
                     <a:ext uri="{FF2B5EF4-FFF2-40B4-BE49-F238E27FC236}">
-                      <a16:creationId xmlns:a16="http://schemas.microsoft.com/office/drawing/2014/main" xmlns="" id="{E08231CB-4975-45E2-90E2-711E4C0623A6}"/>
+                      <a16:creationId xmlns="" xmlns:a16="http://schemas.microsoft.com/office/drawing/2014/main" id="{E08231CB-4975-45E2-90E2-711E4C0623A6}"/>
                     </a:ext>
                   </a:extLst>
                 </p:cNvPr>
@@ -6772,7 +6773,7 @@
               <p:cNvPr id="85" name="TextBox 84">
                 <a:extLst>
                   <a:ext uri="{FF2B5EF4-FFF2-40B4-BE49-F238E27FC236}">
-                    <a16:creationId xmlns:a16="http://schemas.microsoft.com/office/drawing/2014/main" xmlns="" id="{886800C3-39F3-4CA3-982B-091775F9BEF2}"/>
+                    <a16:creationId xmlns="" xmlns:a16="http://schemas.microsoft.com/office/drawing/2014/main" id="{886800C3-39F3-4CA3-982B-091775F9BEF2}"/>
                   </a:ext>
                 </a:extLst>
               </p:cNvPr>
@@ -6812,7 +6813,7 @@
             <p:cNvPr id="83" name="TextBox 82">
               <a:extLst>
                 <a:ext uri="{FF2B5EF4-FFF2-40B4-BE49-F238E27FC236}">
-                  <a16:creationId xmlns:a16="http://schemas.microsoft.com/office/drawing/2014/main" xmlns="" id="{BFD105B3-ED68-4F24-89BC-2C52177327D7}"/>
+                  <a16:creationId xmlns="" xmlns:a16="http://schemas.microsoft.com/office/drawing/2014/main" id="{BFD105B3-ED68-4F24-89BC-2C52177327D7}"/>
                 </a:ext>
               </a:extLst>
             </p:cNvPr>
@@ -6857,7 +6858,7 @@
           <p:cNvPr id="97" name="Group 96">
             <a:extLst>
               <a:ext uri="{FF2B5EF4-FFF2-40B4-BE49-F238E27FC236}">
-                <a16:creationId xmlns:a16="http://schemas.microsoft.com/office/drawing/2014/main" xmlns="" id="{1DEF5049-24D5-4A7F-A457-1D43B9295BBC}"/>
+                <a16:creationId xmlns="" xmlns:a16="http://schemas.microsoft.com/office/drawing/2014/main" id="{1DEF5049-24D5-4A7F-A457-1D43B9295BBC}"/>
               </a:ext>
             </a:extLst>
           </p:cNvPr>
@@ -6877,7 +6878,7 @@
             <p:cNvPr id="98" name="Group 97">
               <a:extLst>
                 <a:ext uri="{FF2B5EF4-FFF2-40B4-BE49-F238E27FC236}">
-                  <a16:creationId xmlns:a16="http://schemas.microsoft.com/office/drawing/2014/main" xmlns="" id="{329F01C5-BE82-4F40-AFB5-65E18A2E3DD8}"/>
+                  <a16:creationId xmlns="" xmlns:a16="http://schemas.microsoft.com/office/drawing/2014/main" id="{329F01C5-BE82-4F40-AFB5-65E18A2E3DD8}"/>
                 </a:ext>
               </a:extLst>
             </p:cNvPr>
@@ -6897,7 +6898,7 @@
               <p:cNvPr id="101" name="Oval 100">
                 <a:extLst>
                   <a:ext uri="{FF2B5EF4-FFF2-40B4-BE49-F238E27FC236}">
-                    <a16:creationId xmlns:a16="http://schemas.microsoft.com/office/drawing/2014/main" xmlns="" id="{ABD4714A-2318-43D8-8E69-0959044E5993}"/>
+                    <a16:creationId xmlns="" xmlns:a16="http://schemas.microsoft.com/office/drawing/2014/main" id="{ABD4714A-2318-43D8-8E69-0959044E5993}"/>
                   </a:ext>
                 </a:extLst>
               </p:cNvPr>
@@ -6954,7 +6955,7 @@
               <p:cNvPr id="102" name="Oval 101">
                 <a:extLst>
                   <a:ext uri="{FF2B5EF4-FFF2-40B4-BE49-F238E27FC236}">
-                    <a16:creationId xmlns:a16="http://schemas.microsoft.com/office/drawing/2014/main" xmlns="" id="{F52D2641-E7FB-4F26-BC4A-A3E91AA08E1B}"/>
+                    <a16:creationId xmlns="" xmlns:a16="http://schemas.microsoft.com/office/drawing/2014/main" id="{F52D2641-E7FB-4F26-BC4A-A3E91AA08E1B}"/>
                   </a:ext>
                 </a:extLst>
               </p:cNvPr>
@@ -7011,7 +7012,7 @@
               <p:cNvPr id="103" name="Oval 102">
                 <a:extLst>
                   <a:ext uri="{FF2B5EF4-FFF2-40B4-BE49-F238E27FC236}">
-                    <a16:creationId xmlns:a16="http://schemas.microsoft.com/office/drawing/2014/main" xmlns="" id="{52563AA7-4204-4037-A1E5-A157E64FE63B}"/>
+                    <a16:creationId xmlns="" xmlns:a16="http://schemas.microsoft.com/office/drawing/2014/main" id="{52563AA7-4204-4037-A1E5-A157E64FE63B}"/>
                   </a:ext>
                 </a:extLst>
               </p:cNvPr>
@@ -7069,7 +7070,7 @@
               <p:cNvPr id="104" name="Oval 103">
                 <a:extLst>
                   <a:ext uri="{FF2B5EF4-FFF2-40B4-BE49-F238E27FC236}">
-                    <a16:creationId xmlns:a16="http://schemas.microsoft.com/office/drawing/2014/main" xmlns="" id="{8CE94D1A-A119-4F8B-888B-E3C3DFDFA06C}"/>
+                    <a16:creationId xmlns="" xmlns:a16="http://schemas.microsoft.com/office/drawing/2014/main" id="{8CE94D1A-A119-4F8B-888B-E3C3DFDFA06C}"/>
                   </a:ext>
                 </a:extLst>
               </p:cNvPr>
@@ -7131,7 +7132,7 @@
             <p:cNvPr id="99" name="TextBox 98">
               <a:extLst>
                 <a:ext uri="{FF2B5EF4-FFF2-40B4-BE49-F238E27FC236}">
-                  <a16:creationId xmlns:a16="http://schemas.microsoft.com/office/drawing/2014/main" xmlns="" id="{DDFFC7ED-B194-4FC5-91B0-255B2173939F}"/>
+                  <a16:creationId xmlns="" xmlns:a16="http://schemas.microsoft.com/office/drawing/2014/main" id="{DDFFC7ED-B194-4FC5-91B0-255B2173939F}"/>
                 </a:ext>
               </a:extLst>
             </p:cNvPr>
@@ -7208,7 +7209,7 @@
             <p:cNvPr id="100" name="TextBox 99">
               <a:extLst>
                 <a:ext uri="{FF2B5EF4-FFF2-40B4-BE49-F238E27FC236}">
-                  <a16:creationId xmlns:a16="http://schemas.microsoft.com/office/drawing/2014/main" xmlns="" id="{EAD8081A-6C91-42D7-AAC1-FEDD21D02A3C}"/>
+                  <a16:creationId xmlns="" xmlns:a16="http://schemas.microsoft.com/office/drawing/2014/main" id="{EAD8081A-6C91-42D7-AAC1-FEDD21D02A3C}"/>
                 </a:ext>
               </a:extLst>
             </p:cNvPr>
@@ -7341,7 +7342,7 @@
           <p:cNvPr id="147" name="Group 146">
             <a:extLst>
               <a:ext uri="{FF2B5EF4-FFF2-40B4-BE49-F238E27FC236}">
-                <a16:creationId xmlns:a16="http://schemas.microsoft.com/office/drawing/2014/main" xmlns="" id="{709C87B8-071F-42C2-A8DE-A6051E84C197}"/>
+                <a16:creationId xmlns="" xmlns:a16="http://schemas.microsoft.com/office/drawing/2014/main" id="{709C87B8-071F-42C2-A8DE-A6051E84C197}"/>
               </a:ext>
             </a:extLst>
           </p:cNvPr>
@@ -7361,7 +7362,7 @@
             <p:cNvPr id="148" name="Group 147">
               <a:extLst>
                 <a:ext uri="{FF2B5EF4-FFF2-40B4-BE49-F238E27FC236}">
-                  <a16:creationId xmlns:a16="http://schemas.microsoft.com/office/drawing/2014/main" xmlns="" id="{026999E9-F9F8-4E8A-AB5E-C475BCC958D9}"/>
+                  <a16:creationId xmlns="" xmlns:a16="http://schemas.microsoft.com/office/drawing/2014/main" id="{026999E9-F9F8-4E8A-AB5E-C475BCC958D9}"/>
                 </a:ext>
               </a:extLst>
             </p:cNvPr>
@@ -7842,7 +7843,7 @@
               <p:cNvPr id="151" name="TextBox 150">
                 <a:extLst>
                   <a:ext uri="{FF2B5EF4-FFF2-40B4-BE49-F238E27FC236}">
-                    <a16:creationId xmlns:a16="http://schemas.microsoft.com/office/drawing/2014/main" xmlns="" id="{8C8A0BB9-1357-4728-9CE7-3CE202F53E59}"/>
+                    <a16:creationId xmlns="" xmlns:a16="http://schemas.microsoft.com/office/drawing/2014/main" id="{8C8A0BB9-1357-4728-9CE7-3CE202F53E59}"/>
                   </a:ext>
                 </a:extLst>
               </p:cNvPr>
@@ -7883,7 +7884,7 @@
             <p:cNvPr id="149" name="TextBox 148">
               <a:extLst>
                 <a:ext uri="{FF2B5EF4-FFF2-40B4-BE49-F238E27FC236}">
-                  <a16:creationId xmlns:a16="http://schemas.microsoft.com/office/drawing/2014/main" xmlns="" id="{D623C965-D1FD-4C88-8FD5-732CFAFE6BFD}"/>
+                  <a16:creationId xmlns="" xmlns:a16="http://schemas.microsoft.com/office/drawing/2014/main" id="{D623C965-D1FD-4C88-8FD5-732CFAFE6BFD}"/>
                 </a:ext>
               </a:extLst>
             </p:cNvPr>
@@ -7928,7 +7929,7 @@
           <p:cNvPr id="164" name="Group 163">
             <a:extLst>
               <a:ext uri="{FF2B5EF4-FFF2-40B4-BE49-F238E27FC236}">
-                <a16:creationId xmlns:a16="http://schemas.microsoft.com/office/drawing/2014/main" xmlns="" id="{1378DE23-7D62-478B-95BE-FF73F0228F81}"/>
+                <a16:creationId xmlns="" xmlns:a16="http://schemas.microsoft.com/office/drawing/2014/main" id="{1378DE23-7D62-478B-95BE-FF73F0228F81}"/>
               </a:ext>
             </a:extLst>
           </p:cNvPr>
@@ -8301,7 +8302,7 @@
             <p:cNvPr id="166" name="TextBox 165">
               <a:extLst>
                 <a:ext uri="{FF2B5EF4-FFF2-40B4-BE49-F238E27FC236}">
-                  <a16:creationId xmlns:a16="http://schemas.microsoft.com/office/drawing/2014/main" xmlns="" id="{7472ED37-5D8A-4600-8965-599DD324EE41}"/>
+                  <a16:creationId xmlns="" xmlns:a16="http://schemas.microsoft.com/office/drawing/2014/main" id="{7472ED37-5D8A-4600-8965-599DD324EE41}"/>
                 </a:ext>
               </a:extLst>
             </p:cNvPr>
@@ -8346,7 +8347,7 @@
           <p:cNvPr id="175" name="Group 174">
             <a:extLst>
               <a:ext uri="{FF2B5EF4-FFF2-40B4-BE49-F238E27FC236}">
-                <a16:creationId xmlns:a16="http://schemas.microsoft.com/office/drawing/2014/main" xmlns="" id="{74B26ABE-DB48-4D22-8605-448C2C9BB469}"/>
+                <a16:creationId xmlns="" xmlns:a16="http://schemas.microsoft.com/office/drawing/2014/main" id="{74B26ABE-DB48-4D22-8605-448C2C9BB469}"/>
               </a:ext>
             </a:extLst>
           </p:cNvPr>
@@ -8366,7 +8367,7 @@
             <p:cNvPr id="176" name="Group 175">
               <a:extLst>
                 <a:ext uri="{FF2B5EF4-FFF2-40B4-BE49-F238E27FC236}">
-                  <a16:creationId xmlns:a16="http://schemas.microsoft.com/office/drawing/2014/main" xmlns="" id="{882FBE51-C2A6-41EB-ACE8-745B20AA2BA5}"/>
+                  <a16:creationId xmlns="" xmlns:a16="http://schemas.microsoft.com/office/drawing/2014/main" id="{882FBE51-C2A6-41EB-ACE8-745B20AA2BA5}"/>
                 </a:ext>
               </a:extLst>
             </p:cNvPr>
@@ -8821,7 +8822,7 @@
               <p:cNvPr id="179" name="TextBox 178">
                 <a:extLst>
                   <a:ext uri="{FF2B5EF4-FFF2-40B4-BE49-F238E27FC236}">
-                    <a16:creationId xmlns:a16="http://schemas.microsoft.com/office/drawing/2014/main" xmlns="" id="{C3908C2E-2C90-4F2E-A289-A4C95B6B9AAE}"/>
+                    <a16:creationId xmlns="" xmlns:a16="http://schemas.microsoft.com/office/drawing/2014/main" id="{C3908C2E-2C90-4F2E-A289-A4C95B6B9AAE}"/>
                   </a:ext>
                 </a:extLst>
               </p:cNvPr>
@@ -8866,7 +8867,7 @@
             <p:cNvPr id="177" name="TextBox 176">
               <a:extLst>
                 <a:ext uri="{FF2B5EF4-FFF2-40B4-BE49-F238E27FC236}">
-                  <a16:creationId xmlns:a16="http://schemas.microsoft.com/office/drawing/2014/main" xmlns="" id="{EC5C7B60-870A-4939-AA11-8153EC33E6FE}"/>
+                  <a16:creationId xmlns="" xmlns:a16="http://schemas.microsoft.com/office/drawing/2014/main" id="{EC5C7B60-870A-4939-AA11-8153EC33E6FE}"/>
                 </a:ext>
               </a:extLst>
             </p:cNvPr>
@@ -8911,7 +8912,7 @@
           <p:cNvPr id="191" name="Group 190">
             <a:extLst>
               <a:ext uri="{FF2B5EF4-FFF2-40B4-BE49-F238E27FC236}">
-                <a16:creationId xmlns:a16="http://schemas.microsoft.com/office/drawing/2014/main" xmlns="" id="{7E8B3428-E8FD-4A97-AD4A-DB1DC838EEC4}"/>
+                <a16:creationId xmlns="" xmlns:a16="http://schemas.microsoft.com/office/drawing/2014/main" id="{7E8B3428-E8FD-4A97-AD4A-DB1DC838EEC4}"/>
               </a:ext>
             </a:extLst>
           </p:cNvPr>
@@ -8931,7 +8932,7 @@
             <p:cNvPr id="192" name="Group 191">
               <a:extLst>
                 <a:ext uri="{FF2B5EF4-FFF2-40B4-BE49-F238E27FC236}">
-                  <a16:creationId xmlns:a16="http://schemas.microsoft.com/office/drawing/2014/main" xmlns="" id="{38A24F48-A60F-4057-8B81-29F7C7B2F779}"/>
+                  <a16:creationId xmlns="" xmlns:a16="http://schemas.microsoft.com/office/drawing/2014/main" id="{38A24F48-A60F-4057-8B81-29F7C7B2F779}"/>
                 </a:ext>
               </a:extLst>
             </p:cNvPr>
@@ -9357,7 +9358,7 @@
               <p:cNvPr id="195" name="TextBox 194">
                 <a:extLst>
                   <a:ext uri="{FF2B5EF4-FFF2-40B4-BE49-F238E27FC236}">
-                    <a16:creationId xmlns:a16="http://schemas.microsoft.com/office/drawing/2014/main" xmlns="" id="{7327F190-3648-457A-A36D-AE45D82F81C0}"/>
+                    <a16:creationId xmlns="" xmlns:a16="http://schemas.microsoft.com/office/drawing/2014/main" id="{7327F190-3648-457A-A36D-AE45D82F81C0}"/>
                   </a:ext>
                 </a:extLst>
               </p:cNvPr>
@@ -9398,7 +9399,7 @@
             <p:cNvPr id="193" name="TextBox 192">
               <a:extLst>
                 <a:ext uri="{FF2B5EF4-FFF2-40B4-BE49-F238E27FC236}">
-                  <a16:creationId xmlns:a16="http://schemas.microsoft.com/office/drawing/2014/main" xmlns="" id="{1C557B58-0D37-4554-ACA8-7C203D39099B}"/>
+                  <a16:creationId xmlns="" xmlns:a16="http://schemas.microsoft.com/office/drawing/2014/main" id="{1C557B58-0D37-4554-ACA8-7C203D39099B}"/>
                 </a:ext>
               </a:extLst>
             </p:cNvPr>
@@ -9443,7 +9444,7 @@
           <p:cNvPr id="98" name="Group 97">
             <a:extLst>
               <a:ext uri="{FF2B5EF4-FFF2-40B4-BE49-F238E27FC236}">
-                <a16:creationId xmlns:a16="http://schemas.microsoft.com/office/drawing/2014/main" xmlns="" id="{E5336EE1-F72C-42F3-A99C-BE09D41EDB9C}"/>
+                <a16:creationId xmlns="" xmlns:a16="http://schemas.microsoft.com/office/drawing/2014/main" id="{E5336EE1-F72C-42F3-A99C-BE09D41EDB9C}"/>
               </a:ext>
             </a:extLst>
           </p:cNvPr>
@@ -9463,7 +9464,7 @@
             <p:cNvPr id="99" name="Group 98">
               <a:extLst>
                 <a:ext uri="{FF2B5EF4-FFF2-40B4-BE49-F238E27FC236}">
-                  <a16:creationId xmlns:a16="http://schemas.microsoft.com/office/drawing/2014/main" xmlns="" id="{DA6BEE02-34B8-4E94-88FA-4E084F83BD43}"/>
+                  <a16:creationId xmlns="" xmlns:a16="http://schemas.microsoft.com/office/drawing/2014/main" id="{DA6BEE02-34B8-4E94-88FA-4E084F83BD43}"/>
                 </a:ext>
               </a:extLst>
             </p:cNvPr>
@@ -9483,7 +9484,7 @@
               <p:cNvPr id="102" name="Oval 101">
                 <a:extLst>
                   <a:ext uri="{FF2B5EF4-FFF2-40B4-BE49-F238E27FC236}">
-                    <a16:creationId xmlns:a16="http://schemas.microsoft.com/office/drawing/2014/main" xmlns="" id="{AA46D433-78B8-4FA2-AC49-23EF9963D6FD}"/>
+                    <a16:creationId xmlns="" xmlns:a16="http://schemas.microsoft.com/office/drawing/2014/main" id="{AA46D433-78B8-4FA2-AC49-23EF9963D6FD}"/>
                   </a:ext>
                 </a:extLst>
               </p:cNvPr>
@@ -9540,7 +9541,7 @@
               <p:cNvPr id="103" name="Oval 102">
                 <a:extLst>
                   <a:ext uri="{FF2B5EF4-FFF2-40B4-BE49-F238E27FC236}">
-                    <a16:creationId xmlns:a16="http://schemas.microsoft.com/office/drawing/2014/main" xmlns="" id="{942893DB-3A2A-4441-9E4F-0D1FB4D67DFF}"/>
+                    <a16:creationId xmlns="" xmlns:a16="http://schemas.microsoft.com/office/drawing/2014/main" id="{942893DB-3A2A-4441-9E4F-0D1FB4D67DFF}"/>
                   </a:ext>
                 </a:extLst>
               </p:cNvPr>
@@ -9597,7 +9598,7 @@
               <p:cNvPr id="104" name="Oval 103">
                 <a:extLst>
                   <a:ext uri="{FF2B5EF4-FFF2-40B4-BE49-F238E27FC236}">
-                    <a16:creationId xmlns:a16="http://schemas.microsoft.com/office/drawing/2014/main" xmlns="" id="{61D7BD8E-8BD1-46D0-90CB-79BC639E68C1}"/>
+                    <a16:creationId xmlns="" xmlns:a16="http://schemas.microsoft.com/office/drawing/2014/main" id="{61D7BD8E-8BD1-46D0-90CB-79BC639E68C1}"/>
                   </a:ext>
                 </a:extLst>
               </p:cNvPr>
@@ -9655,7 +9656,7 @@
               <p:cNvPr id="105" name="Oval 104">
                 <a:extLst>
                   <a:ext uri="{FF2B5EF4-FFF2-40B4-BE49-F238E27FC236}">
-                    <a16:creationId xmlns:a16="http://schemas.microsoft.com/office/drawing/2014/main" xmlns="" id="{EC157B00-ADC1-462E-89ED-43675A451350}"/>
+                    <a16:creationId xmlns="" xmlns:a16="http://schemas.microsoft.com/office/drawing/2014/main" id="{EC157B00-ADC1-462E-89ED-43675A451350}"/>
                   </a:ext>
                 </a:extLst>
               </p:cNvPr>
@@ -9717,7 +9718,7 @@
             <p:cNvPr id="100" name="TextBox 99">
               <a:extLst>
                 <a:ext uri="{FF2B5EF4-FFF2-40B4-BE49-F238E27FC236}">
-                  <a16:creationId xmlns:a16="http://schemas.microsoft.com/office/drawing/2014/main" xmlns="" id="{B88448C8-D2A6-49B1-B1FD-3D31B70D6110}"/>
+                  <a16:creationId xmlns="" xmlns:a16="http://schemas.microsoft.com/office/drawing/2014/main" id="{B88448C8-D2A6-49B1-B1FD-3D31B70D6110}"/>
                 </a:ext>
               </a:extLst>
             </p:cNvPr>
@@ -9794,7 +9795,7 @@
             <p:cNvPr id="101" name="TextBox 100">
               <a:extLst>
                 <a:ext uri="{FF2B5EF4-FFF2-40B4-BE49-F238E27FC236}">
-                  <a16:creationId xmlns:a16="http://schemas.microsoft.com/office/drawing/2014/main" xmlns="" id="{9D4CDA77-EACB-4F55-A96F-C0829D4AD59E}"/>
+                  <a16:creationId xmlns="" xmlns:a16="http://schemas.microsoft.com/office/drawing/2014/main" id="{9D4CDA77-EACB-4F55-A96F-C0829D4AD59E}"/>
                 </a:ext>
               </a:extLst>
             </p:cNvPr>

</xml_diff>

<commit_message>
graphs with match method 2
</commit_message>
<xml_diff>
--- a/results.pptx
+++ b/results.pptx
@@ -201,7 +201,7 @@
           <a:p>
             <a:fld id="{8B9DAE71-14C6-43BF-8377-DCBB177C1E2D}" type="datetimeFigureOut">
               <a:rPr lang="en-US" smtClean="0"/>
-              <a:t>7/6/2019</a:t>
+              <a:t>8/28/2019</a:t>
             </a:fld>
             <a:endParaRPr lang="en-US"/>
           </a:p>
@@ -933,7 +933,7 @@
           <a:p>
             <a:fld id="{7BD11EC7-BF2A-4653-B12A-BDCEC9BF7A38}" type="datetimeFigureOut">
               <a:rPr lang="en-US" smtClean="0"/>
-              <a:t>7/6/2019</a:t>
+              <a:t>8/28/2019</a:t>
             </a:fld>
             <a:endParaRPr lang="en-US"/>
           </a:p>
@@ -1101,7 +1101,7 @@
           <a:p>
             <a:fld id="{7BD11EC7-BF2A-4653-B12A-BDCEC9BF7A38}" type="datetimeFigureOut">
               <a:rPr lang="en-US" smtClean="0"/>
-              <a:t>7/6/2019</a:t>
+              <a:t>8/28/2019</a:t>
             </a:fld>
             <a:endParaRPr lang="en-US"/>
           </a:p>
@@ -1279,7 +1279,7 @@
           <a:p>
             <a:fld id="{7BD11EC7-BF2A-4653-B12A-BDCEC9BF7A38}" type="datetimeFigureOut">
               <a:rPr lang="en-US" smtClean="0"/>
-              <a:t>7/6/2019</a:t>
+              <a:t>8/28/2019</a:t>
             </a:fld>
             <a:endParaRPr lang="en-US"/>
           </a:p>
@@ -1447,7 +1447,7 @@
           <a:p>
             <a:fld id="{7BD11EC7-BF2A-4653-B12A-BDCEC9BF7A38}" type="datetimeFigureOut">
               <a:rPr lang="en-US" smtClean="0"/>
-              <a:t>7/6/2019</a:t>
+              <a:t>8/28/2019</a:t>
             </a:fld>
             <a:endParaRPr lang="en-US"/>
           </a:p>
@@ -1692,7 +1692,7 @@
           <a:p>
             <a:fld id="{7BD11EC7-BF2A-4653-B12A-BDCEC9BF7A38}" type="datetimeFigureOut">
               <a:rPr lang="en-US" smtClean="0"/>
-              <a:t>7/6/2019</a:t>
+              <a:t>8/28/2019</a:t>
             </a:fld>
             <a:endParaRPr lang="en-US"/>
           </a:p>
@@ -1921,7 +1921,7 @@
           <a:p>
             <a:fld id="{7BD11EC7-BF2A-4653-B12A-BDCEC9BF7A38}" type="datetimeFigureOut">
               <a:rPr lang="en-US" smtClean="0"/>
-              <a:t>7/6/2019</a:t>
+              <a:t>8/28/2019</a:t>
             </a:fld>
             <a:endParaRPr lang="en-US"/>
           </a:p>
@@ -2285,7 +2285,7 @@
           <a:p>
             <a:fld id="{7BD11EC7-BF2A-4653-B12A-BDCEC9BF7A38}" type="datetimeFigureOut">
               <a:rPr lang="en-US" smtClean="0"/>
-              <a:t>7/6/2019</a:t>
+              <a:t>8/28/2019</a:t>
             </a:fld>
             <a:endParaRPr lang="en-US"/>
           </a:p>
@@ -2402,7 +2402,7 @@
           <a:p>
             <a:fld id="{7BD11EC7-BF2A-4653-B12A-BDCEC9BF7A38}" type="datetimeFigureOut">
               <a:rPr lang="en-US" smtClean="0"/>
-              <a:t>7/6/2019</a:t>
+              <a:t>8/28/2019</a:t>
             </a:fld>
             <a:endParaRPr lang="en-US"/>
           </a:p>
@@ -2497,7 +2497,7 @@
           <a:p>
             <a:fld id="{7BD11EC7-BF2A-4653-B12A-BDCEC9BF7A38}" type="datetimeFigureOut">
               <a:rPr lang="en-US" smtClean="0"/>
-              <a:t>7/6/2019</a:t>
+              <a:t>8/28/2019</a:t>
             </a:fld>
             <a:endParaRPr lang="en-US"/>
           </a:p>
@@ -2772,7 +2772,7 @@
           <a:p>
             <a:fld id="{7BD11EC7-BF2A-4653-B12A-BDCEC9BF7A38}" type="datetimeFigureOut">
               <a:rPr lang="en-US" smtClean="0"/>
-              <a:t>7/6/2019</a:t>
+              <a:t>8/28/2019</a:t>
             </a:fld>
             <a:endParaRPr lang="en-US"/>
           </a:p>
@@ -3024,7 +3024,7 @@
           <a:p>
             <a:fld id="{7BD11EC7-BF2A-4653-B12A-BDCEC9BF7A38}" type="datetimeFigureOut">
               <a:rPr lang="en-US" smtClean="0"/>
-              <a:t>7/6/2019</a:t>
+              <a:t>8/28/2019</a:t>
             </a:fld>
             <a:endParaRPr lang="en-US"/>
           </a:p>
@@ -3235,7 +3235,7 @@
           <a:p>
             <a:fld id="{7BD11EC7-BF2A-4653-B12A-BDCEC9BF7A38}" type="datetimeFigureOut">
               <a:rPr lang="en-US" smtClean="0"/>
-              <a:t>7/6/2019</a:t>
+              <a:t>8/28/2019</a:t>
             </a:fld>
             <a:endParaRPr lang="en-US"/>
           </a:p>
@@ -4448,7 +4448,7 @@
                       <a:schemeClr val="tx1"/>
                     </a:solidFill>
                   </a:rPr>
-                  <a:t>101</a:t>
+                  <a:t>112</a:t>
                 </a:r>
               </a:p>
             </p:txBody>
@@ -4477,7 +4477,7 @@
               <a:p>
                 <a:r>
                   <a:rPr lang="en-US" sz="1200" b="1" dirty="0"/>
-                  <a:t>126</a:t>
+                  <a:t>120</a:t>
                 </a:r>
                 <a:endParaRPr lang="en-US" sz="1200" b="1" dirty="0">
                   <a:solidFill>
@@ -4515,7 +4515,7 @@
                       <a:schemeClr val="tx1"/>
                     </a:solidFill>
                   </a:rPr>
-                  <a:t>15</a:t>
+                  <a:t>19</a:t>
                 </a:r>
               </a:p>
               <a:p>
@@ -4551,7 +4551,7 @@
               <a:p>
                 <a:r>
                   <a:rPr lang="en-US" sz="1200" b="1" dirty="0"/>
-                  <a:t>26</a:t>
+                  <a:t>24</a:t>
                 </a:r>
                 <a:endParaRPr lang="en-US" sz="1200" b="1" dirty="0">
                   <a:solidFill>
@@ -4595,7 +4595,7 @@
                       <a:schemeClr val="tx1"/>
                     </a:solidFill>
                   </a:rPr>
-                  <a:t>232</a:t>
+                  <a:t>200</a:t>
                 </a:r>
               </a:p>
             </p:txBody>
@@ -4638,7 +4638,7 @@
                 <a:pPr algn="ctr"/>
                 <a:r>
                   <a:rPr lang="en-US" sz="1100" b="1" dirty="0"/>
-                  <a:t>N=606</a:t>
+                  <a:t>N=584</a:t>
                 </a:r>
               </a:p>
             </p:txBody>
@@ -4732,13 +4732,14 @@
             <a:lstStyle/>
             <a:p>
               <a:r>
-                <a:rPr lang="en-US" sz="1200" b="1" dirty="0">
-                  <a:solidFill>
-                    <a:schemeClr val="tx1"/>
-                  </a:solidFill>
-                </a:rPr>
-                <a:t>23</a:t>
+                <a:rPr lang="en-US" sz="1200" b="1" dirty="0"/>
+                <a:t>19</a:t>
               </a:r>
+              <a:endParaRPr lang="en-US" sz="1200" b="1" dirty="0">
+                <a:solidFill>
+                  <a:schemeClr val="tx1"/>
+                </a:solidFill>
+              </a:endParaRPr>
             </a:p>
           </p:txBody>
         </p:sp>
@@ -4771,13 +4772,14 @@
             <a:lstStyle/>
             <a:p>
               <a:r>
-                <a:rPr lang="en-US" sz="1200" b="1" dirty="0">
-                  <a:solidFill>
-                    <a:schemeClr val="tx1"/>
-                  </a:solidFill>
-                </a:rPr>
-                <a:t>3</a:t>
+                <a:rPr lang="en-US" sz="1200" b="1" dirty="0"/>
+                <a:t>1</a:t>
               </a:r>
+              <a:endParaRPr lang="en-US" sz="1200" b="1" dirty="0">
+                <a:solidFill>
+                  <a:schemeClr val="tx1"/>
+                </a:solidFill>
+              </a:endParaRPr>
             </a:p>
           </p:txBody>
         </p:sp>
@@ -4810,13 +4812,14 @@
             <a:lstStyle/>
             <a:p>
               <a:r>
-                <a:rPr lang="en-US" sz="1200" b="1" dirty="0">
-                  <a:solidFill>
-                    <a:schemeClr val="tx1"/>
-                  </a:solidFill>
-                </a:rPr>
-                <a:t>79</a:t>
+                <a:rPr lang="en-US" sz="1200" b="1" dirty="0"/>
+                <a:t>87</a:t>
               </a:r>
+              <a:endParaRPr lang="en-US" sz="1200" b="1" dirty="0">
+                <a:solidFill>
+                  <a:schemeClr val="tx1"/>
+                </a:solidFill>
+              </a:endParaRPr>
             </a:p>
           </p:txBody>
         </p:sp>
@@ -4835,10 +4838,10 @@
         </p:nvGrpSpPr>
         <p:grpSpPr>
           <a:xfrm>
-            <a:off x="3674768" y="1015260"/>
-            <a:ext cx="1759932" cy="1694853"/>
-            <a:chOff x="2550818" y="588906"/>
-            <a:chExt cx="1759932" cy="1694853"/>
+            <a:off x="3728109" y="1015260"/>
+            <a:ext cx="1645244" cy="1694853"/>
+            <a:chOff x="2550819" y="588906"/>
+            <a:chExt cx="1645244" cy="1694853"/>
           </a:xfrm>
         </p:grpSpPr>
         <p:grpSp>
@@ -4855,18 +4858,18 @@
           </p:nvGrpSpPr>
           <p:grpSpPr>
             <a:xfrm>
-              <a:off x="2550818" y="588906"/>
-              <a:ext cx="1759932" cy="1694853"/>
+              <a:off x="2550819" y="588906"/>
+              <a:ext cx="1645244" cy="1694853"/>
               <a:chOff x="4352683" y="3022414"/>
-              <a:chExt cx="1979825" cy="1775449"/>
+              <a:chExt cx="1850807" cy="1775449"/>
             </a:xfrm>
           </p:grpSpPr>
           <p:grpSp>
             <p:nvGrpSpPr>
-              <p:cNvPr id="82" name="Group 81">
+              <p:cNvPr id="84" name="Group 83">
                 <a:extLst>
                   <a:ext uri="{FF2B5EF4-FFF2-40B4-BE49-F238E27FC236}">
-                    <a16:creationId xmlns:a16="http://schemas.microsoft.com/office/drawing/2014/main" id="{45235B47-2D23-40AB-930F-A57AD944434E}"/>
+                    <a16:creationId xmlns:a16="http://schemas.microsoft.com/office/drawing/2014/main" id="{813CE9B1-FE5C-4148-97F5-2C31F79DB8CC}"/>
                   </a:ext>
                 </a:extLst>
               </p:cNvPr>
@@ -4876,17 +4879,17 @@
             <p:grpSpPr>
               <a:xfrm>
                 <a:off x="4352683" y="3022414"/>
-                <a:ext cx="1979825" cy="1317103"/>
-                <a:chOff x="4352683" y="3022414"/>
-                <a:chExt cx="1979825" cy="1317103"/>
+                <a:ext cx="1850807" cy="1317102"/>
+                <a:chOff x="3570860" y="539394"/>
+                <a:chExt cx="2180305" cy="1670999"/>
               </a:xfrm>
             </p:grpSpPr>
             <p:grpSp>
               <p:nvGrpSpPr>
-                <p:cNvPr id="84" name="Group 83">
+                <p:cNvPr id="86" name="Group 85">
                   <a:extLst>
                     <a:ext uri="{FF2B5EF4-FFF2-40B4-BE49-F238E27FC236}">
-                      <a16:creationId xmlns:a16="http://schemas.microsoft.com/office/drawing/2014/main" id="{813CE9B1-FE5C-4148-97F5-2C31F79DB8CC}"/>
+                      <a16:creationId xmlns:a16="http://schemas.microsoft.com/office/drawing/2014/main" id="{CF1BDC8A-BAB3-4522-9F97-33C0FEF3C393}"/>
                     </a:ext>
                   </a:extLst>
                 </p:cNvPr>
@@ -4895,18 +4898,18 @@
               </p:nvGrpSpPr>
               <p:grpSpPr>
                 <a:xfrm>
-                  <a:off x="4352683" y="3022414"/>
-                  <a:ext cx="1850807" cy="1317103"/>
-                  <a:chOff x="3570860" y="539394"/>
-                  <a:chExt cx="2180305" cy="1670999"/>
+                  <a:off x="3570860" y="539394"/>
+                  <a:ext cx="2041854" cy="1670999"/>
+                  <a:chOff x="676213" y="586426"/>
+                  <a:chExt cx="2041854" cy="1670999"/>
                 </a:xfrm>
               </p:grpSpPr>
               <p:grpSp>
                 <p:nvGrpSpPr>
-                  <p:cNvPr id="86" name="Group 85">
+                  <p:cNvPr id="88" name="Group 87">
                     <a:extLst>
                       <a:ext uri="{FF2B5EF4-FFF2-40B4-BE49-F238E27FC236}">
-                        <a16:creationId xmlns:a16="http://schemas.microsoft.com/office/drawing/2014/main" id="{CF1BDC8A-BAB3-4522-9F97-33C0FEF3C393}"/>
+                        <a16:creationId xmlns:a16="http://schemas.microsoft.com/office/drawing/2014/main" id="{B06A5FD4-698F-42BF-BAD1-F3A1FD142E38}"/>
                       </a:ext>
                     </a:extLst>
                   </p:cNvPr>
@@ -4915,299 +4918,238 @@
                 </p:nvGrpSpPr>
                 <p:grpSpPr>
                   <a:xfrm>
-                    <a:off x="3570860" y="539394"/>
+                    <a:off x="676213" y="586426"/>
                     <a:ext cx="2041854" cy="1670999"/>
-                    <a:chOff x="676213" y="586426"/>
-                    <a:chExt cx="2041854" cy="1670999"/>
+                    <a:chOff x="723900" y="1562100"/>
+                    <a:chExt cx="2314471" cy="1800225"/>
                   </a:xfrm>
                 </p:grpSpPr>
-                <p:grpSp>
-                  <p:nvGrpSpPr>
-                    <p:cNvPr id="88" name="Group 87">
+                <p:sp>
+                  <p:nvSpPr>
+                    <p:cNvPr id="92" name="Oval 91">
                       <a:extLst>
                         <a:ext uri="{FF2B5EF4-FFF2-40B4-BE49-F238E27FC236}">
-                          <a16:creationId xmlns:a16="http://schemas.microsoft.com/office/drawing/2014/main" id="{B06A5FD4-698F-42BF-BAD1-F3A1FD142E38}"/>
+                          <a16:creationId xmlns:a16="http://schemas.microsoft.com/office/drawing/2014/main" id="{6FB8DF73-690F-48CC-9E6B-5C6C58035808}"/>
                         </a:ext>
                       </a:extLst>
                     </p:cNvPr>
-                    <p:cNvGrpSpPr/>
-                    <p:nvPr/>
-                  </p:nvGrpSpPr>
-                  <p:grpSpPr>
-                    <a:xfrm>
-                      <a:off x="676213" y="586426"/>
-                      <a:ext cx="2041854" cy="1670999"/>
-                      <a:chOff x="723900" y="1562100"/>
-                      <a:chExt cx="2314471" cy="1800225"/>
-                    </a:xfrm>
-                  </p:grpSpPr>
-                  <p:sp>
-                    <p:nvSpPr>
-                      <p:cNvPr id="92" name="Oval 91">
-                        <a:extLst>
-                          <a:ext uri="{FF2B5EF4-FFF2-40B4-BE49-F238E27FC236}">
-                            <a16:creationId xmlns:a16="http://schemas.microsoft.com/office/drawing/2014/main" id="{6FB8DF73-690F-48CC-9E6B-5C6C58035808}"/>
-                          </a:ext>
-                        </a:extLst>
-                      </p:cNvPr>
-                      <p:cNvSpPr/>
-                      <p:nvPr/>
-                    </p:nvSpPr>
-                    <p:spPr>
-                      <a:xfrm>
-                        <a:off x="723902" y="1562100"/>
-                        <a:ext cx="2314469" cy="1790701"/>
-                      </a:xfrm>
-                      <a:prstGeom prst="ellipse">
-                        <a:avLst/>
-                      </a:prstGeom>
-                      <a:solidFill>
-                        <a:srgbClr val="00B0F0">
-                          <a:alpha val="30196"/>
-                        </a:srgbClr>
-                      </a:solidFill>
-                      <a:ln w="19050">
-                        <a:solidFill>
-                          <a:schemeClr val="tx1"/>
-                        </a:solidFill>
-                        <a:prstDash val="sysDash"/>
-                      </a:ln>
-                    </p:spPr>
-                    <p:style>
-                      <a:lnRef idx="2">
-                        <a:schemeClr val="accent1">
-                          <a:shade val="50000"/>
-                        </a:schemeClr>
-                      </a:lnRef>
-                      <a:fillRef idx="1">
-                        <a:schemeClr val="accent1"/>
-                      </a:fillRef>
-                      <a:effectRef idx="0">
-                        <a:schemeClr val="accent1"/>
-                      </a:effectRef>
-                      <a:fontRef idx="minor">
-                        <a:schemeClr val="lt1"/>
-                      </a:fontRef>
-                    </p:style>
-                    <p:txBody>
-                      <a:bodyPr rtlCol="0" anchor="ctr"/>
-                      <a:lstStyle/>
-                      <a:p>
-                        <a:pPr algn="ctr"/>
-                        <a:endParaRPr lang="en-US" sz="1600"/>
-                      </a:p>
-                    </p:txBody>
-                  </p:sp>
-                  <p:sp>
-                    <p:nvSpPr>
-                      <p:cNvPr id="93" name="Oval 92">
-                        <a:extLst>
-                          <a:ext uri="{FF2B5EF4-FFF2-40B4-BE49-F238E27FC236}">
-                            <a16:creationId xmlns:a16="http://schemas.microsoft.com/office/drawing/2014/main" id="{8B9A1E3F-43ED-4A11-8278-6F517381E215}"/>
-                          </a:ext>
-                        </a:extLst>
-                      </p:cNvPr>
-                      <p:cNvSpPr/>
-                      <p:nvPr/>
-                    </p:nvSpPr>
-                    <p:spPr>
-                      <a:xfrm>
-                        <a:off x="723902" y="1571624"/>
-                        <a:ext cx="2003712" cy="1790701"/>
-                      </a:xfrm>
-                      <a:prstGeom prst="ellipse">
-                        <a:avLst/>
-                      </a:prstGeom>
-                      <a:solidFill>
-                        <a:srgbClr val="FF0000">
-                          <a:alpha val="30196"/>
-                        </a:srgbClr>
-                      </a:solidFill>
-                      <a:ln w="19050">
-                        <a:solidFill>
-                          <a:schemeClr val="tx1"/>
-                        </a:solidFill>
-                        <a:prstDash val="dash"/>
-                      </a:ln>
-                    </p:spPr>
-                    <p:style>
-                      <a:lnRef idx="2">
-                        <a:schemeClr val="accent1">
-                          <a:shade val="50000"/>
-                        </a:schemeClr>
-                      </a:lnRef>
-                      <a:fillRef idx="1">
-                        <a:schemeClr val="accent1"/>
-                      </a:fillRef>
-                      <a:effectRef idx="0">
-                        <a:schemeClr val="accent1"/>
-                      </a:effectRef>
-                      <a:fontRef idx="minor">
-                        <a:schemeClr val="lt1"/>
-                      </a:fontRef>
-                    </p:style>
-                    <p:txBody>
-                      <a:bodyPr rtlCol="0" anchor="ctr"/>
-                      <a:lstStyle/>
-                      <a:p>
-                        <a:pPr algn="ctr"/>
-                        <a:endParaRPr lang="en-US" sz="1600"/>
-                      </a:p>
-                    </p:txBody>
-                  </p:sp>
-                  <p:sp>
-                    <p:nvSpPr>
-                      <p:cNvPr id="94" name="Oval 93">
-                        <a:extLst>
-                          <a:ext uri="{FF2B5EF4-FFF2-40B4-BE49-F238E27FC236}">
-                            <a16:creationId xmlns:a16="http://schemas.microsoft.com/office/drawing/2014/main" id="{6C5F675E-E9ED-4257-A4B1-6967ACFAEEBD}"/>
-                          </a:ext>
-                        </a:extLst>
-                      </p:cNvPr>
-                      <p:cNvSpPr/>
-                      <p:nvPr/>
-                    </p:nvSpPr>
-                    <p:spPr>
-                      <a:xfrm>
-                        <a:off x="728790" y="1936375"/>
-                        <a:ext cx="1524871" cy="1296107"/>
-                      </a:xfrm>
-                      <a:prstGeom prst="ellipse">
-                        <a:avLst/>
-                      </a:prstGeom>
-                      <a:blipFill dpi="0" rotWithShape="1">
-                        <a:blip r:embed="rId3">
-                          <a:alphaModFix amt="53000"/>
-                        </a:blip>
-                        <a:srcRect/>
-                        <a:tile tx="0" ty="0" sx="100000" sy="100000" flip="none" algn="tl"/>
-                      </a:blipFill>
-                      <a:ln w="19050">
-                        <a:solidFill>
-                          <a:schemeClr val="tx1"/>
-                        </a:solidFill>
-                      </a:ln>
-                    </p:spPr>
-                    <p:style>
-                      <a:lnRef idx="2">
-                        <a:schemeClr val="accent1">
-                          <a:shade val="50000"/>
-                        </a:schemeClr>
-                      </a:lnRef>
-                      <a:fillRef idx="1">
-                        <a:schemeClr val="accent1"/>
-                      </a:fillRef>
-                      <a:effectRef idx="0">
-                        <a:schemeClr val="accent1"/>
-                      </a:effectRef>
-                      <a:fontRef idx="minor">
-                        <a:schemeClr val="lt1"/>
-                      </a:fontRef>
-                    </p:style>
-                    <p:txBody>
-                      <a:bodyPr rtlCol="0" anchor="ctr"/>
-                      <a:lstStyle/>
-                      <a:p>
-                        <a:pPr algn="ctr"/>
-                        <a:endParaRPr lang="en-US" sz="1600"/>
-                      </a:p>
-                    </p:txBody>
-                  </p:sp>
-                  <p:sp>
-                    <p:nvSpPr>
-                      <p:cNvPr id="95" name="Oval 94">
-                        <a:extLst>
-                          <a:ext uri="{FF2B5EF4-FFF2-40B4-BE49-F238E27FC236}">
-                            <a16:creationId xmlns:a16="http://schemas.microsoft.com/office/drawing/2014/main" id="{8B0019AD-26DD-4D55-B6F3-28C6FA61B22A}"/>
-                          </a:ext>
-                        </a:extLst>
-                      </p:cNvPr>
-                      <p:cNvSpPr/>
-                      <p:nvPr/>
-                    </p:nvSpPr>
-                    <p:spPr>
-                      <a:xfrm>
-                        <a:off x="723900" y="1936376"/>
-                        <a:ext cx="1529759" cy="1305633"/>
-                      </a:xfrm>
-                      <a:prstGeom prst="ellipse">
-                        <a:avLst/>
-                      </a:prstGeom>
-                      <a:solidFill>
-                        <a:srgbClr val="FFFF00">
-                          <a:alpha val="30196"/>
-                        </a:srgbClr>
-                      </a:solidFill>
-                      <a:ln w="19050">
-                        <a:solidFill>
-                          <a:schemeClr val="tx1"/>
-                        </a:solidFill>
-                        <a:prstDash val="sysDot"/>
-                      </a:ln>
-                    </p:spPr>
-                    <p:style>
-                      <a:lnRef idx="2">
-                        <a:schemeClr val="accent1">
-                          <a:shade val="50000"/>
-                        </a:schemeClr>
-                      </a:lnRef>
-                      <a:fillRef idx="1">
-                        <a:schemeClr val="accent1"/>
-                      </a:fillRef>
-                      <a:effectRef idx="0">
-                        <a:schemeClr val="accent1"/>
-                      </a:effectRef>
-                      <a:fontRef idx="minor">
-                        <a:schemeClr val="lt1"/>
-                      </a:fontRef>
-                    </p:style>
-                    <p:txBody>
-                      <a:bodyPr rtlCol="0" anchor="ctr"/>
-                      <a:lstStyle/>
-                      <a:p>
-                        <a:pPr algn="ctr"/>
-                        <a:endParaRPr lang="en-US" sz="1600" dirty="0">
-                          <a:solidFill>
-                            <a:schemeClr val="tx1"/>
-                          </a:solidFill>
-                        </a:endParaRPr>
-                      </a:p>
-                    </p:txBody>
-                  </p:sp>
-                </p:grpSp>
-                <p:sp>
-                  <p:nvSpPr>
-                    <p:cNvPr id="90" name="TextBox 89">
-                      <a:extLst>
-                        <a:ext uri="{FF2B5EF4-FFF2-40B4-BE49-F238E27FC236}">
-                          <a16:creationId xmlns:a16="http://schemas.microsoft.com/office/drawing/2014/main" id="{B5FCEA77-DB72-4B9B-896F-CAF0FBB8824F}"/>
-                        </a:ext>
-                      </a:extLst>
-                    </p:cNvPr>
-                    <p:cNvSpPr txBox="1"/>
+                    <p:cNvSpPr/>
                     <p:nvPr/>
                   </p:nvSpPr>
                   <p:spPr>
                     <a:xfrm>
-                      <a:off x="1970530" y="1175819"/>
-                      <a:ext cx="493456" cy="368138"/>
+                      <a:off x="723902" y="1562100"/>
+                      <a:ext cx="2314469" cy="1790701"/>
                     </a:xfrm>
-                    <a:prstGeom prst="rect">
+                    <a:prstGeom prst="ellipse">
                       <a:avLst/>
                     </a:prstGeom>
-                    <a:noFill/>
+                    <a:solidFill>
+                      <a:srgbClr val="00B0F0">
+                        <a:alpha val="30196"/>
+                      </a:srgbClr>
+                    </a:solidFill>
+                    <a:ln w="19050">
+                      <a:solidFill>
+                        <a:schemeClr val="tx1"/>
+                      </a:solidFill>
+                      <a:prstDash val="sysDash"/>
+                    </a:ln>
                   </p:spPr>
+                  <p:style>
+                    <a:lnRef idx="2">
+                      <a:schemeClr val="accent1">
+                        <a:shade val="50000"/>
+                      </a:schemeClr>
+                    </a:lnRef>
+                    <a:fillRef idx="1">
+                      <a:schemeClr val="accent1"/>
+                    </a:fillRef>
+                    <a:effectRef idx="0">
+                      <a:schemeClr val="accent1"/>
+                    </a:effectRef>
+                    <a:fontRef idx="minor">
+                      <a:schemeClr val="lt1"/>
+                    </a:fontRef>
+                  </p:style>
                   <p:txBody>
-                    <a:bodyPr wrap="square" rtlCol="0">
-                      <a:spAutoFit/>
-                    </a:bodyPr>
+                    <a:bodyPr rtlCol="0" anchor="ctr"/>
                     <a:lstStyle/>
                     <a:p>
-                      <a:r>
-                        <a:rPr lang="en-US" sz="1200" b="1" dirty="0"/>
-                        <a:t>51</a:t>
-                      </a:r>
-                      <a:endParaRPr lang="en-US" sz="1200" b="1" dirty="0">
+                      <a:pPr algn="ctr"/>
+                      <a:endParaRPr lang="en-US" sz="1600"/>
+                    </a:p>
+                  </p:txBody>
+                </p:sp>
+                <p:sp>
+                  <p:nvSpPr>
+                    <p:cNvPr id="93" name="Oval 92">
+                      <a:extLst>
+                        <a:ext uri="{FF2B5EF4-FFF2-40B4-BE49-F238E27FC236}">
+                          <a16:creationId xmlns:a16="http://schemas.microsoft.com/office/drawing/2014/main" id="{8B9A1E3F-43ED-4A11-8278-6F517381E215}"/>
+                        </a:ext>
+                      </a:extLst>
+                    </p:cNvPr>
+                    <p:cNvSpPr/>
+                    <p:nvPr/>
+                  </p:nvSpPr>
+                  <p:spPr>
+                    <a:xfrm>
+                      <a:off x="723902" y="1571624"/>
+                      <a:ext cx="2003712" cy="1790701"/>
+                    </a:xfrm>
+                    <a:prstGeom prst="ellipse">
+                      <a:avLst/>
+                    </a:prstGeom>
+                    <a:solidFill>
+                      <a:srgbClr val="FF0000">
+                        <a:alpha val="30196"/>
+                      </a:srgbClr>
+                    </a:solidFill>
+                    <a:ln w="19050">
+                      <a:solidFill>
+                        <a:schemeClr val="tx1"/>
+                      </a:solidFill>
+                      <a:prstDash val="dash"/>
+                    </a:ln>
+                  </p:spPr>
+                  <p:style>
+                    <a:lnRef idx="2">
+                      <a:schemeClr val="accent1">
+                        <a:shade val="50000"/>
+                      </a:schemeClr>
+                    </a:lnRef>
+                    <a:fillRef idx="1">
+                      <a:schemeClr val="accent1"/>
+                    </a:fillRef>
+                    <a:effectRef idx="0">
+                      <a:schemeClr val="accent1"/>
+                    </a:effectRef>
+                    <a:fontRef idx="minor">
+                      <a:schemeClr val="lt1"/>
+                    </a:fontRef>
+                  </p:style>
+                  <p:txBody>
+                    <a:bodyPr rtlCol="0" anchor="ctr"/>
+                    <a:lstStyle/>
+                    <a:p>
+                      <a:pPr algn="ctr"/>
+                      <a:endParaRPr lang="en-US" sz="1600"/>
+                    </a:p>
+                  </p:txBody>
+                </p:sp>
+                <p:sp>
+                  <p:nvSpPr>
+                    <p:cNvPr id="94" name="Oval 93">
+                      <a:extLst>
+                        <a:ext uri="{FF2B5EF4-FFF2-40B4-BE49-F238E27FC236}">
+                          <a16:creationId xmlns:a16="http://schemas.microsoft.com/office/drawing/2014/main" id="{6C5F675E-E9ED-4257-A4B1-6967ACFAEEBD}"/>
+                        </a:ext>
+                      </a:extLst>
+                    </p:cNvPr>
+                    <p:cNvSpPr/>
+                    <p:nvPr/>
+                  </p:nvSpPr>
+                  <p:spPr>
+                    <a:xfrm>
+                      <a:off x="728790" y="1936375"/>
+                      <a:ext cx="1524871" cy="1296107"/>
+                    </a:xfrm>
+                    <a:prstGeom prst="ellipse">
+                      <a:avLst/>
+                    </a:prstGeom>
+                    <a:blipFill dpi="0" rotWithShape="1">
+                      <a:blip r:embed="rId3">
+                        <a:alphaModFix amt="53000"/>
+                      </a:blip>
+                      <a:srcRect/>
+                      <a:tile tx="0" ty="0" sx="100000" sy="100000" flip="none" algn="tl"/>
+                    </a:blipFill>
+                    <a:ln w="19050">
+                      <a:solidFill>
+                        <a:schemeClr val="tx1"/>
+                      </a:solidFill>
+                    </a:ln>
+                  </p:spPr>
+                  <p:style>
+                    <a:lnRef idx="2">
+                      <a:schemeClr val="accent1">
+                        <a:shade val="50000"/>
+                      </a:schemeClr>
+                    </a:lnRef>
+                    <a:fillRef idx="1">
+                      <a:schemeClr val="accent1"/>
+                    </a:fillRef>
+                    <a:effectRef idx="0">
+                      <a:schemeClr val="accent1"/>
+                    </a:effectRef>
+                    <a:fontRef idx="minor">
+                      <a:schemeClr val="lt1"/>
+                    </a:fontRef>
+                  </p:style>
+                  <p:txBody>
+                    <a:bodyPr rtlCol="0" anchor="ctr"/>
+                    <a:lstStyle/>
+                    <a:p>
+                      <a:pPr algn="ctr"/>
+                      <a:endParaRPr lang="en-US" sz="1600"/>
+                    </a:p>
+                  </p:txBody>
+                </p:sp>
+                <p:sp>
+                  <p:nvSpPr>
+                    <p:cNvPr id="95" name="Oval 94">
+                      <a:extLst>
+                        <a:ext uri="{FF2B5EF4-FFF2-40B4-BE49-F238E27FC236}">
+                          <a16:creationId xmlns:a16="http://schemas.microsoft.com/office/drawing/2014/main" id="{8B0019AD-26DD-4D55-B6F3-28C6FA61B22A}"/>
+                        </a:ext>
+                      </a:extLst>
+                    </p:cNvPr>
+                    <p:cNvSpPr/>
+                    <p:nvPr/>
+                  </p:nvSpPr>
+                  <p:spPr>
+                    <a:xfrm>
+                      <a:off x="723900" y="1936376"/>
+                      <a:ext cx="1529759" cy="1305633"/>
+                    </a:xfrm>
+                    <a:prstGeom prst="ellipse">
+                      <a:avLst/>
+                    </a:prstGeom>
+                    <a:solidFill>
+                      <a:srgbClr val="FFFF00">
+                        <a:alpha val="30196"/>
+                      </a:srgbClr>
+                    </a:solidFill>
+                    <a:ln w="19050">
+                      <a:solidFill>
+                        <a:schemeClr val="tx1"/>
+                      </a:solidFill>
+                      <a:prstDash val="sysDot"/>
+                    </a:ln>
+                  </p:spPr>
+                  <p:style>
+                    <a:lnRef idx="2">
+                      <a:schemeClr val="accent1">
+                        <a:shade val="50000"/>
+                      </a:schemeClr>
+                    </a:lnRef>
+                    <a:fillRef idx="1">
+                      <a:schemeClr val="accent1"/>
+                    </a:fillRef>
+                    <a:effectRef idx="0">
+                      <a:schemeClr val="accent1"/>
+                    </a:effectRef>
+                    <a:fontRef idx="minor">
+                      <a:schemeClr val="lt1"/>
+                    </a:fontRef>
+                  </p:style>
+                  <p:txBody>
+                    <a:bodyPr rtlCol="0" anchor="ctr"/>
+                    <a:lstStyle/>
+                    <a:p>
+                      <a:pPr algn="ctr"/>
+                      <a:endParaRPr lang="en-US" sz="1600" dirty="0">
                         <a:solidFill>
                           <a:schemeClr val="tx1"/>
                         </a:solidFill>
@@ -5218,10 +5160,10 @@
               </p:grpSp>
               <p:sp>
                 <p:nvSpPr>
-                  <p:cNvPr id="87" name="TextBox 86">
+                  <p:cNvPr id="90" name="TextBox 89">
                     <a:extLst>
                       <a:ext uri="{FF2B5EF4-FFF2-40B4-BE49-F238E27FC236}">
-                        <a16:creationId xmlns:a16="http://schemas.microsoft.com/office/drawing/2014/main" id="{E08231CB-4975-45E2-90E2-711E4C0623A6}"/>
+                        <a16:creationId xmlns:a16="http://schemas.microsoft.com/office/drawing/2014/main" id="{B5FCEA77-DB72-4B9B-896F-CAF0FBB8824F}"/>
                       </a:ext>
                     </a:extLst>
                   </p:cNvPr>
@@ -5230,8 +5172,8 @@
                 </p:nvSpPr>
                 <p:spPr>
                   <a:xfrm>
-                    <a:off x="5238390" y="1078369"/>
-                    <a:ext cx="512775" cy="368138"/>
+                    <a:off x="1970530" y="1175819"/>
+                    <a:ext cx="493456" cy="368138"/>
                   </a:xfrm>
                   <a:prstGeom prst="rect">
                     <a:avLst/>
@@ -5250,7 +5192,7 @@
                           <a:schemeClr val="tx1"/>
                         </a:solidFill>
                       </a:rPr>
-                      <a:t>10</a:t>
+                      <a:t>46</a:t>
                     </a:r>
                   </a:p>
                 </p:txBody>
@@ -5258,10 +5200,10 @@
             </p:grpSp>
             <p:sp>
               <p:nvSpPr>
-                <p:cNvPr id="85" name="TextBox 84">
+                <p:cNvPr id="87" name="TextBox 86">
                   <a:extLst>
                     <a:ext uri="{FF2B5EF4-FFF2-40B4-BE49-F238E27FC236}">
-                      <a16:creationId xmlns:a16="http://schemas.microsoft.com/office/drawing/2014/main" id="{886800C3-39F3-4CA3-982B-091775F9BEF2}"/>
+                      <a16:creationId xmlns:a16="http://schemas.microsoft.com/office/drawing/2014/main" id="{E08231CB-4975-45E2-90E2-711E4C0623A6}"/>
                     </a:ext>
                   </a:extLst>
                 </p:cNvPr>
@@ -5270,8 +5212,8 @@
               </p:nvSpPr>
               <p:spPr>
                 <a:xfrm>
-                  <a:off x="6065424" y="3401306"/>
-                  <a:ext cx="267084" cy="276999"/>
+                  <a:off x="5238390" y="1078369"/>
+                  <a:ext cx="512775" cy="368138"/>
                 </a:xfrm>
                 <a:prstGeom prst="rect">
                   <a:avLst/>
@@ -5290,7 +5232,7 @@
                         <a:schemeClr val="tx1"/>
                       </a:solidFill>
                     </a:rPr>
-                    <a:t>2</a:t>
+                    <a:t>17</a:t>
                   </a:r>
                 </a:p>
               </p:txBody>
@@ -5334,7 +5276,7 @@
                 <a:pPr algn="ctr"/>
                 <a:r>
                   <a:rPr lang="en-US" sz="1100" b="1" dirty="0"/>
-                  <a:t>N=143</a:t>
+                  <a:t>N=135</a:t>
                 </a:r>
               </a:p>
             </p:txBody>
@@ -5433,7 +5375,7 @@
                     <a:schemeClr val="tx1"/>
                   </a:solidFill>
                 </a:rPr>
-                <a:t>37</a:t>
+                <a:t>32</a:t>
               </a:r>
             </a:p>
           </p:txBody>
@@ -5467,13 +5409,14 @@
             <a:lstStyle/>
             <a:p>
               <a:r>
-                <a:rPr lang="en-US" sz="1200" b="1" dirty="0">
-                  <a:solidFill>
-                    <a:schemeClr val="tx1"/>
-                  </a:solidFill>
-                </a:rPr>
-                <a:t>6</a:t>
+                <a:rPr lang="en-US" sz="1200" b="1" dirty="0"/>
+                <a:t>1</a:t>
               </a:r>
+              <a:endParaRPr lang="en-US" sz="1200" b="1" dirty="0">
+                <a:solidFill>
+                  <a:schemeClr val="tx1"/>
+                </a:solidFill>
+              </a:endParaRPr>
             </a:p>
           </p:txBody>
         </p:sp>
@@ -5511,7 +5454,7 @@
                     <a:schemeClr val="tx1"/>
                   </a:solidFill>
                 </a:rPr>
-                <a:t>36</a:t>
+                <a:t>38</a:t>
               </a:r>
             </a:p>
           </p:txBody>
@@ -5881,7 +5824,7 @@
                   <a:p>
                     <a:r>
                       <a:rPr lang="en-US" sz="1200" b="1" dirty="0"/>
-                      <a:t>25</a:t>
+                      <a:t>35</a:t>
                     </a:r>
                     <a:endParaRPr lang="en-US" sz="1200" b="1" dirty="0">
                       <a:solidFill>
@@ -5921,13 +5864,14 @@
                 <a:lstStyle/>
                 <a:p>
                   <a:r>
-                    <a:rPr lang="en-US" sz="1200" b="1" dirty="0">
-                      <a:solidFill>
-                        <a:schemeClr val="tx1"/>
-                      </a:solidFill>
-                    </a:rPr>
-                    <a:t>6</a:t>
+                    <a:rPr lang="en-US" sz="1200" b="1" dirty="0"/>
+                    <a:t>9</a:t>
                   </a:r>
+                  <a:endParaRPr lang="en-US" sz="1200" b="1" dirty="0">
+                    <a:solidFill>
+                      <a:schemeClr val="tx1"/>
+                    </a:solidFill>
+                  </a:endParaRPr>
                 </a:p>
               </p:txBody>
             </p:sp>
@@ -5970,7 +5914,7 @@
                 <a:pPr algn="ctr"/>
                 <a:r>
                   <a:rPr lang="en-US" sz="1100" b="1" dirty="0"/>
-                  <a:t>N=149</a:t>
+                  <a:t>N=169</a:t>
                 </a:r>
               </a:p>
             </p:txBody>
@@ -6064,13 +6008,14 @@
             <a:lstStyle/>
             <a:p>
               <a:r>
-                <a:rPr lang="en-US" sz="1200" b="1" dirty="0">
-                  <a:solidFill>
-                    <a:schemeClr val="tx1"/>
-                  </a:solidFill>
-                </a:rPr>
-                <a:t>83</a:t>
+                <a:rPr lang="en-US" sz="1200" b="1" dirty="0"/>
+                <a:t>76</a:t>
               </a:r>
+              <a:endParaRPr lang="en-US" sz="1200" b="1" dirty="0">
+                <a:solidFill>
+                  <a:schemeClr val="tx1"/>
+                </a:solidFill>
+              </a:endParaRPr>
             </a:p>
           </p:txBody>
         </p:sp>
@@ -6088,7 +6033,7 @@
           </p:nvSpPr>
           <p:spPr>
             <a:xfrm>
-              <a:off x="2705278" y="672788"/>
+              <a:off x="2712898" y="710888"/>
               <a:ext cx="339800" cy="276999"/>
             </a:xfrm>
             <a:prstGeom prst="rect">
@@ -6103,13 +6048,14 @@
             <a:lstStyle/>
             <a:p>
               <a:r>
-                <a:rPr lang="en-US" sz="1200" b="1" dirty="0">
-                  <a:solidFill>
-                    <a:schemeClr val="tx1"/>
-                  </a:solidFill>
-                </a:rPr>
-                <a:t>10</a:t>
+                <a:rPr lang="en-US" sz="1200" b="1" dirty="0"/>
+                <a:t>9</a:t>
               </a:r>
+              <a:endParaRPr lang="en-US" sz="1200" b="1" dirty="0">
+                <a:solidFill>
+                  <a:schemeClr val="tx1"/>
+                </a:solidFill>
+              </a:endParaRPr>
             </a:p>
           </p:txBody>
         </p:sp>
@@ -6142,13 +6088,14 @@
             <a:lstStyle/>
             <a:p>
               <a:r>
-                <a:rPr lang="en-US" sz="1200" b="1" dirty="0">
-                  <a:solidFill>
-                    <a:schemeClr val="tx1"/>
-                  </a:solidFill>
-                </a:rPr>
-                <a:t>25</a:t>
+                <a:rPr lang="en-US" sz="1200" b="1" dirty="0"/>
+                <a:t>40</a:t>
               </a:r>
+              <a:endParaRPr lang="en-US" sz="1200" b="1" dirty="0">
+                <a:solidFill>
+                  <a:schemeClr val="tx1"/>
+                </a:solidFill>
+              </a:endParaRPr>
             </a:p>
           </p:txBody>
         </p:sp>
@@ -6167,10 +6114,10 @@
         </p:nvGrpSpPr>
         <p:grpSpPr>
           <a:xfrm>
-            <a:off x="7816268" y="612662"/>
-            <a:ext cx="2162373" cy="2097451"/>
-            <a:chOff x="9894462" y="412088"/>
-            <a:chExt cx="2162373" cy="2097451"/>
+            <a:off x="7760171" y="616974"/>
+            <a:ext cx="2162374" cy="2093139"/>
+            <a:chOff x="9838365" y="416400"/>
+            <a:chExt cx="2162374" cy="2093139"/>
           </a:xfrm>
         </p:grpSpPr>
         <p:grpSp>
@@ -6188,9 +6135,9 @@
           <p:grpSpPr>
             <a:xfrm>
               <a:off x="9894462" y="416400"/>
-              <a:ext cx="2162373" cy="2093139"/>
+              <a:ext cx="2106277" cy="2093139"/>
               <a:chOff x="2419395" y="150691"/>
-              <a:chExt cx="2432545" cy="2192674"/>
+              <a:chExt cx="2369440" cy="2192674"/>
             </a:xfrm>
           </p:grpSpPr>
           <p:grpSp>
@@ -6208,9 +6155,9 @@
             <p:grpSpPr>
               <a:xfrm>
                 <a:off x="2419395" y="150691"/>
-                <a:ext cx="2432545" cy="1743075"/>
+                <a:ext cx="2369440" cy="1743075"/>
                 <a:chOff x="676213" y="586426"/>
-                <a:chExt cx="2195538" cy="1670999"/>
+                <a:chExt cx="2138581" cy="1670999"/>
               </a:xfrm>
             </p:grpSpPr>
             <p:grpSp>
@@ -6419,8 +6366,8 @@
                 </p:nvSpPr>
                 <p:spPr>
                   <a:xfrm>
-                    <a:off x="743390" y="1807700"/>
-                    <a:ext cx="1948535" cy="1545101"/>
+                    <a:off x="939352" y="1808150"/>
+                    <a:ext cx="2044711" cy="1545101"/>
                   </a:xfrm>
                   <a:prstGeom prst="ellipse">
                     <a:avLst/>
@@ -6481,7 +6428,7 @@
               </p:nvSpPr>
               <p:spPr>
                 <a:xfrm>
-                  <a:off x="2597681" y="1236105"/>
+                  <a:off x="2326733" y="777310"/>
                   <a:ext cx="274070" cy="278173"/>
                 </a:xfrm>
                 <a:prstGeom prst="rect">
@@ -6546,7 +6493,7 @@
                 <a:pPr algn="ctr"/>
                 <a:r>
                   <a:rPr lang="en-US" sz="1100" b="1" dirty="0"/>
-                  <a:t>N=338</a:t>
+                  <a:t>N=342</a:t>
                 </a:r>
               </a:p>
             </p:txBody>
@@ -6566,10 +6513,10 @@
           </p:nvGrpSpPr>
           <p:grpSpPr>
             <a:xfrm>
-              <a:off x="9908771" y="412088"/>
-              <a:ext cx="1963005" cy="1675367"/>
-              <a:chOff x="9908771" y="412088"/>
-              <a:chExt cx="1963005" cy="1675367"/>
+              <a:off x="9838365" y="472462"/>
+              <a:ext cx="1892442" cy="1614993"/>
+              <a:chOff x="9838365" y="472462"/>
+              <a:chExt cx="1892442" cy="1614993"/>
             </a:xfrm>
           </p:grpSpPr>
           <p:sp>
@@ -6586,8 +6533,8 @@
             </p:nvSpPr>
             <p:spPr>
               <a:xfrm>
-                <a:off x="9908771" y="476250"/>
-                <a:ext cx="1944727" cy="1611205"/>
+                <a:off x="9903494" y="476250"/>
+                <a:ext cx="1827313" cy="1611205"/>
               </a:xfrm>
               <a:prstGeom prst="ellipse">
                 <a:avLst/>
@@ -6660,16 +6607,12 @@
               <a:lstStyle/>
               <a:p>
                 <a:r>
-                  <a:rPr lang="en-US" sz="1200" b="1" dirty="0"/>
-                  <a:t>2</a:t>
-                </a:r>
-                <a:r>
                   <a:rPr lang="en-US" sz="1200" b="1" dirty="0">
                     <a:solidFill>
                       <a:schemeClr val="tx1"/>
                     </a:solidFill>
                   </a:rPr>
-                  <a:t>95</a:t>
+                  <a:t>301</a:t>
                 </a:r>
               </a:p>
             </p:txBody>
@@ -6688,7 +6631,7 @@
             </p:nvSpPr>
             <p:spPr>
               <a:xfrm>
-                <a:off x="11523131" y="1074649"/>
+                <a:off x="9838365" y="1196523"/>
                 <a:ext cx="348645" cy="276999"/>
               </a:xfrm>
               <a:prstGeom prst="rect">
@@ -6708,7 +6651,7 @@
                       <a:schemeClr val="tx1"/>
                     </a:solidFill>
                   </a:rPr>
-                  <a:t>21</a:t>
+                  <a:t>23</a:t>
                 </a:r>
               </a:p>
             </p:txBody>
@@ -6727,7 +6670,7 @@
             </p:nvSpPr>
             <p:spPr>
               <a:xfrm>
-                <a:off x="10639182" y="412088"/>
+                <a:off x="10339178" y="472462"/>
                 <a:ext cx="348645" cy="276999"/>
               </a:xfrm>
               <a:prstGeom prst="rect">
@@ -6742,24 +6685,64 @@
               <a:lstStyle/>
               <a:p>
                 <a:r>
-                  <a:rPr lang="en-US" sz="1200" b="1" dirty="0">
-                    <a:solidFill>
-                      <a:schemeClr val="tx1"/>
-                    </a:solidFill>
-                  </a:rPr>
-                  <a:t>10</a:t>
+                  <a:rPr lang="en-US" sz="1200" b="1" dirty="0"/>
+                  <a:t>7</a:t>
                 </a:r>
+                <a:endParaRPr lang="en-US" sz="1200" b="1" dirty="0">
+                  <a:solidFill>
+                    <a:schemeClr val="tx1"/>
+                  </a:solidFill>
+                </a:endParaRPr>
               </a:p>
             </p:txBody>
           </p:sp>
         </p:grpSp>
       </p:grpSp>
+      <p:sp>
+        <p:nvSpPr>
+          <p:cNvPr id="78" name="TextBox 77">
+            <a:extLst>
+              <a:ext uri="{FF2B5EF4-FFF2-40B4-BE49-F238E27FC236}">
+                <a16:creationId xmlns:a16="http://schemas.microsoft.com/office/drawing/2014/main" id="{B7F2D50F-6E0E-4902-A9D7-E48E7D59A4D0}"/>
+              </a:ext>
+            </a:extLst>
+          </p:cNvPr>
+          <p:cNvSpPr txBox="1"/>
+          <p:nvPr/>
+        </p:nvSpPr>
+        <p:spPr>
+          <a:xfrm>
+            <a:off x="9575076" y="1482646"/>
+            <a:ext cx="348645" cy="276999"/>
+          </a:xfrm>
+          <a:prstGeom prst="rect">
+            <a:avLst/>
+          </a:prstGeom>
+          <a:noFill/>
+        </p:spPr>
+        <p:txBody>
+          <a:bodyPr wrap="square" rtlCol="0">
+            <a:spAutoFit/>
+          </a:bodyPr>
+          <a:lstStyle/>
+          <a:p>
+            <a:r>
+              <a:rPr lang="en-US" sz="1200" b="1" dirty="0">
+                <a:solidFill>
+                  <a:schemeClr val="tx1"/>
+                </a:solidFill>
+              </a:rPr>
+              <a:t>6</a:t>
+            </a:r>
+          </a:p>
+        </p:txBody>
+      </p:sp>
       <p:pic>
         <p:nvPicPr>
-          <p:cNvPr id="167" name="Picture 166">
+          <p:cNvPr id="8" name="Picture 7" descr="A close up of a map&#10;&#10;Description automatically generated">
             <a:extLst>
               <a:ext uri="{FF2B5EF4-FFF2-40B4-BE49-F238E27FC236}">
-                <a16:creationId xmlns:a16="http://schemas.microsoft.com/office/drawing/2014/main" id="{8EEBAA4F-A445-4481-8D5B-76BDC5C76074}"/>
+                <a16:creationId xmlns:a16="http://schemas.microsoft.com/office/drawing/2014/main" id="{0F29A6EE-1886-418B-A6B5-323E8D37223A}"/>
               </a:ext>
             </a:extLst>
           </p:cNvPr>
@@ -6776,13 +6759,13 @@
               </a:ext>
             </a:extLst>
           </a:blip>
-          <a:srcRect r="9797"/>
+          <a:srcRect l="1095" r="15549"/>
           <a:stretch/>
         </p:blipFill>
         <p:spPr>
           <a:xfrm>
-            <a:off x="381833" y="2930666"/>
-            <a:ext cx="9952791" cy="3754208"/>
+            <a:off x="0" y="2643192"/>
+            <a:ext cx="10447020" cy="4143953"/>
           </a:xfrm>
           <a:prstGeom prst="rect">
             <a:avLst/>
@@ -6839,10 +6822,10 @@
         </p:nvGrpSpPr>
         <p:grpSpPr>
           <a:xfrm>
-            <a:off x="989447" y="600603"/>
-            <a:ext cx="2395539" cy="2139648"/>
-            <a:chOff x="31451" y="233073"/>
-            <a:chExt cx="2927630" cy="2259528"/>
+            <a:off x="920867" y="579817"/>
+            <a:ext cx="2397284" cy="2183296"/>
+            <a:chOff x="31451" y="211122"/>
+            <a:chExt cx="2929762" cy="2305622"/>
           </a:xfrm>
         </p:grpSpPr>
         <p:grpSp>
@@ -6853,10 +6836,10 @@
           </p:nvGrpSpPr>
           <p:grpSpPr>
             <a:xfrm>
-              <a:off x="31451" y="233073"/>
-              <a:ext cx="2927630" cy="2259528"/>
-              <a:chOff x="61060" y="233073"/>
-              <a:chExt cx="2927630" cy="2259528"/>
+              <a:off x="31451" y="211122"/>
+              <a:ext cx="2929762" cy="2305622"/>
+              <a:chOff x="61060" y="211122"/>
+              <a:chExt cx="2929762" cy="2305622"/>
             </a:xfrm>
           </p:grpSpPr>
           <p:grpSp>
@@ -6873,10 +6856,10 @@
             </p:nvGrpSpPr>
             <p:grpSpPr>
               <a:xfrm>
-                <a:off x="61060" y="233073"/>
-                <a:ext cx="2927630" cy="2259528"/>
-                <a:chOff x="5425176" y="2538070"/>
-                <a:chExt cx="2894931" cy="2273665"/>
+                <a:off x="61060" y="211122"/>
+                <a:ext cx="2929762" cy="2305622"/>
+                <a:chOff x="5425176" y="2515981"/>
+                <a:chExt cx="2897039" cy="2320047"/>
               </a:xfrm>
             </p:grpSpPr>
             <p:grpSp>
@@ -6893,10 +6876,10 @@
               </p:nvGrpSpPr>
               <p:grpSpPr>
                 <a:xfrm>
-                  <a:off x="5425176" y="2538070"/>
-                  <a:ext cx="2894931" cy="1867619"/>
-                  <a:chOff x="5310876" y="2538070"/>
-                  <a:chExt cx="2894931" cy="1867619"/>
+                  <a:off x="5425176" y="2515981"/>
+                  <a:ext cx="2897039" cy="1889708"/>
+                  <a:chOff x="5310876" y="2515981"/>
+                  <a:chExt cx="2897039" cy="1889708"/>
                 </a:xfrm>
               </p:grpSpPr>
               <p:grpSp>
@@ -6907,10 +6890,10 @@
                 </p:nvGrpSpPr>
                 <p:grpSpPr>
                   <a:xfrm>
-                    <a:off x="5807177" y="2538070"/>
-                    <a:ext cx="2398630" cy="1867619"/>
-                    <a:chOff x="3570380" y="2939340"/>
-                    <a:chExt cx="2398630" cy="1867619"/>
+                    <a:off x="5807177" y="2515981"/>
+                    <a:ext cx="2400738" cy="1889708"/>
+                    <a:chOff x="3570380" y="2917251"/>
+                    <a:chExt cx="2400738" cy="1889708"/>
                   </a:xfrm>
                 </p:grpSpPr>
                 <p:grpSp>
@@ -6921,10 +6904,10 @@
                   </p:nvGrpSpPr>
                   <p:grpSpPr>
                     <a:xfrm>
-                      <a:off x="3570380" y="2939340"/>
-                      <a:ext cx="2398630" cy="1867619"/>
-                      <a:chOff x="3570380" y="2939340"/>
-                      <a:chExt cx="2398630" cy="1867619"/>
+                      <a:off x="3570380" y="2917251"/>
+                      <a:ext cx="2400738" cy="1889708"/>
+                      <a:chOff x="3570380" y="2917251"/>
+                      <a:chExt cx="2400738" cy="1889708"/>
                     </a:xfrm>
                   </p:grpSpPr>
                   <p:grpSp>
@@ -6935,10 +6918,10 @@
                     </p:nvGrpSpPr>
                     <p:grpSpPr>
                       <a:xfrm>
-                        <a:off x="3570380" y="2939340"/>
-                        <a:ext cx="2398630" cy="1867619"/>
-                        <a:chOff x="691408" y="1802628"/>
-                        <a:chExt cx="2398630" cy="1867619"/>
+                        <a:off x="3570380" y="2917251"/>
+                        <a:ext cx="2400738" cy="1889708"/>
+                        <a:chOff x="691408" y="1780539"/>
+                        <a:chExt cx="2400738" cy="1889708"/>
                       </a:xfrm>
                     </p:grpSpPr>
                     <p:sp>
@@ -6949,8 +6932,8 @@
                       </p:nvSpPr>
                       <p:spPr>
                         <a:xfrm rot="21381444">
-                          <a:off x="732006" y="1802628"/>
-                          <a:ext cx="2335907" cy="1538298"/>
+                          <a:off x="731206" y="1780539"/>
+                          <a:ext cx="2360940" cy="1559709"/>
                         </a:xfrm>
                         <a:prstGeom prst="ellipse">
                           <a:avLst/>
@@ -7155,8 +7138,8 @@
                     </p:nvSpPr>
                     <p:spPr>
                       <a:xfrm>
-                        <a:off x="5438766" y="3656186"/>
-                        <a:ext cx="337943" cy="278732"/>
+                        <a:off x="5438767" y="3656186"/>
+                        <a:ext cx="413006" cy="294349"/>
                       </a:xfrm>
                       <a:prstGeom prst="rect">
                         <a:avLst/>
@@ -7175,7 +7158,7 @@
                               <a:schemeClr val="tx1"/>
                             </a:solidFill>
                           </a:rPr>
-                          <a:t>80</a:t>
+                          <a:t>88</a:t>
                         </a:r>
                       </a:p>
                     </p:txBody>
@@ -7189,7 +7172,7 @@
                     <p:spPr>
                       <a:xfrm>
                         <a:off x="4870046" y="4460506"/>
-                        <a:ext cx="337943" cy="278732"/>
+                        <a:ext cx="413006" cy="294349"/>
                       </a:xfrm>
                       <a:prstGeom prst="rect">
                         <a:avLst/>
@@ -7203,13 +7186,14 @@
                       <a:lstStyle/>
                       <a:p>
                         <a:r>
-                          <a:rPr lang="en-US" sz="1200" b="1" dirty="0">
-                            <a:solidFill>
-                              <a:schemeClr val="tx1"/>
-                            </a:solidFill>
-                          </a:rPr>
-                          <a:t>83</a:t>
+                          <a:rPr lang="en-US" sz="1200" b="1" dirty="0"/>
+                          <a:t>75</a:t>
                         </a:r>
+                        <a:endParaRPr lang="en-US" sz="1200" b="1" dirty="0">
+                          <a:solidFill>
+                            <a:schemeClr val="tx1"/>
+                          </a:solidFill>
+                        </a:endParaRPr>
                       </a:p>
                     </p:txBody>
                   </p:sp>
@@ -7221,8 +7205,8 @@
                     </p:nvSpPr>
                     <p:spPr>
                       <a:xfrm>
-                        <a:off x="5348357" y="3036617"/>
-                        <a:ext cx="389754" cy="302949"/>
+                        <a:off x="5357566" y="3028519"/>
+                        <a:ext cx="413006" cy="294349"/>
                       </a:xfrm>
                       <a:prstGeom prst="rect">
                         <a:avLst/>
@@ -7236,13 +7220,14 @@
                       <a:lstStyle/>
                       <a:p>
                         <a:r>
-                          <a:rPr lang="en-US" sz="1200" b="1" dirty="0">
-                            <a:solidFill>
-                              <a:schemeClr val="tx1"/>
-                            </a:solidFill>
-                          </a:rPr>
-                          <a:t>15</a:t>
+                          <a:rPr lang="en-US" sz="1200" b="1" dirty="0"/>
+                          <a:t>29</a:t>
                         </a:r>
+                        <a:endParaRPr lang="en-US" sz="1200" b="1" dirty="0">
+                          <a:solidFill>
+                            <a:schemeClr val="tx1"/>
+                          </a:solidFill>
+                        </a:endParaRPr>
                       </a:p>
                     </p:txBody>
                   </p:sp>
@@ -7256,7 +7241,7 @@
                   <p:spPr>
                     <a:xfrm>
                       <a:off x="4004461" y="4311454"/>
-                      <a:ext cx="337943" cy="278732"/>
+                      <a:ext cx="413006" cy="294349"/>
                     </a:xfrm>
                     <a:prstGeom prst="rect">
                       <a:avLst/>
@@ -7275,7 +7260,7 @@
                             <a:schemeClr val="tx1"/>
                           </a:solidFill>
                         </a:rPr>
-                        <a:t>15</a:t>
+                        <a:t>13</a:t>
                       </a:r>
                     </a:p>
                   </p:txBody>
@@ -7296,7 +7281,7 @@
                 <p:spPr>
                   <a:xfrm>
                     <a:off x="5310876" y="3243243"/>
-                    <a:ext cx="479333" cy="302949"/>
+                    <a:ext cx="507929" cy="294349"/>
                   </a:xfrm>
                   <a:prstGeom prst="rect">
                     <a:avLst/>
@@ -7315,7 +7300,7 @@
                           <a:schemeClr val="tx1"/>
                         </a:solidFill>
                       </a:rPr>
-                      <a:t>161</a:t>
+                      <a:t>146</a:t>
                     </a:r>
                   </a:p>
                 </p:txBody>
@@ -7336,7 +7321,7 @@
               <p:spPr>
                 <a:xfrm>
                   <a:off x="6797439" y="4378152"/>
-                  <a:ext cx="680220" cy="433583"/>
+                  <a:ext cx="680220" cy="457876"/>
                 </a:xfrm>
                 <a:prstGeom prst="rect">
                   <a:avLst/>
@@ -7359,7 +7344,7 @@
                   <a:pPr algn="ctr"/>
                   <a:r>
                     <a:rPr lang="en-US" sz="1100" b="1" dirty="0"/>
-                    <a:t>N=485</a:t>
+                    <a:t>N=490</a:t>
                   </a:r>
                 </a:p>
               </p:txBody>
@@ -7441,7 +7426,7 @@
               <p:spPr>
                 <a:xfrm>
                   <a:off x="536516" y="2703627"/>
-                  <a:ext cx="394156" cy="301065"/>
+                  <a:ext cx="472092" cy="312278"/>
                 </a:xfrm>
                 <a:prstGeom prst="rect">
                   <a:avLst/>
@@ -7455,13 +7440,14 @@
                 <a:lstStyle/>
                 <a:p>
                   <a:r>
-                    <a:rPr lang="en-US" sz="1200" b="1" dirty="0">
-                      <a:solidFill>
-                        <a:schemeClr val="tx1"/>
-                      </a:solidFill>
-                    </a:rPr>
-                    <a:t>73</a:t>
+                    <a:rPr lang="en-US" sz="1200" b="1" dirty="0"/>
+                    <a:t>68</a:t>
                   </a:r>
+                  <a:endParaRPr lang="en-US" sz="1200" b="1" dirty="0">
+                    <a:solidFill>
+                      <a:schemeClr val="tx1"/>
+                    </a:solidFill>
+                  </a:endParaRPr>
                 </a:p>
               </p:txBody>
             </p:sp>
@@ -7475,8 +7461,8 @@
           </p:nvSpPr>
           <p:spPr>
             <a:xfrm>
-              <a:off x="1844508" y="945463"/>
-              <a:ext cx="341760" cy="276999"/>
+              <a:off x="1844507" y="945463"/>
+              <a:ext cx="417671" cy="292519"/>
             </a:xfrm>
             <a:prstGeom prst="rect">
               <a:avLst/>
@@ -7490,13 +7476,14 @@
             <a:lstStyle/>
             <a:p>
               <a:r>
-                <a:rPr lang="en-US" sz="1200" b="1" dirty="0">
-                  <a:solidFill>
-                    <a:schemeClr val="tx1"/>
-                  </a:solidFill>
-                </a:rPr>
-                <a:t>46</a:t>
+                <a:rPr lang="en-US" sz="1200" b="1" dirty="0"/>
+                <a:t>60</a:t>
               </a:r>
+              <a:endParaRPr lang="en-US" sz="1200" b="1" dirty="0">
+                <a:solidFill>
+                  <a:schemeClr val="tx1"/>
+                </a:solidFill>
+              </a:endParaRPr>
             </a:p>
           </p:txBody>
         </p:sp>
@@ -7509,7 +7496,7 @@
           <p:spPr>
             <a:xfrm>
               <a:off x="1001014" y="299689"/>
-              <a:ext cx="341760" cy="276999"/>
+              <a:ext cx="321678" cy="292519"/>
             </a:xfrm>
             <a:prstGeom prst="rect">
               <a:avLst/>
@@ -7523,13 +7510,14 @@
             <a:lstStyle/>
             <a:p>
               <a:r>
-                <a:rPr lang="en-US" sz="1200" b="1" dirty="0">
-                  <a:solidFill>
-                    <a:schemeClr val="tx1"/>
-                  </a:solidFill>
-                </a:rPr>
-                <a:t>12</a:t>
+                <a:rPr lang="en-US" sz="1200" b="1" dirty="0"/>
+                <a:t>9</a:t>
               </a:r>
+              <a:endParaRPr lang="en-US" sz="1200" b="1" dirty="0">
+                <a:solidFill>
+                  <a:schemeClr val="tx1"/>
+                </a:solidFill>
+              </a:endParaRPr>
             </a:p>
           </p:txBody>
         </p:sp>
@@ -7548,10 +7536,10 @@
         </p:nvGrpSpPr>
         <p:grpSpPr>
           <a:xfrm>
-            <a:off x="3594905" y="567188"/>
-            <a:ext cx="2398207" cy="2228796"/>
+            <a:off x="3526326" y="567188"/>
+            <a:ext cx="2407910" cy="2228796"/>
             <a:chOff x="3728255" y="195944"/>
-            <a:chExt cx="2717748" cy="2353671"/>
+            <a:chExt cx="2728745" cy="2353671"/>
           </a:xfrm>
         </p:grpSpPr>
         <p:grpSp>
@@ -7569,9 +7557,9 @@
           <p:grpSpPr>
             <a:xfrm>
               <a:off x="3728255" y="195944"/>
-              <a:ext cx="2717748" cy="2353671"/>
+              <a:ext cx="2728745" cy="2353671"/>
               <a:chOff x="3728255" y="195944"/>
-              <a:chExt cx="2717748" cy="2353671"/>
+              <a:chExt cx="2728745" cy="2353671"/>
             </a:xfrm>
           </p:grpSpPr>
           <p:grpSp>
@@ -7589,9 +7577,9 @@
             <p:grpSpPr>
               <a:xfrm>
                 <a:off x="3728255" y="195944"/>
-                <a:ext cx="2717748" cy="2353671"/>
+                <a:ext cx="2728745" cy="2353671"/>
                 <a:chOff x="2644987" y="2301638"/>
-                <a:chExt cx="3099409" cy="2574171"/>
+                <a:chExt cx="3111949" cy="2574171"/>
               </a:xfrm>
             </p:grpSpPr>
             <p:grpSp>
@@ -7609,9 +7597,9 @@
               <p:grpSpPr>
                 <a:xfrm>
                   <a:off x="2644987" y="2301638"/>
-                  <a:ext cx="3099409" cy="2119940"/>
+                  <a:ext cx="3111949" cy="2119940"/>
                   <a:chOff x="2854537" y="2301638"/>
-                  <a:chExt cx="3099409" cy="2119940"/>
+                  <a:chExt cx="3111949" cy="2119940"/>
                 </a:xfrm>
               </p:grpSpPr>
               <p:grpSp>
@@ -7871,7 +7859,7 @@
                     <p:spPr>
                       <a:xfrm>
                         <a:off x="2613878" y="3522916"/>
-                        <a:ext cx="485601" cy="302949"/>
+                        <a:ext cx="485602" cy="319923"/>
                       </a:xfrm>
                       <a:prstGeom prst="rect">
                         <a:avLst/>
@@ -7886,7 +7874,7 @@
                       <a:p>
                         <a:r>
                           <a:rPr lang="en-US" sz="1200" b="1" dirty="0"/>
-                          <a:t>83</a:t>
+                          <a:t>88</a:t>
                         </a:r>
                         <a:endParaRPr lang="en-US" sz="1200" b="1" dirty="0">
                           <a:solidFill>
@@ -7905,7 +7893,7 @@
                     <p:spPr>
                       <a:xfrm>
                         <a:off x="2362042" y="2697801"/>
-                        <a:ext cx="425505" cy="302949"/>
+                        <a:ext cx="425505" cy="319923"/>
                       </a:xfrm>
                       <a:prstGeom prst="rect">
                         <a:avLst/>
@@ -7920,7 +7908,7 @@
                       <a:p>
                         <a:r>
                           <a:rPr lang="en-US" sz="1200" b="1" dirty="0"/>
-                          <a:t>13</a:t>
+                          <a:t>14</a:t>
                         </a:r>
                         <a:endParaRPr lang="en-US" sz="1200" b="1" dirty="0">
                           <a:solidFill>
@@ -7939,7 +7927,7 @@
                     <p:spPr>
                       <a:xfrm>
                         <a:off x="2216243" y="4398490"/>
-                        <a:ext cx="425505" cy="302949"/>
+                        <a:ext cx="425505" cy="319923"/>
                       </a:xfrm>
                       <a:prstGeom prst="rect">
                         <a:avLst/>
@@ -7954,7 +7942,7 @@
                       <a:p>
                         <a:r>
                           <a:rPr lang="en-US" sz="1200" b="1" dirty="0"/>
-                          <a:t>34</a:t>
+                          <a:t>39</a:t>
                         </a:r>
                         <a:endParaRPr lang="en-US" sz="1200" b="1" dirty="0">
                           <a:solidFill>
@@ -7973,8 +7961,8 @@
                   </p:nvSpPr>
                   <p:spPr>
                     <a:xfrm>
-                      <a:off x="1177553" y="4346612"/>
-                      <a:ext cx="425505" cy="276999"/>
+                      <a:off x="1177552" y="4346612"/>
+                      <a:ext cx="425505" cy="319923"/>
                     </a:xfrm>
                     <a:prstGeom prst="rect">
                       <a:avLst/>
@@ -7993,7 +7981,7 @@
                             <a:schemeClr val="tx1"/>
                           </a:solidFill>
                         </a:rPr>
-                        <a:t>11</a:t>
+                        <a:t>10</a:t>
                       </a:r>
                     </a:p>
                   </p:txBody>
@@ -8013,8 +8001,8 @@
                 </p:nvSpPr>
                 <p:spPr>
                   <a:xfrm>
-                    <a:off x="5564192" y="3187449"/>
-                    <a:ext cx="389754" cy="302949"/>
+                    <a:off x="5524800" y="3187449"/>
+                    <a:ext cx="441686" cy="319923"/>
                   </a:xfrm>
                   <a:prstGeom prst="rect">
                     <a:avLst/>
@@ -8028,14 +8016,13 @@
                   <a:lstStyle/>
                   <a:p>
                     <a:r>
-                      <a:rPr lang="en-US" sz="1200" b="1" dirty="0"/>
-                      <a:t>70</a:t>
+                      <a:rPr lang="en-US" sz="1200" b="1" dirty="0">
+                        <a:solidFill>
+                          <a:schemeClr val="tx1"/>
+                        </a:solidFill>
+                      </a:rPr>
+                      <a:t>49</a:t>
                     </a:r>
-                    <a:endParaRPr lang="en-US" sz="1200" b="1" dirty="0">
-                      <a:solidFill>
-                        <a:schemeClr val="tx1"/>
-                      </a:solidFill>
-                    </a:endParaRPr>
                   </a:p>
                 </p:txBody>
               </p:sp>
@@ -8078,7 +8065,7 @@
                   <a:pPr algn="ctr"/>
                   <a:r>
                     <a:rPr lang="en-US" sz="1100" b="1" dirty="0"/>
-                    <a:t>N=465</a:t>
+                    <a:t>N=434</a:t>
                   </a:r>
                 </a:p>
               </p:txBody>
@@ -8146,41 +8133,7 @@
             <p:spPr>
               <a:xfrm>
                 <a:off x="5234798" y="1004717"/>
-                <a:ext cx="341760" cy="276999"/>
-              </a:xfrm>
-              <a:prstGeom prst="rect">
-                <a:avLst/>
-              </a:prstGeom>
-              <a:noFill/>
-            </p:spPr>
-            <p:txBody>
-              <a:bodyPr wrap="none" rtlCol="0">
-                <a:spAutoFit/>
-              </a:bodyPr>
-              <a:lstStyle/>
-              <a:p>
-                <a:r>
-                  <a:rPr lang="en-US" sz="1200" b="1" dirty="0"/>
-                  <a:t>67</a:t>
-                </a:r>
-                <a:endParaRPr lang="en-US" sz="1200" b="1" dirty="0">
-                  <a:solidFill>
-                    <a:schemeClr val="tx1"/>
-                  </a:solidFill>
-                </a:endParaRPr>
-              </a:p>
-            </p:txBody>
-          </p:sp>
-          <p:sp>
-            <p:nvSpPr>
-              <p:cNvPr id="93" name="TextBox 92"/>
-              <p:cNvSpPr txBox="1"/>
-              <p:nvPr/>
-            </p:nvSpPr>
-            <p:spPr>
-              <a:xfrm>
-                <a:off x="4176209" y="308786"/>
-                <a:ext cx="341760" cy="276999"/>
+                <a:ext cx="387297" cy="292519"/>
               </a:xfrm>
               <a:prstGeom prst="rect">
                 <a:avLst/>
@@ -8199,8 +8152,42 @@
                       <a:schemeClr val="tx1"/>
                     </a:solidFill>
                   </a:rPr>
-                  <a:t>12</a:t>
+                  <a:t>73</a:t>
                 </a:r>
+              </a:p>
+            </p:txBody>
+          </p:sp>
+          <p:sp>
+            <p:nvSpPr>
+              <p:cNvPr id="93" name="TextBox 92"/>
+              <p:cNvSpPr txBox="1"/>
+              <p:nvPr/>
+            </p:nvSpPr>
+            <p:spPr>
+              <a:xfrm>
+                <a:off x="4176209" y="308786"/>
+                <a:ext cx="298285" cy="292519"/>
+              </a:xfrm>
+              <a:prstGeom prst="rect">
+                <a:avLst/>
+              </a:prstGeom>
+              <a:noFill/>
+            </p:spPr>
+            <p:txBody>
+              <a:bodyPr wrap="none" rtlCol="0">
+                <a:spAutoFit/>
+              </a:bodyPr>
+              <a:lstStyle/>
+              <a:p>
+                <a:r>
+                  <a:rPr lang="en-US" sz="1200" b="1" dirty="0"/>
+                  <a:t>7</a:t>
+                </a:r>
+                <a:endParaRPr lang="en-US" sz="1200" b="1" dirty="0">
+                  <a:solidFill>
+                    <a:schemeClr val="tx1"/>
+                  </a:solidFill>
+                </a:endParaRPr>
               </a:p>
             </p:txBody>
           </p:sp>
@@ -8214,7 +8201,7 @@
           <p:spPr>
             <a:xfrm>
               <a:off x="4212990" y="1002339"/>
-              <a:ext cx="420308" cy="276999"/>
+              <a:ext cx="476311" cy="292519"/>
             </a:xfrm>
             <a:prstGeom prst="rect">
               <a:avLst/>
@@ -8233,7 +8220,7 @@
                     <a:schemeClr val="tx1"/>
                   </a:solidFill>
                 </a:rPr>
-                <a:t>172</a:t>
+                <a:t>152</a:t>
               </a:r>
             </a:p>
           </p:txBody>
@@ -8253,10 +8240,10 @@
         </p:nvGrpSpPr>
         <p:grpSpPr>
           <a:xfrm>
-            <a:off x="6093666" y="873625"/>
-            <a:ext cx="1956004" cy="1934868"/>
-            <a:chOff x="6790589" y="486119"/>
-            <a:chExt cx="2216625" cy="2043275"/>
+            <a:off x="5986985" y="873625"/>
+            <a:ext cx="2015554" cy="1934868"/>
+            <a:chOff x="6790587" y="486119"/>
+            <a:chExt cx="2284109" cy="2043275"/>
           </a:xfrm>
         </p:grpSpPr>
         <p:grpSp>
@@ -8273,10 +8260,10 @@
           </p:nvGrpSpPr>
           <p:grpSpPr>
             <a:xfrm>
-              <a:off x="6790589" y="486119"/>
-              <a:ext cx="2216625" cy="2043275"/>
-              <a:chOff x="5886428" y="90106"/>
-              <a:chExt cx="2527910" cy="2234696"/>
+              <a:off x="6790587" y="486119"/>
+              <a:ext cx="2284109" cy="2043275"/>
+              <a:chOff x="5886427" y="90106"/>
+              <a:chExt cx="2604871" cy="2234696"/>
             </a:xfrm>
           </p:grpSpPr>
           <p:grpSp>
@@ -8293,10 +8280,10 @@
             </p:nvGrpSpPr>
             <p:grpSpPr>
               <a:xfrm>
-                <a:off x="5886428" y="90106"/>
-                <a:ext cx="2527910" cy="1793955"/>
-                <a:chOff x="5886428" y="90106"/>
-                <a:chExt cx="2527910" cy="1793955"/>
+                <a:off x="5886427" y="90106"/>
+                <a:ext cx="2604871" cy="1793955"/>
+                <a:chOff x="5886427" y="90106"/>
+                <a:chExt cx="2604871" cy="1793955"/>
               </a:xfrm>
             </p:grpSpPr>
             <p:grpSp>
@@ -8307,10 +8294,10 @@
               </p:nvGrpSpPr>
               <p:grpSpPr>
                 <a:xfrm>
-                  <a:off x="5886428" y="90106"/>
-                  <a:ext cx="2308920" cy="1793955"/>
+                  <a:off x="5886427" y="90106"/>
+                  <a:ext cx="2375179" cy="1793955"/>
                   <a:chOff x="3573919" y="491024"/>
-                  <a:chExt cx="2400685" cy="2003047"/>
+                  <a:chExt cx="2469578" cy="2003047"/>
                 </a:xfrm>
               </p:grpSpPr>
               <p:grpSp>
@@ -8541,8 +8528,8 @@
                 </p:nvSpPr>
                 <p:spPr>
                   <a:xfrm>
-                    <a:off x="5549099" y="1304703"/>
-                    <a:ext cx="425505" cy="338259"/>
+                    <a:off x="5538859" y="1304703"/>
+                    <a:ext cx="504638" cy="357211"/>
                   </a:xfrm>
                   <a:prstGeom prst="rect">
                     <a:avLst/>
@@ -8556,13 +8543,14 @@
                   <a:lstStyle/>
                   <a:p>
                     <a:r>
-                      <a:rPr lang="en-US" sz="1200" b="1" dirty="0">
-                        <a:solidFill>
-                          <a:schemeClr val="tx1"/>
-                        </a:solidFill>
-                      </a:rPr>
+                      <a:rPr lang="en-US" sz="1200" b="1" dirty="0"/>
                       <a:t>15</a:t>
                     </a:r>
+                    <a:endParaRPr lang="en-US" sz="1200" b="1" dirty="0">
+                      <a:solidFill>
+                        <a:schemeClr val="tx1"/>
+                      </a:solidFill>
+                    </a:endParaRPr>
                   </a:p>
                 </p:txBody>
               </p:sp>
@@ -8575,7 +8563,7 @@
                 <p:spPr>
                   <a:xfrm>
                     <a:off x="4897127" y="491024"/>
-                    <a:ext cx="425505" cy="307777"/>
+                    <a:ext cx="425505" cy="357211"/>
                   </a:xfrm>
                   <a:prstGeom prst="rect">
                     <a:avLst/>
@@ -8589,13 +8577,14 @@
                   <a:lstStyle/>
                   <a:p>
                     <a:r>
-                      <a:rPr lang="en-US" sz="1200" b="1" dirty="0">
-                        <a:solidFill>
-                          <a:schemeClr val="tx1"/>
-                        </a:solidFill>
-                      </a:rPr>
-                      <a:t>4</a:t>
+                      <a:rPr lang="en-US" sz="1200" b="1" dirty="0"/>
+                      <a:t>3</a:t>
                     </a:r>
+                    <a:endParaRPr lang="en-US" sz="1200" b="1" dirty="0">
+                      <a:solidFill>
+                        <a:schemeClr val="tx1"/>
+                      </a:solidFill>
+                    </a:endParaRPr>
                   </a:p>
                 </p:txBody>
               </p:sp>
@@ -8607,8 +8596,8 @@
                 </p:nvSpPr>
                 <p:spPr>
                   <a:xfrm>
-                    <a:off x="5195995" y="2153126"/>
-                    <a:ext cx="425505" cy="307778"/>
+                    <a:off x="5195995" y="2133473"/>
+                    <a:ext cx="425505" cy="357211"/>
                   </a:xfrm>
                   <a:prstGeom prst="rect">
                     <a:avLst/>
@@ -8622,13 +8611,14 @@
                   <a:lstStyle/>
                   <a:p>
                     <a:r>
-                      <a:rPr lang="en-US" sz="1200" b="1" dirty="0">
-                        <a:solidFill>
-                          <a:schemeClr val="tx1"/>
-                        </a:solidFill>
-                      </a:rPr>
-                      <a:t>8</a:t>
+                      <a:rPr lang="en-US" sz="1200" b="1" dirty="0"/>
+                      <a:t>5</a:t>
                     </a:r>
+                    <a:endParaRPr lang="en-US" sz="1200" b="1" dirty="0">
+                      <a:solidFill>
+                        <a:schemeClr val="tx1"/>
+                      </a:solidFill>
+                    </a:endParaRPr>
                   </a:p>
                 </p:txBody>
               </p:sp>
@@ -8648,7 +8638,7 @@
               <p:spPr>
                 <a:xfrm>
                   <a:off x="8151124" y="818531"/>
-                  <a:ext cx="263214" cy="276999"/>
+                  <a:ext cx="340174" cy="319923"/>
                 </a:xfrm>
                 <a:prstGeom prst="rect">
                   <a:avLst/>
@@ -8662,14 +8652,13 @@
                 <a:lstStyle/>
                 <a:p>
                   <a:r>
-                    <a:rPr lang="en-US" sz="1200" b="1" dirty="0"/>
-                    <a:t>3</a:t>
+                    <a:rPr lang="en-US" sz="1200" b="1" dirty="0">
+                      <a:solidFill>
+                        <a:schemeClr val="tx1"/>
+                      </a:solidFill>
+                    </a:rPr>
+                    <a:t>5</a:t>
                   </a:r>
-                  <a:endParaRPr lang="en-US" sz="1200" b="1" dirty="0">
-                    <a:solidFill>
-                      <a:schemeClr val="tx1"/>
-                    </a:solidFill>
-                  </a:endParaRPr>
                 </a:p>
               </p:txBody>
             </p:sp>
@@ -8712,7 +8701,7 @@
                 <a:pPr algn="ctr"/>
                 <a:r>
                   <a:rPr lang="en-US" sz="1100" b="1" dirty="0"/>
-                  <a:t>N=156</a:t>
+                  <a:t>N=168</a:t>
                 </a:r>
               </a:p>
             </p:txBody>
@@ -8792,7 +8781,7 @@
           <p:spPr>
             <a:xfrm>
               <a:off x="7475731" y="1133098"/>
-              <a:ext cx="420308" cy="276999"/>
+              <a:ext cx="476310" cy="292519"/>
             </a:xfrm>
             <a:prstGeom prst="rect">
               <a:avLst/>
@@ -8811,7 +8800,7 @@
                     <a:schemeClr val="tx1"/>
                   </a:solidFill>
                 </a:rPr>
-                <a:t>100</a:t>
+                <a:t>107</a:t>
               </a:r>
             </a:p>
           </p:txBody>
@@ -8870,7 +8859,7 @@
           <p:spPr>
             <a:xfrm>
               <a:off x="7511689" y="1787842"/>
-              <a:ext cx="341760" cy="276999"/>
+              <a:ext cx="387297" cy="292519"/>
             </a:xfrm>
             <a:prstGeom prst="rect">
               <a:avLst/>
@@ -8884,13 +8873,14 @@
             <a:lstStyle/>
             <a:p>
               <a:r>
-                <a:rPr lang="en-US" sz="1200" b="1" dirty="0">
-                  <a:solidFill>
-                    <a:schemeClr val="tx1"/>
-                  </a:solidFill>
-                </a:rPr>
-                <a:t>17</a:t>
+                <a:rPr lang="en-US" sz="1200" b="1" dirty="0"/>
+                <a:t>24</a:t>
               </a:r>
+              <a:endParaRPr lang="en-US" sz="1200" b="1" dirty="0">
+                <a:solidFill>
+                  <a:schemeClr val="tx1"/>
+                </a:solidFill>
+              </a:endParaRPr>
             </a:p>
           </p:txBody>
         </p:sp>
@@ -8909,7 +8899,7 @@
         </p:nvGrpSpPr>
         <p:grpSpPr>
           <a:xfrm>
-            <a:off x="8546279" y="981075"/>
+            <a:off x="8264339" y="981075"/>
             <a:ext cx="1599455" cy="1810235"/>
             <a:chOff x="9472149" y="633281"/>
             <a:chExt cx="1812569" cy="1911659"/>
@@ -9182,7 +9172,7 @@
               <p:spPr>
                 <a:xfrm>
                   <a:off x="2310270" y="1113206"/>
-                  <a:ext cx="425505" cy="342973"/>
+                  <a:ext cx="425505" cy="362190"/>
                 </a:xfrm>
                 <a:prstGeom prst="rect">
                   <a:avLst/>
@@ -9196,13 +9186,14 @@
                 <a:lstStyle/>
                 <a:p>
                   <a:r>
-                    <a:rPr lang="en-US" sz="1200" b="1" dirty="0">
-                      <a:solidFill>
-                        <a:schemeClr val="tx1"/>
-                      </a:solidFill>
-                    </a:rPr>
-                    <a:t>3</a:t>
+                    <a:rPr lang="en-US" sz="1200" b="1" dirty="0"/>
+                    <a:t>6</a:t>
                   </a:r>
+                  <a:endParaRPr lang="en-US" sz="1200" b="1" dirty="0">
+                    <a:solidFill>
+                      <a:schemeClr val="tx1"/>
+                    </a:solidFill>
+                  </a:endParaRPr>
                 </a:p>
               </p:txBody>
             </p:sp>
@@ -9245,7 +9236,7 @@
                 <a:pPr algn="ctr"/>
                 <a:r>
                   <a:rPr lang="en-US" sz="1100" b="1" dirty="0"/>
-                  <a:t>N=124</a:t>
+                  <a:t>N=138</a:t>
                 </a:r>
               </a:p>
             </p:txBody>
@@ -9325,7 +9316,7 @@
           <p:spPr>
             <a:xfrm>
               <a:off x="10061014" y="1877858"/>
-              <a:ext cx="341760" cy="276999"/>
+              <a:ext cx="387297" cy="292519"/>
             </a:xfrm>
             <a:prstGeom prst="rect">
               <a:avLst/>
@@ -9344,7 +9335,7 @@
                     <a:schemeClr val="tx1"/>
                   </a:solidFill>
                 </a:rPr>
-                <a:t>10</a:t>
+                <a:t>14</a:t>
               </a:r>
             </a:p>
           </p:txBody>
@@ -9364,7 +9355,7 @@
           <p:spPr>
             <a:xfrm>
               <a:off x="10056984" y="633281"/>
-              <a:ext cx="341760" cy="276999"/>
+              <a:ext cx="387297" cy="292519"/>
             </a:xfrm>
             <a:prstGeom prst="rect">
               <a:avLst/>
@@ -9383,7 +9374,7 @@
                     <a:schemeClr val="tx1"/>
                   </a:solidFill>
                 </a:rPr>
-                <a:t>13</a:t>
+                <a:t>14</a:t>
               </a:r>
             </a:p>
           </p:txBody>
@@ -9402,8 +9393,8 @@
           </p:nvSpPr>
           <p:spPr>
             <a:xfrm>
-              <a:off x="10071444" y="1198637"/>
-              <a:ext cx="341760" cy="276999"/>
+              <a:off x="10071443" y="1198637"/>
+              <a:ext cx="476311" cy="292519"/>
             </a:xfrm>
             <a:prstGeom prst="rect">
               <a:avLst/>
@@ -9417,101 +9408,17 @@
             <a:lstStyle/>
             <a:p>
               <a:r>
-                <a:rPr lang="en-US" sz="1200" b="1" dirty="0">
-                  <a:solidFill>
-                    <a:schemeClr val="tx1"/>
-                  </a:solidFill>
-                </a:rPr>
-                <a:t>93</a:t>
+                <a:rPr lang="en-US" sz="1200" b="1" dirty="0"/>
+                <a:t>101</a:t>
               </a:r>
+              <a:endParaRPr lang="en-US" sz="1200" b="1" dirty="0">
+                <a:solidFill>
+                  <a:schemeClr val="tx1"/>
+                </a:solidFill>
+              </a:endParaRPr>
             </a:p>
           </p:txBody>
         </p:sp>
-      </p:grpSp>
-      <p:grpSp>
-        <p:nvGrpSpPr>
-          <p:cNvPr id="11" name="Group 10">
-            <a:extLst>
-              <a:ext uri="{FF2B5EF4-FFF2-40B4-BE49-F238E27FC236}">
-                <a16:creationId xmlns:a16="http://schemas.microsoft.com/office/drawing/2014/main" id="{79A32C43-2089-4CCC-85D1-E65F8B36310C}"/>
-              </a:ext>
-            </a:extLst>
-          </p:cNvPr>
-          <p:cNvGrpSpPr/>
-          <p:nvPr/>
-        </p:nvGrpSpPr>
-        <p:grpSpPr>
-          <a:xfrm>
-            <a:off x="372310" y="2935785"/>
-            <a:ext cx="9733314" cy="3610909"/>
-            <a:chOff x="77035" y="2935785"/>
-            <a:chExt cx="9733314" cy="3610909"/>
-          </a:xfrm>
-        </p:grpSpPr>
-        <p:pic>
-          <p:nvPicPr>
-            <p:cNvPr id="9" name="Picture 8"/>
-            <p:cNvPicPr>
-              <a:picLocks noChangeAspect="1"/>
-            </p:cNvPicPr>
-            <p:nvPr/>
-          </p:nvPicPr>
-          <p:blipFill rotWithShape="1">
-            <a:blip r:embed="rId4">
-              <a:extLst>
-                <a:ext uri="{28A0092B-C50C-407E-A947-70E740481C1C}">
-                  <a14:useLocalDpi xmlns:a14="http://schemas.microsoft.com/office/drawing/2010/main" val="0"/>
-                </a:ext>
-              </a:extLst>
-            </a:blip>
-            <a:srcRect l="1" r="17730"/>
-            <a:stretch/>
-          </p:blipFill>
-          <p:spPr>
-            <a:xfrm>
-              <a:off x="77035" y="2935785"/>
-              <a:ext cx="9505116" cy="3610909"/>
-            </a:xfrm>
-            <a:prstGeom prst="rect">
-              <a:avLst/>
-            </a:prstGeom>
-          </p:spPr>
-        </p:pic>
-        <p:pic>
-          <p:nvPicPr>
-            <p:cNvPr id="119" name="Picture 118">
-              <a:extLst>
-                <a:ext uri="{FF2B5EF4-FFF2-40B4-BE49-F238E27FC236}">
-                  <a16:creationId xmlns:a16="http://schemas.microsoft.com/office/drawing/2014/main" id="{E6AE8C80-99DE-42D6-8459-5F0F4A86692F}"/>
-                </a:ext>
-              </a:extLst>
-            </p:cNvPr>
-            <p:cNvPicPr>
-              <a:picLocks noChangeAspect="1"/>
-            </p:cNvPicPr>
-            <p:nvPr/>
-          </p:nvPicPr>
-          <p:blipFill rotWithShape="1">
-            <a:blip r:embed="rId4">
-              <a:extLst>
-                <a:ext uri="{28A0092B-C50C-407E-A947-70E740481C1C}">
-                  <a14:useLocalDpi xmlns:a14="http://schemas.microsoft.com/office/drawing/2010/main" val="0"/>
-                </a:ext>
-              </a:extLst>
-            </a:blip>
-            <a:srcRect l="88216" r="9743"/>
-            <a:stretch/>
-          </p:blipFill>
-          <p:spPr>
-            <a:xfrm>
-              <a:off x="9574559" y="2935785"/>
-              <a:ext cx="235790" cy="3610909"/>
-            </a:xfrm>
-            <a:prstGeom prst="rect">
-              <a:avLst/>
-            </a:prstGeom>
-          </p:spPr>
-        </p:pic>
       </p:grpSp>
       <p:grpSp>
         <p:nvGrpSpPr>
@@ -9995,6 +9902,41 @@
           </p:txBody>
         </p:sp>
       </p:grpSp>
+      <p:pic>
+        <p:nvPicPr>
+          <p:cNvPr id="12" name="Picture 11" descr="A close up of a map&#10;&#10;Description automatically generated">
+            <a:extLst>
+              <a:ext uri="{FF2B5EF4-FFF2-40B4-BE49-F238E27FC236}">
+                <a16:creationId xmlns:a16="http://schemas.microsoft.com/office/drawing/2014/main" id="{33F28D6A-1581-49FA-969F-6096083CFEA9}"/>
+              </a:ext>
+            </a:extLst>
+          </p:cNvPr>
+          <p:cNvPicPr>
+            <a:picLocks noChangeAspect="1"/>
+          </p:cNvPicPr>
+          <p:nvPr/>
+        </p:nvPicPr>
+        <p:blipFill rotWithShape="1">
+          <a:blip r:embed="rId4">
+            <a:extLst>
+              <a:ext uri="{28A0092B-C50C-407E-A947-70E740481C1C}">
+                <a14:useLocalDpi xmlns:a14="http://schemas.microsoft.com/office/drawing/2010/main" val="0"/>
+              </a:ext>
+            </a:extLst>
+          </a:blip>
+          <a:srcRect l="1047" r="16157"/>
+          <a:stretch/>
+        </p:blipFill>
+        <p:spPr>
+          <a:xfrm>
+            <a:off x="-1" y="2736742"/>
+            <a:ext cx="10474991" cy="4115374"/>
+          </a:xfrm>
+          <a:prstGeom prst="rect">
+            <a:avLst/>
+          </a:prstGeom>
+        </p:spPr>
+      </p:pic>
     </p:spTree>
     <p:extLst>
       <p:ext uri="{BB962C8B-B14F-4D97-AF65-F5344CB8AC3E}">
@@ -10424,7 +10366,13 @@
       </p:grpSp>
       <p:pic>
         <p:nvPicPr>
-          <p:cNvPr id="7" name="Picture 6"/>
+          <p:cNvPr id="3" name="Picture 2" descr="A close up of a map&#10;&#10;Description automatically generated">
+            <a:extLst>
+              <a:ext uri="{FF2B5EF4-FFF2-40B4-BE49-F238E27FC236}">
+                <a16:creationId xmlns:a16="http://schemas.microsoft.com/office/drawing/2014/main" id="{27DF38C8-4E43-4C49-8806-0B7AEEEE1CA8}"/>
+              </a:ext>
+            </a:extLst>
+          </p:cNvPr>
           <p:cNvPicPr>
             <a:picLocks noChangeAspect="1"/>
           </p:cNvPicPr>
@@ -10444,8 +10392,8 @@
         </p:blipFill>
         <p:spPr>
           <a:xfrm>
-            <a:off x="1059965" y="1301649"/>
-            <a:ext cx="10058400" cy="4897347"/>
+            <a:off x="751729" y="1352260"/>
+            <a:ext cx="10688542" cy="4153480"/>
           </a:xfrm>
           <a:prstGeom prst="rect">
             <a:avLst/>
@@ -10893,7 +10841,13 @@
       </p:grpSp>
       <p:pic>
         <p:nvPicPr>
-          <p:cNvPr id="8" name="Picture 7"/>
+          <p:cNvPr id="3" name="Picture 2" descr="A close up of a map&#10;&#10;Description automatically generated">
+            <a:extLst>
+              <a:ext uri="{FF2B5EF4-FFF2-40B4-BE49-F238E27FC236}">
+                <a16:creationId xmlns:a16="http://schemas.microsoft.com/office/drawing/2014/main" id="{DCCA0552-974A-4F5A-94B1-86BF4ED58E7A}"/>
+              </a:ext>
+            </a:extLst>
+          </p:cNvPr>
           <p:cNvPicPr>
             <a:picLocks noChangeAspect="1"/>
           </p:cNvPicPr>
@@ -10913,8 +10867,8 @@
         </p:blipFill>
         <p:spPr>
           <a:xfrm>
-            <a:off x="1570315" y="737847"/>
-            <a:ext cx="10012172" cy="5201376"/>
+            <a:off x="756492" y="1366549"/>
+            <a:ext cx="10679015" cy="4124901"/>
           </a:xfrm>
           <a:prstGeom prst="rect">
             <a:avLst/>

</xml_diff>

<commit_message>
updated MHPA to HAP2
</commit_message>
<xml_diff>
--- a/results.pptx
+++ b/results.pptx
@@ -201,7 +201,7 @@
           <a:p>
             <a:fld id="{8B9DAE71-14C6-43BF-8377-DCBB177C1E2D}" type="datetimeFigureOut">
               <a:rPr lang="en-US" smtClean="0"/>
-              <a:t>8/28/2019</a:t>
+              <a:t>8/30/2019</a:t>
             </a:fld>
             <a:endParaRPr lang="en-US"/>
           </a:p>
@@ -933,7 +933,7 @@
           <a:p>
             <a:fld id="{7BD11EC7-BF2A-4653-B12A-BDCEC9BF7A38}" type="datetimeFigureOut">
               <a:rPr lang="en-US" smtClean="0"/>
-              <a:t>8/28/2019</a:t>
+              <a:t>8/30/2019</a:t>
             </a:fld>
             <a:endParaRPr lang="en-US"/>
           </a:p>
@@ -1101,7 +1101,7 @@
           <a:p>
             <a:fld id="{7BD11EC7-BF2A-4653-B12A-BDCEC9BF7A38}" type="datetimeFigureOut">
               <a:rPr lang="en-US" smtClean="0"/>
-              <a:t>8/28/2019</a:t>
+              <a:t>8/30/2019</a:t>
             </a:fld>
             <a:endParaRPr lang="en-US"/>
           </a:p>
@@ -1279,7 +1279,7 @@
           <a:p>
             <a:fld id="{7BD11EC7-BF2A-4653-B12A-BDCEC9BF7A38}" type="datetimeFigureOut">
               <a:rPr lang="en-US" smtClean="0"/>
-              <a:t>8/28/2019</a:t>
+              <a:t>8/30/2019</a:t>
             </a:fld>
             <a:endParaRPr lang="en-US"/>
           </a:p>
@@ -1447,7 +1447,7 @@
           <a:p>
             <a:fld id="{7BD11EC7-BF2A-4653-B12A-BDCEC9BF7A38}" type="datetimeFigureOut">
               <a:rPr lang="en-US" smtClean="0"/>
-              <a:t>8/28/2019</a:t>
+              <a:t>8/30/2019</a:t>
             </a:fld>
             <a:endParaRPr lang="en-US"/>
           </a:p>
@@ -1692,7 +1692,7 @@
           <a:p>
             <a:fld id="{7BD11EC7-BF2A-4653-B12A-BDCEC9BF7A38}" type="datetimeFigureOut">
               <a:rPr lang="en-US" smtClean="0"/>
-              <a:t>8/28/2019</a:t>
+              <a:t>8/30/2019</a:t>
             </a:fld>
             <a:endParaRPr lang="en-US"/>
           </a:p>
@@ -1921,7 +1921,7 @@
           <a:p>
             <a:fld id="{7BD11EC7-BF2A-4653-B12A-BDCEC9BF7A38}" type="datetimeFigureOut">
               <a:rPr lang="en-US" smtClean="0"/>
-              <a:t>8/28/2019</a:t>
+              <a:t>8/30/2019</a:t>
             </a:fld>
             <a:endParaRPr lang="en-US"/>
           </a:p>
@@ -2285,7 +2285,7 @@
           <a:p>
             <a:fld id="{7BD11EC7-BF2A-4653-B12A-BDCEC9BF7A38}" type="datetimeFigureOut">
               <a:rPr lang="en-US" smtClean="0"/>
-              <a:t>8/28/2019</a:t>
+              <a:t>8/30/2019</a:t>
             </a:fld>
             <a:endParaRPr lang="en-US"/>
           </a:p>
@@ -2402,7 +2402,7 @@
           <a:p>
             <a:fld id="{7BD11EC7-BF2A-4653-B12A-BDCEC9BF7A38}" type="datetimeFigureOut">
               <a:rPr lang="en-US" smtClean="0"/>
-              <a:t>8/28/2019</a:t>
+              <a:t>8/30/2019</a:t>
             </a:fld>
             <a:endParaRPr lang="en-US"/>
           </a:p>
@@ -2497,7 +2497,7 @@
           <a:p>
             <a:fld id="{7BD11EC7-BF2A-4653-B12A-BDCEC9BF7A38}" type="datetimeFigureOut">
               <a:rPr lang="en-US" smtClean="0"/>
-              <a:t>8/28/2019</a:t>
+              <a:t>8/30/2019</a:t>
             </a:fld>
             <a:endParaRPr lang="en-US"/>
           </a:p>
@@ -2772,7 +2772,7 @@
           <a:p>
             <a:fld id="{7BD11EC7-BF2A-4653-B12A-BDCEC9BF7A38}" type="datetimeFigureOut">
               <a:rPr lang="en-US" smtClean="0"/>
-              <a:t>8/28/2019</a:t>
+              <a:t>8/30/2019</a:t>
             </a:fld>
             <a:endParaRPr lang="en-US"/>
           </a:p>
@@ -3024,7 +3024,7 @@
           <a:p>
             <a:fld id="{7BD11EC7-BF2A-4653-B12A-BDCEC9BF7A38}" type="datetimeFigureOut">
               <a:rPr lang="en-US" smtClean="0"/>
-              <a:t>8/28/2019</a:t>
+              <a:t>8/30/2019</a:t>
             </a:fld>
             <a:endParaRPr lang="en-US"/>
           </a:p>
@@ -3235,7 +3235,7 @@
           <a:p>
             <a:fld id="{7BD11EC7-BF2A-4653-B12A-BDCEC9BF7A38}" type="datetimeFigureOut">
               <a:rPr lang="en-US" smtClean="0"/>
-              <a:t>8/28/2019</a:t>
+              <a:t>8/30/2019</a:t>
             </a:fld>
             <a:endParaRPr lang="en-US"/>
           </a:p>
@@ -3640,29 +3640,6 @@
           <a:chExt cx="0" cy="0"/>
         </a:xfrm>
       </p:grpSpPr>
-      <p:pic>
-        <p:nvPicPr>
-          <p:cNvPr id="6" name="Picture 5"/>
-          <p:cNvPicPr>
-            <a:picLocks noChangeAspect="1"/>
-          </p:cNvPicPr>
-          <p:nvPr/>
-        </p:nvPicPr>
-        <p:blipFill rotWithShape="1">
-          <a:blip r:embed="rId2"/>
-          <a:srcRect l="50284" t="21818" r="22187" b="13333"/>
-          <a:stretch/>
-        </p:blipFill>
-        <p:spPr>
-          <a:xfrm>
-            <a:off x="1465118" y="188322"/>
-            <a:ext cx="9376773" cy="6212478"/>
-          </a:xfrm>
-          <a:prstGeom prst="rect">
-            <a:avLst/>
-          </a:prstGeom>
-        </p:spPr>
-      </p:pic>
     </p:spTree>
     <p:extLst>
       <p:ext uri="{BB962C8B-B14F-4D97-AF65-F5344CB8AC3E}">
@@ -4022,7 +3999,7 @@
                 </a:pPr>
                 <a:r>
                   <a:rPr lang="en-US" sz="1400" b="1" dirty="0"/>
-                  <a:t>MHPA</a:t>
+                  <a:t>HAP2</a:t>
                 </a:r>
               </a:p>
               <a:p>
@@ -4066,7 +4043,7 @@
                 </a:pPr>
                 <a:r>
                   <a:rPr lang="en-US" sz="1400" b="1" dirty="0"/>
-                  <a:t>LOGTS</a:t>
+                  <a:t>LoGTS</a:t>
                 </a:r>
               </a:p>
             </p:txBody>
@@ -9420,12 +9397,47 @@
           </p:txBody>
         </p:sp>
       </p:grpSp>
+      <p:pic>
+        <p:nvPicPr>
+          <p:cNvPr id="12" name="Picture 11" descr="A close up of a map&#10;&#10;Description automatically generated">
+            <a:extLst>
+              <a:ext uri="{FF2B5EF4-FFF2-40B4-BE49-F238E27FC236}">
+                <a16:creationId xmlns:a16="http://schemas.microsoft.com/office/drawing/2014/main" id="{33F28D6A-1581-49FA-969F-6096083CFEA9}"/>
+              </a:ext>
+            </a:extLst>
+          </p:cNvPr>
+          <p:cNvPicPr>
+            <a:picLocks noChangeAspect="1"/>
+          </p:cNvPicPr>
+          <p:nvPr/>
+        </p:nvPicPr>
+        <p:blipFill rotWithShape="1">
+          <a:blip r:embed="rId4">
+            <a:extLst>
+              <a:ext uri="{28A0092B-C50C-407E-A947-70E740481C1C}">
+                <a14:useLocalDpi xmlns:a14="http://schemas.microsoft.com/office/drawing/2010/main" val="0"/>
+              </a:ext>
+            </a:extLst>
+          </a:blip>
+          <a:srcRect l="1047" r="16157"/>
+          <a:stretch/>
+        </p:blipFill>
+        <p:spPr>
+          <a:xfrm>
+            <a:off x="-1" y="2736742"/>
+            <a:ext cx="10474991" cy="4115374"/>
+          </a:xfrm>
+          <a:prstGeom prst="rect">
+            <a:avLst/>
+          </a:prstGeom>
+        </p:spPr>
+      </p:pic>
       <p:grpSp>
         <p:nvGrpSpPr>
-          <p:cNvPr id="120" name="Group 119">
+          <p:cNvPr id="88" name="Group 87">
             <a:extLst>
               <a:ext uri="{FF2B5EF4-FFF2-40B4-BE49-F238E27FC236}">
-                <a16:creationId xmlns:a16="http://schemas.microsoft.com/office/drawing/2014/main" id="{7A1BA461-CF66-48E5-AB36-D10FF07DAF2B}"/>
+                <a16:creationId xmlns:a16="http://schemas.microsoft.com/office/drawing/2014/main" id="{CEC25500-4405-45D7-B163-BCD7B2B2C704}"/>
               </a:ext>
             </a:extLst>
           </p:cNvPr>
@@ -9442,10 +9454,10 @@
         </p:grpSpPr>
         <p:grpSp>
           <p:nvGrpSpPr>
-            <p:cNvPr id="121" name="Group 120">
+            <p:cNvPr id="89" name="Group 88">
               <a:extLst>
                 <a:ext uri="{FF2B5EF4-FFF2-40B4-BE49-F238E27FC236}">
-                  <a16:creationId xmlns:a16="http://schemas.microsoft.com/office/drawing/2014/main" id="{B323BFED-1D9F-4C28-867F-1DC1AC1076AD}"/>
+                  <a16:creationId xmlns:a16="http://schemas.microsoft.com/office/drawing/2014/main" id="{974D51A2-F61D-4C32-9507-1CA7C1D1F16D}"/>
                 </a:ext>
               </a:extLst>
             </p:cNvPr>
@@ -9462,10 +9474,10 @@
           </p:grpSpPr>
           <p:grpSp>
             <p:nvGrpSpPr>
-              <p:cNvPr id="123" name="Group 122">
+              <p:cNvPr id="95" name="Group 94">
                 <a:extLst>
                   <a:ext uri="{FF2B5EF4-FFF2-40B4-BE49-F238E27FC236}">
-                    <a16:creationId xmlns:a16="http://schemas.microsoft.com/office/drawing/2014/main" id="{1D8E5146-0CA4-4EA3-A618-39BC19E9A009}"/>
+                    <a16:creationId xmlns:a16="http://schemas.microsoft.com/office/drawing/2014/main" id="{F5B86FFD-CC39-44D6-9F41-42161C8264AE}"/>
                   </a:ext>
                 </a:extLst>
               </p:cNvPr>
@@ -9482,10 +9494,10 @@
             </p:grpSpPr>
             <p:sp>
               <p:nvSpPr>
-                <p:cNvPr id="126" name="Oval 125">
+                <p:cNvPr id="98" name="Oval 97">
                   <a:extLst>
                     <a:ext uri="{FF2B5EF4-FFF2-40B4-BE49-F238E27FC236}">
-                      <a16:creationId xmlns:a16="http://schemas.microsoft.com/office/drawing/2014/main" id="{0B2EE560-3AF6-445B-AEB5-86B5BDCC7B48}"/>
+                      <a16:creationId xmlns:a16="http://schemas.microsoft.com/office/drawing/2014/main" id="{CE05CF79-F0AF-45F0-B38E-F49010546DB3}"/>
                     </a:ext>
                   </a:extLst>
                 </p:cNvPr>
@@ -9539,10 +9551,10 @@
             </p:sp>
             <p:sp>
               <p:nvSpPr>
-                <p:cNvPr id="127" name="Oval 126">
+                <p:cNvPr id="99" name="Oval 98">
                   <a:extLst>
                     <a:ext uri="{FF2B5EF4-FFF2-40B4-BE49-F238E27FC236}">
-                      <a16:creationId xmlns:a16="http://schemas.microsoft.com/office/drawing/2014/main" id="{DCAB8777-0FC1-4DC7-8763-D1381333499B}"/>
+                      <a16:creationId xmlns:a16="http://schemas.microsoft.com/office/drawing/2014/main" id="{9CF4340D-F21D-49BA-A2CC-910886DCBC8D}"/>
                     </a:ext>
                   </a:extLst>
                 </p:cNvPr>
@@ -9596,10 +9608,10 @@
             </p:sp>
             <p:sp>
               <p:nvSpPr>
-                <p:cNvPr id="128" name="Oval 127">
+                <p:cNvPr id="100" name="Oval 99">
                   <a:extLst>
                     <a:ext uri="{FF2B5EF4-FFF2-40B4-BE49-F238E27FC236}">
-                      <a16:creationId xmlns:a16="http://schemas.microsoft.com/office/drawing/2014/main" id="{5A34B453-2148-4640-9C46-5B9F374B16E7}"/>
+                      <a16:creationId xmlns:a16="http://schemas.microsoft.com/office/drawing/2014/main" id="{31E5114A-D420-47ED-A065-E96D9D13A569}"/>
                     </a:ext>
                   </a:extLst>
                 </p:cNvPr>
@@ -9654,10 +9666,10 @@
             </p:sp>
             <p:sp>
               <p:nvSpPr>
-                <p:cNvPr id="129" name="Oval 128">
+                <p:cNvPr id="101" name="Oval 100">
                   <a:extLst>
                     <a:ext uri="{FF2B5EF4-FFF2-40B4-BE49-F238E27FC236}">
-                      <a16:creationId xmlns:a16="http://schemas.microsoft.com/office/drawing/2014/main" id="{B923D84B-18F3-45F4-9427-A1861038F522}"/>
+                      <a16:creationId xmlns:a16="http://schemas.microsoft.com/office/drawing/2014/main" id="{71A9FC9F-9B79-4F17-920F-AB33E321E36A}"/>
                     </a:ext>
                   </a:extLst>
                 </p:cNvPr>
@@ -9716,10 +9728,10 @@
           </p:grpSp>
           <p:sp>
             <p:nvSpPr>
-              <p:cNvPr id="124" name="TextBox 123">
+              <p:cNvPr id="96" name="TextBox 95">
                 <a:extLst>
                   <a:ext uri="{FF2B5EF4-FFF2-40B4-BE49-F238E27FC236}">
-                    <a16:creationId xmlns:a16="http://schemas.microsoft.com/office/drawing/2014/main" id="{027AEEE8-0880-4CB6-97A2-45030F6A68A1}"/>
+                    <a16:creationId xmlns:a16="http://schemas.microsoft.com/office/drawing/2014/main" id="{1EE0DE1C-6F37-4211-A0B5-AD158A0CD6C7}"/>
                   </a:ext>
                 </a:extLst>
               </p:cNvPr>
@@ -9749,7 +9761,7 @@
                 </a:pPr>
                 <a:r>
                   <a:rPr lang="en-US" sz="1400" b="1" dirty="0"/>
-                  <a:t>MHPA</a:t>
+                  <a:t>HAP2</a:t>
                 </a:r>
               </a:p>
               <a:p>
@@ -9793,17 +9805,17 @@
                 </a:pPr>
                 <a:r>
                   <a:rPr lang="en-US" sz="1400" b="1" dirty="0"/>
-                  <a:t>LOGTS</a:t>
+                  <a:t>LoGTS</a:t>
                 </a:r>
               </a:p>
             </p:txBody>
           </p:sp>
           <p:sp>
             <p:nvSpPr>
-              <p:cNvPr id="125" name="TextBox 124">
+              <p:cNvPr id="97" name="TextBox 96">
                 <a:extLst>
                   <a:ext uri="{FF2B5EF4-FFF2-40B4-BE49-F238E27FC236}">
-                    <a16:creationId xmlns:a16="http://schemas.microsoft.com/office/drawing/2014/main" id="{A19B21C9-6004-411D-9B09-D36A874D731E}"/>
+                    <a16:creationId xmlns:a16="http://schemas.microsoft.com/office/drawing/2014/main" id="{16D92C63-3DF6-48CC-A46E-39E53BAB1DB8}"/>
                   </a:ext>
                 </a:extLst>
               </p:cNvPr>
@@ -9846,10 +9858,10 @@
         </p:grpSp>
         <p:sp>
           <p:nvSpPr>
-            <p:cNvPr id="122" name="Oval 121">
+            <p:cNvPr id="94" name="Oval 93">
               <a:extLst>
                 <a:ext uri="{FF2B5EF4-FFF2-40B4-BE49-F238E27FC236}">
-                  <a16:creationId xmlns:a16="http://schemas.microsoft.com/office/drawing/2014/main" id="{C42A5BEE-E693-46AD-8211-F80D19A19FCD}"/>
+                  <a16:creationId xmlns:a16="http://schemas.microsoft.com/office/drawing/2014/main" id="{30CFAE8F-E605-4765-BCFC-BBE1C6F8303D}"/>
                 </a:ext>
               </a:extLst>
             </p:cNvPr>
@@ -9902,41 +9914,6 @@
           </p:txBody>
         </p:sp>
       </p:grpSp>
-      <p:pic>
-        <p:nvPicPr>
-          <p:cNvPr id="12" name="Picture 11" descr="A close up of a map&#10;&#10;Description automatically generated">
-            <a:extLst>
-              <a:ext uri="{FF2B5EF4-FFF2-40B4-BE49-F238E27FC236}">
-                <a16:creationId xmlns:a16="http://schemas.microsoft.com/office/drawing/2014/main" id="{33F28D6A-1581-49FA-969F-6096083CFEA9}"/>
-              </a:ext>
-            </a:extLst>
-          </p:cNvPr>
-          <p:cNvPicPr>
-            <a:picLocks noChangeAspect="1"/>
-          </p:cNvPicPr>
-          <p:nvPr/>
-        </p:nvPicPr>
-        <p:blipFill rotWithShape="1">
-          <a:blip r:embed="rId4">
-            <a:extLst>
-              <a:ext uri="{28A0092B-C50C-407E-A947-70E740481C1C}">
-                <a14:useLocalDpi xmlns:a14="http://schemas.microsoft.com/office/drawing/2010/main" val="0"/>
-              </a:ext>
-            </a:extLst>
-          </a:blip>
-          <a:srcRect l="1047" r="16157"/>
-          <a:stretch/>
-        </p:blipFill>
-        <p:spPr>
-          <a:xfrm>
-            <a:off x="-1" y="2736742"/>
-            <a:ext cx="10474991" cy="4115374"/>
-          </a:xfrm>
-          <a:prstGeom prst="rect">
-            <a:avLst/>
-          </a:prstGeom>
-        </p:spPr>
-      </p:pic>
     </p:spTree>
     <p:extLst>
       <p:ext uri="{BB962C8B-B14F-4D97-AF65-F5344CB8AC3E}">
@@ -9967,403 +9944,6 @@
           <a:chExt cx="0" cy="0"/>
         </a:xfrm>
       </p:grpSpPr>
-      <p:grpSp>
-        <p:nvGrpSpPr>
-          <p:cNvPr id="97" name="Group 96">
-            <a:extLst>
-              <a:ext uri="{FF2B5EF4-FFF2-40B4-BE49-F238E27FC236}">
-                <a16:creationId xmlns:a16="http://schemas.microsoft.com/office/drawing/2014/main" id="{1DEF5049-24D5-4A7F-A457-1D43B9295BBC}"/>
-              </a:ext>
-            </a:extLst>
-          </p:cNvPr>
-          <p:cNvGrpSpPr/>
-          <p:nvPr/>
-        </p:nvGrpSpPr>
-        <p:grpSpPr>
-          <a:xfrm>
-            <a:off x="10461098" y="3523041"/>
-            <a:ext cx="1198936" cy="1713072"/>
-            <a:chOff x="102789" y="3096980"/>
-            <a:chExt cx="1198936" cy="1713072"/>
-          </a:xfrm>
-        </p:grpSpPr>
-        <p:grpSp>
-          <p:nvGrpSpPr>
-            <p:cNvPr id="98" name="Group 97">
-              <a:extLst>
-                <a:ext uri="{FF2B5EF4-FFF2-40B4-BE49-F238E27FC236}">
-                  <a16:creationId xmlns:a16="http://schemas.microsoft.com/office/drawing/2014/main" id="{329F01C5-BE82-4F40-AFB5-65E18A2E3DD8}"/>
-                </a:ext>
-              </a:extLst>
-            </p:cNvPr>
-            <p:cNvGrpSpPr/>
-            <p:nvPr/>
-          </p:nvGrpSpPr>
-          <p:grpSpPr>
-            <a:xfrm>
-              <a:off x="193260" y="3453334"/>
-              <a:ext cx="350326" cy="1356718"/>
-              <a:chOff x="612899" y="1163899"/>
-              <a:chExt cx="395647" cy="1654737"/>
-            </a:xfrm>
-          </p:grpSpPr>
-          <p:sp>
-            <p:nvSpPr>
-              <p:cNvPr id="101" name="Oval 100">
-                <a:extLst>
-                  <a:ext uri="{FF2B5EF4-FFF2-40B4-BE49-F238E27FC236}">
-                    <a16:creationId xmlns:a16="http://schemas.microsoft.com/office/drawing/2014/main" id="{ABD4714A-2318-43D8-8E69-0959044E5993}"/>
-                  </a:ext>
-                </a:extLst>
-              </p:cNvPr>
-              <p:cNvSpPr/>
-              <p:nvPr/>
-            </p:nvSpPr>
-            <p:spPr>
-              <a:xfrm>
-                <a:off x="613108" y="2442839"/>
-                <a:ext cx="395437" cy="375797"/>
-              </a:xfrm>
-              <a:prstGeom prst="ellipse">
-                <a:avLst/>
-              </a:prstGeom>
-              <a:solidFill>
-                <a:srgbClr val="00B0F0">
-                  <a:alpha val="30196"/>
-                </a:srgbClr>
-              </a:solidFill>
-              <a:ln w="19050">
-                <a:solidFill>
-                  <a:schemeClr val="tx1"/>
-                </a:solidFill>
-                <a:prstDash val="sysDash"/>
-              </a:ln>
-            </p:spPr>
-            <p:style>
-              <a:lnRef idx="2">
-                <a:schemeClr val="accent1">
-                  <a:shade val="50000"/>
-                </a:schemeClr>
-              </a:lnRef>
-              <a:fillRef idx="1">
-                <a:schemeClr val="accent1"/>
-              </a:fillRef>
-              <a:effectRef idx="0">
-                <a:schemeClr val="accent1"/>
-              </a:effectRef>
-              <a:fontRef idx="minor">
-                <a:schemeClr val="lt1"/>
-              </a:fontRef>
-            </p:style>
-            <p:txBody>
-              <a:bodyPr rtlCol="0" anchor="ctr"/>
-              <a:lstStyle/>
-              <a:p>
-                <a:pPr algn="ctr"/>
-                <a:endParaRPr lang="en-US"/>
-              </a:p>
-            </p:txBody>
-          </p:sp>
-          <p:sp>
-            <p:nvSpPr>
-              <p:cNvPr id="102" name="Oval 101">
-                <a:extLst>
-                  <a:ext uri="{FF2B5EF4-FFF2-40B4-BE49-F238E27FC236}">
-                    <a16:creationId xmlns:a16="http://schemas.microsoft.com/office/drawing/2014/main" id="{F52D2641-E7FB-4F26-BC4A-A3E91AA08E1B}"/>
-                  </a:ext>
-                </a:extLst>
-              </p:cNvPr>
-              <p:cNvSpPr/>
-              <p:nvPr/>
-            </p:nvSpPr>
-            <p:spPr>
-              <a:xfrm>
-                <a:off x="613107" y="2010281"/>
-                <a:ext cx="395438" cy="375800"/>
-              </a:xfrm>
-              <a:prstGeom prst="ellipse">
-                <a:avLst/>
-              </a:prstGeom>
-              <a:solidFill>
-                <a:srgbClr val="FF0000">
-                  <a:alpha val="30196"/>
-                </a:srgbClr>
-              </a:solidFill>
-              <a:ln w="19050">
-                <a:solidFill>
-                  <a:schemeClr val="tx1"/>
-                </a:solidFill>
-                <a:prstDash val="dash"/>
-              </a:ln>
-            </p:spPr>
-            <p:style>
-              <a:lnRef idx="2">
-                <a:schemeClr val="accent1">
-                  <a:shade val="50000"/>
-                </a:schemeClr>
-              </a:lnRef>
-              <a:fillRef idx="1">
-                <a:schemeClr val="accent1"/>
-              </a:fillRef>
-              <a:effectRef idx="0">
-                <a:schemeClr val="accent1"/>
-              </a:effectRef>
-              <a:fontRef idx="minor">
-                <a:schemeClr val="lt1"/>
-              </a:fontRef>
-            </p:style>
-            <p:txBody>
-              <a:bodyPr rtlCol="0" anchor="ctr"/>
-              <a:lstStyle/>
-              <a:p>
-                <a:pPr algn="ctr"/>
-                <a:endParaRPr lang="en-US"/>
-              </a:p>
-            </p:txBody>
-          </p:sp>
-          <p:sp>
-            <p:nvSpPr>
-              <p:cNvPr id="103" name="Oval 102">
-                <a:extLst>
-                  <a:ext uri="{FF2B5EF4-FFF2-40B4-BE49-F238E27FC236}">
-                    <a16:creationId xmlns:a16="http://schemas.microsoft.com/office/drawing/2014/main" id="{52563AA7-4204-4037-A1E5-A157E64FE63B}"/>
-                  </a:ext>
-                </a:extLst>
-              </p:cNvPr>
-              <p:cNvSpPr/>
-              <p:nvPr/>
-            </p:nvSpPr>
-            <p:spPr>
-              <a:xfrm>
-                <a:off x="612899" y="1163899"/>
-                <a:ext cx="395439" cy="375797"/>
-              </a:xfrm>
-              <a:prstGeom prst="ellipse">
-                <a:avLst/>
-              </a:prstGeom>
-              <a:blipFill dpi="0" rotWithShape="1">
-                <a:blip r:embed="rId3">
-                  <a:alphaModFix amt="53000"/>
-                </a:blip>
-                <a:srcRect/>
-                <a:tile tx="0" ty="0" sx="100000" sy="100000" flip="none" algn="tl"/>
-              </a:blipFill>
-              <a:ln w="19050">
-                <a:solidFill>
-                  <a:schemeClr val="tx1"/>
-                </a:solidFill>
-              </a:ln>
-            </p:spPr>
-            <p:style>
-              <a:lnRef idx="2">
-                <a:schemeClr val="accent1">
-                  <a:shade val="50000"/>
-                </a:schemeClr>
-              </a:lnRef>
-              <a:fillRef idx="1">
-                <a:schemeClr val="accent1"/>
-              </a:fillRef>
-              <a:effectRef idx="0">
-                <a:schemeClr val="accent1"/>
-              </a:effectRef>
-              <a:fontRef idx="minor">
-                <a:schemeClr val="lt1"/>
-              </a:fontRef>
-            </p:style>
-            <p:txBody>
-              <a:bodyPr rtlCol="0" anchor="ctr"/>
-              <a:lstStyle/>
-              <a:p>
-                <a:pPr algn="ctr"/>
-                <a:endParaRPr lang="en-US"/>
-              </a:p>
-            </p:txBody>
-          </p:sp>
-          <p:sp>
-            <p:nvSpPr>
-              <p:cNvPr id="104" name="Oval 103">
-                <a:extLst>
-                  <a:ext uri="{FF2B5EF4-FFF2-40B4-BE49-F238E27FC236}">
-                    <a16:creationId xmlns:a16="http://schemas.microsoft.com/office/drawing/2014/main" id="{8CE94D1A-A119-4F8B-888B-E3C3DFDFA06C}"/>
-                  </a:ext>
-                </a:extLst>
-              </p:cNvPr>
-              <p:cNvSpPr/>
-              <p:nvPr/>
-            </p:nvSpPr>
-            <p:spPr>
-              <a:xfrm>
-                <a:off x="613107" y="1587722"/>
-                <a:ext cx="395439" cy="375800"/>
-              </a:xfrm>
-              <a:prstGeom prst="ellipse">
-                <a:avLst/>
-              </a:prstGeom>
-              <a:solidFill>
-                <a:srgbClr val="FFFF00">
-                  <a:alpha val="30196"/>
-                </a:srgbClr>
-              </a:solidFill>
-              <a:ln w="19050">
-                <a:solidFill>
-                  <a:schemeClr val="tx1"/>
-                </a:solidFill>
-                <a:prstDash val="sysDot"/>
-              </a:ln>
-            </p:spPr>
-            <p:style>
-              <a:lnRef idx="2">
-                <a:schemeClr val="accent1">
-                  <a:shade val="50000"/>
-                </a:schemeClr>
-              </a:lnRef>
-              <a:fillRef idx="1">
-                <a:schemeClr val="accent1"/>
-              </a:fillRef>
-              <a:effectRef idx="0">
-                <a:schemeClr val="accent1"/>
-              </a:effectRef>
-              <a:fontRef idx="minor">
-                <a:schemeClr val="lt1"/>
-              </a:fontRef>
-            </p:style>
-            <p:txBody>
-              <a:bodyPr rtlCol="0" anchor="ctr"/>
-              <a:lstStyle/>
-              <a:p>
-                <a:pPr algn="ctr"/>
-                <a:endParaRPr lang="en-US" dirty="0">
-                  <a:solidFill>
-                    <a:schemeClr val="tx1"/>
-                  </a:solidFill>
-                </a:endParaRPr>
-              </a:p>
-            </p:txBody>
-          </p:sp>
-        </p:grpSp>
-        <p:sp>
-          <p:nvSpPr>
-            <p:cNvPr id="99" name="TextBox 98">
-              <a:extLst>
-                <a:ext uri="{FF2B5EF4-FFF2-40B4-BE49-F238E27FC236}">
-                  <a16:creationId xmlns:a16="http://schemas.microsoft.com/office/drawing/2014/main" id="{DDFFC7ED-B194-4FC5-91B0-255B2173939F}"/>
-                </a:ext>
-              </a:extLst>
-            </p:cNvPr>
-            <p:cNvSpPr txBox="1"/>
-            <p:nvPr/>
-          </p:nvSpPr>
-          <p:spPr>
-            <a:xfrm>
-              <a:off x="545080" y="3427857"/>
-              <a:ext cx="756645" cy="1377300"/>
-            </a:xfrm>
-            <a:prstGeom prst="rect">
-              <a:avLst/>
-            </a:prstGeom>
-            <a:noFill/>
-          </p:spPr>
-          <p:txBody>
-            <a:bodyPr wrap="square" rtlCol="0">
-              <a:spAutoFit/>
-            </a:bodyPr>
-            <a:lstStyle/>
-            <a:p>
-              <a:pPr>
-                <a:spcAft>
-                  <a:spcPts val="1100"/>
-                </a:spcAft>
-              </a:pPr>
-              <a:r>
-                <a:rPr lang="en-US" sz="1400" b="1" dirty="0"/>
-                <a:t>GHT</a:t>
-              </a:r>
-            </a:p>
-            <a:p>
-              <a:pPr>
-                <a:spcAft>
-                  <a:spcPts val="1100"/>
-                </a:spcAft>
-              </a:pPr>
-              <a:r>
-                <a:rPr lang="en-US" sz="1400" b="1" dirty="0"/>
-                <a:t>Foster</a:t>
-              </a:r>
-            </a:p>
-            <a:p>
-              <a:pPr>
-                <a:spcAft>
-                  <a:spcPts val="1100"/>
-                </a:spcAft>
-              </a:pPr>
-              <a:r>
-                <a:rPr lang="en-US" sz="1400" b="1" dirty="0">
-                  <a:solidFill>
-                    <a:schemeClr val="tx1"/>
-                  </a:solidFill>
-                </a:rPr>
-                <a:t>MHPA</a:t>
-              </a:r>
-            </a:p>
-            <a:p>
-              <a:pPr>
-                <a:spcAft>
-                  <a:spcPts val="1100"/>
-                </a:spcAft>
-              </a:pPr>
-              <a:r>
-                <a:rPr lang="en-US" sz="1400" b="1" dirty="0"/>
-                <a:t>UKGTS</a:t>
-              </a:r>
-            </a:p>
-          </p:txBody>
-        </p:sp>
-        <p:sp>
-          <p:nvSpPr>
-            <p:cNvPr id="100" name="TextBox 99">
-              <a:extLst>
-                <a:ext uri="{FF2B5EF4-FFF2-40B4-BE49-F238E27FC236}">
-                  <a16:creationId xmlns:a16="http://schemas.microsoft.com/office/drawing/2014/main" id="{EAD8081A-6C91-42D7-AAC1-FEDD21D02A3C}"/>
-                </a:ext>
-              </a:extLst>
-            </p:cNvPr>
-            <p:cNvSpPr txBox="1"/>
-            <p:nvPr/>
-          </p:nvSpPr>
-          <p:spPr>
-            <a:xfrm>
-              <a:off x="102789" y="3096980"/>
-              <a:ext cx="994491" cy="338554"/>
-            </a:xfrm>
-            <a:prstGeom prst="rect">
-              <a:avLst/>
-            </a:prstGeom>
-            <a:noFill/>
-          </p:spPr>
-          <p:txBody>
-            <a:bodyPr wrap="square" rtlCol="0">
-              <a:spAutoFit/>
-            </a:bodyPr>
-            <a:lstStyle/>
-            <a:p>
-              <a:pPr>
-                <a:spcAft>
-                  <a:spcPts val="1100"/>
-                </a:spcAft>
-              </a:pPr>
-              <a:r>
-                <a:rPr lang="en-US" sz="1600" b="1" dirty="0"/>
-                <a:t>Legend</a:t>
-              </a:r>
-              <a:endParaRPr lang="en-US" sz="1600" b="1" dirty="0">
-                <a:solidFill>
-                  <a:schemeClr val="tx1"/>
-                </a:solidFill>
-              </a:endParaRPr>
-            </a:p>
-          </p:txBody>
-        </p:sp>
-      </p:grpSp>
       <p:pic>
         <p:nvPicPr>
           <p:cNvPr id="3" name="Picture 2" descr="A close up of a map&#10;&#10;Description automatically generated">
@@ -10378,28 +9958,509 @@
           </p:cNvPicPr>
           <p:nvPr/>
         </p:nvPicPr>
-        <p:blipFill>
-          <a:blip r:embed="rId4">
+        <p:blipFill rotWithShape="1">
+          <a:blip r:embed="rId3">
             <a:extLst>
               <a:ext uri="{28A0092B-C50C-407E-A947-70E740481C1C}">
                 <a14:useLocalDpi xmlns:a14="http://schemas.microsoft.com/office/drawing/2010/main" val="0"/>
               </a:ext>
             </a:extLst>
           </a:blip>
-          <a:stretch>
-            <a:fillRect/>
-          </a:stretch>
+          <a:srcRect r="15602"/>
+          <a:stretch/>
         </p:blipFill>
         <p:spPr>
           <a:xfrm>
-            <a:off x="751729" y="1352260"/>
-            <a:ext cx="10688542" cy="4153480"/>
+            <a:off x="1456579" y="1352260"/>
+            <a:ext cx="9020921" cy="4153480"/>
           </a:xfrm>
           <a:prstGeom prst="rect">
             <a:avLst/>
           </a:prstGeom>
         </p:spPr>
       </p:pic>
+      <p:grpSp>
+        <p:nvGrpSpPr>
+          <p:cNvPr id="11" name="Group 10">
+            <a:extLst>
+              <a:ext uri="{FF2B5EF4-FFF2-40B4-BE49-F238E27FC236}">
+                <a16:creationId xmlns:a16="http://schemas.microsoft.com/office/drawing/2014/main" id="{CABE5F50-381C-4EB7-887C-EE798BC8A4DB}"/>
+              </a:ext>
+            </a:extLst>
+          </p:cNvPr>
+          <p:cNvGrpSpPr/>
+          <p:nvPr/>
+        </p:nvGrpSpPr>
+        <p:grpSpPr>
+          <a:xfrm>
+            <a:off x="10508306" y="1898323"/>
+            <a:ext cx="1198936" cy="2064685"/>
+            <a:chOff x="10702963" y="2935785"/>
+            <a:chExt cx="1198936" cy="2064685"/>
+          </a:xfrm>
+        </p:grpSpPr>
+        <p:grpSp>
+          <p:nvGrpSpPr>
+            <p:cNvPr id="12" name="Group 11">
+              <a:extLst>
+                <a:ext uri="{FF2B5EF4-FFF2-40B4-BE49-F238E27FC236}">
+                  <a16:creationId xmlns:a16="http://schemas.microsoft.com/office/drawing/2014/main" id="{D92D10BC-352A-4A60-87B0-ED0C16C16C03}"/>
+                </a:ext>
+              </a:extLst>
+            </p:cNvPr>
+            <p:cNvGrpSpPr/>
+            <p:nvPr/>
+          </p:nvGrpSpPr>
+          <p:grpSpPr>
+            <a:xfrm>
+              <a:off x="10702963" y="2935785"/>
+              <a:ext cx="1198936" cy="2064685"/>
+              <a:chOff x="102789" y="3096980"/>
+              <a:chExt cx="1198936" cy="2064685"/>
+            </a:xfrm>
+          </p:grpSpPr>
+          <p:grpSp>
+            <p:nvGrpSpPr>
+              <p:cNvPr id="14" name="Group 13">
+                <a:extLst>
+                  <a:ext uri="{FF2B5EF4-FFF2-40B4-BE49-F238E27FC236}">
+                    <a16:creationId xmlns:a16="http://schemas.microsoft.com/office/drawing/2014/main" id="{F98C2255-34C1-44E1-90C5-1F90C00C789E}"/>
+                  </a:ext>
+                </a:extLst>
+              </p:cNvPr>
+              <p:cNvGrpSpPr/>
+              <p:nvPr/>
+            </p:nvGrpSpPr>
+            <p:grpSpPr>
+              <a:xfrm>
+                <a:off x="193260" y="3444337"/>
+                <a:ext cx="350327" cy="1350413"/>
+                <a:chOff x="612898" y="1152920"/>
+                <a:chExt cx="395648" cy="1647041"/>
+              </a:xfrm>
+            </p:grpSpPr>
+            <p:sp>
+              <p:nvSpPr>
+                <p:cNvPr id="17" name="Oval 16">
+                  <a:extLst>
+                    <a:ext uri="{FF2B5EF4-FFF2-40B4-BE49-F238E27FC236}">
+                      <a16:creationId xmlns:a16="http://schemas.microsoft.com/office/drawing/2014/main" id="{1FB43D1E-A8F6-49E3-B4F6-43F5B1E4296A}"/>
+                    </a:ext>
+                  </a:extLst>
+                </p:cNvPr>
+                <p:cNvSpPr/>
+                <p:nvPr/>
+              </p:nvSpPr>
+              <p:spPr>
+                <a:xfrm>
+                  <a:off x="612899" y="1585478"/>
+                  <a:ext cx="395437" cy="375797"/>
+                </a:xfrm>
+                <a:prstGeom prst="ellipse">
+                  <a:avLst/>
+                </a:prstGeom>
+                <a:solidFill>
+                  <a:srgbClr val="00B0F0">
+                    <a:alpha val="30196"/>
+                  </a:srgbClr>
+                </a:solidFill>
+                <a:ln w="19050">
+                  <a:solidFill>
+                    <a:schemeClr val="tx1"/>
+                  </a:solidFill>
+                  <a:prstDash val="sysDash"/>
+                </a:ln>
+              </p:spPr>
+              <p:style>
+                <a:lnRef idx="2">
+                  <a:schemeClr val="accent1">
+                    <a:shade val="50000"/>
+                  </a:schemeClr>
+                </a:lnRef>
+                <a:fillRef idx="1">
+                  <a:schemeClr val="accent1"/>
+                </a:fillRef>
+                <a:effectRef idx="0">
+                  <a:schemeClr val="accent1"/>
+                </a:effectRef>
+                <a:fontRef idx="minor">
+                  <a:schemeClr val="lt1"/>
+                </a:fontRef>
+              </p:style>
+              <p:txBody>
+                <a:bodyPr rtlCol="0" anchor="ctr"/>
+                <a:lstStyle/>
+                <a:p>
+                  <a:pPr algn="ctr"/>
+                  <a:endParaRPr lang="en-US"/>
+                </a:p>
+              </p:txBody>
+            </p:sp>
+            <p:sp>
+              <p:nvSpPr>
+                <p:cNvPr id="18" name="Oval 17">
+                  <a:extLst>
+                    <a:ext uri="{FF2B5EF4-FFF2-40B4-BE49-F238E27FC236}">
+                      <a16:creationId xmlns:a16="http://schemas.microsoft.com/office/drawing/2014/main" id="{9AB38A5D-B487-4B92-A00D-821F5DBD8C03}"/>
+                    </a:ext>
+                  </a:extLst>
+                </p:cNvPr>
+                <p:cNvSpPr/>
+                <p:nvPr/>
+              </p:nvSpPr>
+              <p:spPr>
+                <a:xfrm>
+                  <a:off x="612898" y="1152920"/>
+                  <a:ext cx="395438" cy="375800"/>
+                </a:xfrm>
+                <a:prstGeom prst="ellipse">
+                  <a:avLst/>
+                </a:prstGeom>
+                <a:solidFill>
+                  <a:srgbClr val="FF0000">
+                    <a:alpha val="30196"/>
+                  </a:srgbClr>
+                </a:solidFill>
+                <a:ln w="19050">
+                  <a:solidFill>
+                    <a:schemeClr val="tx1"/>
+                  </a:solidFill>
+                  <a:prstDash val="dash"/>
+                </a:ln>
+              </p:spPr>
+              <p:style>
+                <a:lnRef idx="2">
+                  <a:schemeClr val="accent1">
+                    <a:shade val="50000"/>
+                  </a:schemeClr>
+                </a:lnRef>
+                <a:fillRef idx="1">
+                  <a:schemeClr val="accent1"/>
+                </a:fillRef>
+                <a:effectRef idx="0">
+                  <a:schemeClr val="accent1"/>
+                </a:effectRef>
+                <a:fontRef idx="minor">
+                  <a:schemeClr val="lt1"/>
+                </a:fontRef>
+              </p:style>
+              <p:txBody>
+                <a:bodyPr rtlCol="0" anchor="ctr"/>
+                <a:lstStyle/>
+                <a:p>
+                  <a:pPr algn="ctr"/>
+                  <a:endParaRPr lang="en-US"/>
+                </a:p>
+              </p:txBody>
+            </p:sp>
+            <p:sp>
+              <p:nvSpPr>
+                <p:cNvPr id="19" name="Oval 18">
+                  <a:extLst>
+                    <a:ext uri="{FF2B5EF4-FFF2-40B4-BE49-F238E27FC236}">
+                      <a16:creationId xmlns:a16="http://schemas.microsoft.com/office/drawing/2014/main" id="{AFCB75A0-BC8F-4C69-881E-7BE3B289B083}"/>
+                    </a:ext>
+                  </a:extLst>
+                </p:cNvPr>
+                <p:cNvSpPr/>
+                <p:nvPr/>
+              </p:nvSpPr>
+              <p:spPr>
+                <a:xfrm>
+                  <a:off x="612899" y="2000339"/>
+                  <a:ext cx="395439" cy="375797"/>
+                </a:xfrm>
+                <a:prstGeom prst="ellipse">
+                  <a:avLst/>
+                </a:prstGeom>
+                <a:blipFill dpi="0" rotWithShape="1">
+                  <a:blip r:embed="rId4">
+                    <a:alphaModFix amt="53000"/>
+                  </a:blip>
+                  <a:srcRect/>
+                  <a:tile tx="0" ty="0" sx="100000" sy="100000" flip="none" algn="tl"/>
+                </a:blipFill>
+                <a:ln w="19050">
+                  <a:solidFill>
+                    <a:schemeClr val="tx1"/>
+                  </a:solidFill>
+                </a:ln>
+              </p:spPr>
+              <p:style>
+                <a:lnRef idx="2">
+                  <a:schemeClr val="accent1">
+                    <a:shade val="50000"/>
+                  </a:schemeClr>
+                </a:lnRef>
+                <a:fillRef idx="1">
+                  <a:schemeClr val="accent1"/>
+                </a:fillRef>
+                <a:effectRef idx="0">
+                  <a:schemeClr val="accent1"/>
+                </a:effectRef>
+                <a:fontRef idx="minor">
+                  <a:schemeClr val="lt1"/>
+                </a:fontRef>
+              </p:style>
+              <p:txBody>
+                <a:bodyPr rtlCol="0" anchor="ctr"/>
+                <a:lstStyle/>
+                <a:p>
+                  <a:pPr algn="ctr"/>
+                  <a:endParaRPr lang="en-US"/>
+                </a:p>
+              </p:txBody>
+            </p:sp>
+            <p:sp>
+              <p:nvSpPr>
+                <p:cNvPr id="20" name="Oval 19">
+                  <a:extLst>
+                    <a:ext uri="{FF2B5EF4-FFF2-40B4-BE49-F238E27FC236}">
+                      <a16:creationId xmlns:a16="http://schemas.microsoft.com/office/drawing/2014/main" id="{D2576883-5EB4-4FD2-8871-A8818E31F536}"/>
+                    </a:ext>
+                  </a:extLst>
+                </p:cNvPr>
+                <p:cNvSpPr/>
+                <p:nvPr/>
+              </p:nvSpPr>
+              <p:spPr>
+                <a:xfrm>
+                  <a:off x="613107" y="2424163"/>
+                  <a:ext cx="395439" cy="375798"/>
+                </a:xfrm>
+                <a:prstGeom prst="ellipse">
+                  <a:avLst/>
+                </a:prstGeom>
+                <a:solidFill>
+                  <a:srgbClr val="FFFF00">
+                    <a:alpha val="30196"/>
+                  </a:srgbClr>
+                </a:solidFill>
+                <a:ln w="19050">
+                  <a:solidFill>
+                    <a:schemeClr val="tx1"/>
+                  </a:solidFill>
+                  <a:prstDash val="sysDot"/>
+                </a:ln>
+              </p:spPr>
+              <p:style>
+                <a:lnRef idx="2">
+                  <a:schemeClr val="accent1">
+                    <a:shade val="50000"/>
+                  </a:schemeClr>
+                </a:lnRef>
+                <a:fillRef idx="1">
+                  <a:schemeClr val="accent1"/>
+                </a:fillRef>
+                <a:effectRef idx="0">
+                  <a:schemeClr val="accent1"/>
+                </a:effectRef>
+                <a:fontRef idx="minor">
+                  <a:schemeClr val="lt1"/>
+                </a:fontRef>
+              </p:style>
+              <p:txBody>
+                <a:bodyPr rtlCol="0" anchor="ctr"/>
+                <a:lstStyle/>
+                <a:p>
+                  <a:pPr algn="ctr"/>
+                  <a:endParaRPr lang="en-US" dirty="0">
+                    <a:solidFill>
+                      <a:schemeClr val="tx1"/>
+                    </a:solidFill>
+                  </a:endParaRPr>
+                </a:p>
+              </p:txBody>
+            </p:sp>
+          </p:grpSp>
+          <p:sp>
+            <p:nvSpPr>
+              <p:cNvPr id="15" name="TextBox 14">
+                <a:extLst>
+                  <a:ext uri="{FF2B5EF4-FFF2-40B4-BE49-F238E27FC236}">
+                    <a16:creationId xmlns:a16="http://schemas.microsoft.com/office/drawing/2014/main" id="{C0497E51-F141-4C31-A105-09D6804ADCD7}"/>
+                  </a:ext>
+                </a:extLst>
+              </p:cNvPr>
+              <p:cNvSpPr txBox="1"/>
+              <p:nvPr/>
+            </p:nvSpPr>
+            <p:spPr>
+              <a:xfrm>
+                <a:off x="545080" y="3427857"/>
+                <a:ext cx="756645" cy="1733808"/>
+              </a:xfrm>
+              <a:prstGeom prst="rect">
+                <a:avLst/>
+              </a:prstGeom>
+              <a:noFill/>
+            </p:spPr>
+            <p:txBody>
+              <a:bodyPr wrap="square" rtlCol="0">
+                <a:spAutoFit/>
+              </a:bodyPr>
+              <a:lstStyle/>
+              <a:p>
+                <a:pPr>
+                  <a:spcAft>
+                    <a:spcPts val="1100"/>
+                  </a:spcAft>
+                </a:pPr>
+                <a:r>
+                  <a:rPr lang="en-US" sz="1400" b="1" dirty="0"/>
+                  <a:t>HAP2</a:t>
+                </a:r>
+              </a:p>
+              <a:p>
+                <a:pPr>
+                  <a:spcAft>
+                    <a:spcPts val="1100"/>
+                  </a:spcAft>
+                </a:pPr>
+                <a:r>
+                  <a:rPr lang="en-US" sz="1400" b="1" dirty="0"/>
+                  <a:t>UKGTS</a:t>
+                </a:r>
+              </a:p>
+              <a:p>
+                <a:pPr>
+                  <a:spcAft>
+                    <a:spcPts val="1100"/>
+                  </a:spcAft>
+                </a:pPr>
+                <a:r>
+                  <a:rPr lang="en-US" sz="1400" b="1" dirty="0"/>
+                  <a:t>GHT</a:t>
+                </a:r>
+              </a:p>
+              <a:p>
+                <a:pPr>
+                  <a:spcAft>
+                    <a:spcPts val="1100"/>
+                  </a:spcAft>
+                </a:pPr>
+                <a:r>
+                  <a:rPr lang="en-US" sz="1400" b="1" dirty="0"/>
+                  <a:t>Foster</a:t>
+                </a:r>
+              </a:p>
+              <a:p>
+                <a:pPr>
+                  <a:spcAft>
+                    <a:spcPts val="1100"/>
+                  </a:spcAft>
+                </a:pPr>
+                <a:r>
+                  <a:rPr lang="en-US" sz="1400" b="1" dirty="0"/>
+                  <a:t>LoGTS</a:t>
+                </a:r>
+              </a:p>
+            </p:txBody>
+          </p:sp>
+          <p:sp>
+            <p:nvSpPr>
+              <p:cNvPr id="16" name="TextBox 15">
+                <a:extLst>
+                  <a:ext uri="{FF2B5EF4-FFF2-40B4-BE49-F238E27FC236}">
+                    <a16:creationId xmlns:a16="http://schemas.microsoft.com/office/drawing/2014/main" id="{AD70144F-3D48-438E-8668-FF62480D0A60}"/>
+                  </a:ext>
+                </a:extLst>
+              </p:cNvPr>
+              <p:cNvSpPr txBox="1"/>
+              <p:nvPr/>
+            </p:nvSpPr>
+            <p:spPr>
+              <a:xfrm>
+                <a:off x="102789" y="3096980"/>
+                <a:ext cx="994491" cy="338554"/>
+              </a:xfrm>
+              <a:prstGeom prst="rect">
+                <a:avLst/>
+              </a:prstGeom>
+              <a:noFill/>
+            </p:spPr>
+            <p:txBody>
+              <a:bodyPr wrap="square" rtlCol="0">
+                <a:spAutoFit/>
+              </a:bodyPr>
+              <a:lstStyle/>
+              <a:p>
+                <a:pPr>
+                  <a:spcAft>
+                    <a:spcPts val="1100"/>
+                  </a:spcAft>
+                </a:pPr>
+                <a:r>
+                  <a:rPr lang="en-US" sz="1600" b="1" dirty="0"/>
+                  <a:t>Legend</a:t>
+                </a:r>
+                <a:endParaRPr lang="en-US" sz="1600" b="1" dirty="0">
+                  <a:solidFill>
+                    <a:schemeClr val="tx1"/>
+                  </a:solidFill>
+                </a:endParaRPr>
+              </a:p>
+            </p:txBody>
+          </p:sp>
+        </p:grpSp>
+        <p:sp>
+          <p:nvSpPr>
+            <p:cNvPr id="13" name="Oval 12">
+              <a:extLst>
+                <a:ext uri="{FF2B5EF4-FFF2-40B4-BE49-F238E27FC236}">
+                  <a16:creationId xmlns:a16="http://schemas.microsoft.com/office/drawing/2014/main" id="{F2BB346B-AA74-4C5D-9FF4-C7301D035DC3}"/>
+                </a:ext>
+              </a:extLst>
+            </p:cNvPr>
+            <p:cNvSpPr/>
+            <p:nvPr/>
+          </p:nvSpPr>
+          <p:spPr>
+            <a:xfrm>
+              <a:off x="10793434" y="4682948"/>
+              <a:ext cx="350140" cy="308116"/>
+            </a:xfrm>
+            <a:prstGeom prst="ellipse">
+              <a:avLst/>
+            </a:prstGeom>
+            <a:solidFill>
+              <a:schemeClr val="bg1">
+                <a:alpha val="30196"/>
+              </a:schemeClr>
+            </a:solidFill>
+            <a:ln w="19050">
+              <a:solidFill>
+                <a:schemeClr val="tx1"/>
+              </a:solidFill>
+              <a:prstDash val="dashDot"/>
+            </a:ln>
+          </p:spPr>
+          <p:style>
+            <a:lnRef idx="2">
+              <a:schemeClr val="accent1">
+                <a:shade val="50000"/>
+              </a:schemeClr>
+            </a:lnRef>
+            <a:fillRef idx="1">
+              <a:schemeClr val="accent1"/>
+            </a:fillRef>
+            <a:effectRef idx="0">
+              <a:schemeClr val="accent1"/>
+            </a:effectRef>
+            <a:fontRef idx="minor">
+              <a:schemeClr val="lt1"/>
+            </a:fontRef>
+          </p:style>
+          <p:txBody>
+            <a:bodyPr rtlCol="0" anchor="ctr"/>
+            <a:lstStyle/>
+            <a:p>
+              <a:pPr algn="ctr"/>
+              <a:endParaRPr lang="en-US"/>
+            </a:p>
+          </p:txBody>
+        </p:sp>
+      </p:grpSp>
     </p:spTree>
     <p:extLst>
       <p:ext uri="{BB962C8B-B14F-4D97-AF65-F5344CB8AC3E}">
@@ -10442,403 +10503,6 @@
           <a:chExt cx="0" cy="0"/>
         </a:xfrm>
       </p:grpSpPr>
-      <p:grpSp>
-        <p:nvGrpSpPr>
-          <p:cNvPr id="97" name="Group 96">
-            <a:extLst>
-              <a:ext uri="{FF2B5EF4-FFF2-40B4-BE49-F238E27FC236}">
-                <a16:creationId xmlns:a16="http://schemas.microsoft.com/office/drawing/2014/main" id="{1DEF5049-24D5-4A7F-A457-1D43B9295BBC}"/>
-              </a:ext>
-            </a:extLst>
-          </p:cNvPr>
-          <p:cNvGrpSpPr/>
-          <p:nvPr/>
-        </p:nvGrpSpPr>
-        <p:grpSpPr>
-          <a:xfrm>
-            <a:off x="10461098" y="3523041"/>
-            <a:ext cx="1198936" cy="1713072"/>
-            <a:chOff x="102789" y="3096980"/>
-            <a:chExt cx="1198936" cy="1713072"/>
-          </a:xfrm>
-        </p:grpSpPr>
-        <p:grpSp>
-          <p:nvGrpSpPr>
-            <p:cNvPr id="98" name="Group 97">
-              <a:extLst>
-                <a:ext uri="{FF2B5EF4-FFF2-40B4-BE49-F238E27FC236}">
-                  <a16:creationId xmlns:a16="http://schemas.microsoft.com/office/drawing/2014/main" id="{329F01C5-BE82-4F40-AFB5-65E18A2E3DD8}"/>
-                </a:ext>
-              </a:extLst>
-            </p:cNvPr>
-            <p:cNvGrpSpPr/>
-            <p:nvPr/>
-          </p:nvGrpSpPr>
-          <p:grpSpPr>
-            <a:xfrm>
-              <a:off x="193260" y="3453334"/>
-              <a:ext cx="350326" cy="1356718"/>
-              <a:chOff x="612899" y="1163899"/>
-              <a:chExt cx="395647" cy="1654737"/>
-            </a:xfrm>
-          </p:grpSpPr>
-          <p:sp>
-            <p:nvSpPr>
-              <p:cNvPr id="101" name="Oval 100">
-                <a:extLst>
-                  <a:ext uri="{FF2B5EF4-FFF2-40B4-BE49-F238E27FC236}">
-                    <a16:creationId xmlns:a16="http://schemas.microsoft.com/office/drawing/2014/main" id="{ABD4714A-2318-43D8-8E69-0959044E5993}"/>
-                  </a:ext>
-                </a:extLst>
-              </p:cNvPr>
-              <p:cNvSpPr/>
-              <p:nvPr/>
-            </p:nvSpPr>
-            <p:spPr>
-              <a:xfrm>
-                <a:off x="613108" y="2442839"/>
-                <a:ext cx="395437" cy="375797"/>
-              </a:xfrm>
-              <a:prstGeom prst="ellipse">
-                <a:avLst/>
-              </a:prstGeom>
-              <a:solidFill>
-                <a:srgbClr val="00B0F0">
-                  <a:alpha val="30196"/>
-                </a:srgbClr>
-              </a:solidFill>
-              <a:ln w="19050">
-                <a:solidFill>
-                  <a:schemeClr val="tx1"/>
-                </a:solidFill>
-                <a:prstDash val="sysDash"/>
-              </a:ln>
-            </p:spPr>
-            <p:style>
-              <a:lnRef idx="2">
-                <a:schemeClr val="accent1">
-                  <a:shade val="50000"/>
-                </a:schemeClr>
-              </a:lnRef>
-              <a:fillRef idx="1">
-                <a:schemeClr val="accent1"/>
-              </a:fillRef>
-              <a:effectRef idx="0">
-                <a:schemeClr val="accent1"/>
-              </a:effectRef>
-              <a:fontRef idx="minor">
-                <a:schemeClr val="lt1"/>
-              </a:fontRef>
-            </p:style>
-            <p:txBody>
-              <a:bodyPr rtlCol="0" anchor="ctr"/>
-              <a:lstStyle/>
-              <a:p>
-                <a:pPr algn="ctr"/>
-                <a:endParaRPr lang="en-US"/>
-              </a:p>
-            </p:txBody>
-          </p:sp>
-          <p:sp>
-            <p:nvSpPr>
-              <p:cNvPr id="102" name="Oval 101">
-                <a:extLst>
-                  <a:ext uri="{FF2B5EF4-FFF2-40B4-BE49-F238E27FC236}">
-                    <a16:creationId xmlns:a16="http://schemas.microsoft.com/office/drawing/2014/main" id="{F52D2641-E7FB-4F26-BC4A-A3E91AA08E1B}"/>
-                  </a:ext>
-                </a:extLst>
-              </p:cNvPr>
-              <p:cNvSpPr/>
-              <p:nvPr/>
-            </p:nvSpPr>
-            <p:spPr>
-              <a:xfrm>
-                <a:off x="613107" y="2010281"/>
-                <a:ext cx="395438" cy="375800"/>
-              </a:xfrm>
-              <a:prstGeom prst="ellipse">
-                <a:avLst/>
-              </a:prstGeom>
-              <a:solidFill>
-                <a:srgbClr val="FF0000">
-                  <a:alpha val="30196"/>
-                </a:srgbClr>
-              </a:solidFill>
-              <a:ln w="19050">
-                <a:solidFill>
-                  <a:schemeClr val="tx1"/>
-                </a:solidFill>
-                <a:prstDash val="dash"/>
-              </a:ln>
-            </p:spPr>
-            <p:style>
-              <a:lnRef idx="2">
-                <a:schemeClr val="accent1">
-                  <a:shade val="50000"/>
-                </a:schemeClr>
-              </a:lnRef>
-              <a:fillRef idx="1">
-                <a:schemeClr val="accent1"/>
-              </a:fillRef>
-              <a:effectRef idx="0">
-                <a:schemeClr val="accent1"/>
-              </a:effectRef>
-              <a:fontRef idx="minor">
-                <a:schemeClr val="lt1"/>
-              </a:fontRef>
-            </p:style>
-            <p:txBody>
-              <a:bodyPr rtlCol="0" anchor="ctr"/>
-              <a:lstStyle/>
-              <a:p>
-                <a:pPr algn="ctr"/>
-                <a:endParaRPr lang="en-US"/>
-              </a:p>
-            </p:txBody>
-          </p:sp>
-          <p:sp>
-            <p:nvSpPr>
-              <p:cNvPr id="103" name="Oval 102">
-                <a:extLst>
-                  <a:ext uri="{FF2B5EF4-FFF2-40B4-BE49-F238E27FC236}">
-                    <a16:creationId xmlns:a16="http://schemas.microsoft.com/office/drawing/2014/main" id="{52563AA7-4204-4037-A1E5-A157E64FE63B}"/>
-                  </a:ext>
-                </a:extLst>
-              </p:cNvPr>
-              <p:cNvSpPr/>
-              <p:nvPr/>
-            </p:nvSpPr>
-            <p:spPr>
-              <a:xfrm>
-                <a:off x="612899" y="1163899"/>
-                <a:ext cx="395439" cy="375797"/>
-              </a:xfrm>
-              <a:prstGeom prst="ellipse">
-                <a:avLst/>
-              </a:prstGeom>
-              <a:blipFill dpi="0" rotWithShape="1">
-                <a:blip r:embed="rId3">
-                  <a:alphaModFix amt="53000"/>
-                </a:blip>
-                <a:srcRect/>
-                <a:tile tx="0" ty="0" sx="100000" sy="100000" flip="none" algn="tl"/>
-              </a:blipFill>
-              <a:ln w="19050">
-                <a:solidFill>
-                  <a:schemeClr val="tx1"/>
-                </a:solidFill>
-              </a:ln>
-            </p:spPr>
-            <p:style>
-              <a:lnRef idx="2">
-                <a:schemeClr val="accent1">
-                  <a:shade val="50000"/>
-                </a:schemeClr>
-              </a:lnRef>
-              <a:fillRef idx="1">
-                <a:schemeClr val="accent1"/>
-              </a:fillRef>
-              <a:effectRef idx="0">
-                <a:schemeClr val="accent1"/>
-              </a:effectRef>
-              <a:fontRef idx="minor">
-                <a:schemeClr val="lt1"/>
-              </a:fontRef>
-            </p:style>
-            <p:txBody>
-              <a:bodyPr rtlCol="0" anchor="ctr"/>
-              <a:lstStyle/>
-              <a:p>
-                <a:pPr algn="ctr"/>
-                <a:endParaRPr lang="en-US"/>
-              </a:p>
-            </p:txBody>
-          </p:sp>
-          <p:sp>
-            <p:nvSpPr>
-              <p:cNvPr id="104" name="Oval 103">
-                <a:extLst>
-                  <a:ext uri="{FF2B5EF4-FFF2-40B4-BE49-F238E27FC236}">
-                    <a16:creationId xmlns:a16="http://schemas.microsoft.com/office/drawing/2014/main" id="{8CE94D1A-A119-4F8B-888B-E3C3DFDFA06C}"/>
-                  </a:ext>
-                </a:extLst>
-              </p:cNvPr>
-              <p:cNvSpPr/>
-              <p:nvPr/>
-            </p:nvSpPr>
-            <p:spPr>
-              <a:xfrm>
-                <a:off x="613107" y="1587722"/>
-                <a:ext cx="395439" cy="375800"/>
-              </a:xfrm>
-              <a:prstGeom prst="ellipse">
-                <a:avLst/>
-              </a:prstGeom>
-              <a:solidFill>
-                <a:srgbClr val="FFFF00">
-                  <a:alpha val="30196"/>
-                </a:srgbClr>
-              </a:solidFill>
-              <a:ln w="19050">
-                <a:solidFill>
-                  <a:schemeClr val="tx1"/>
-                </a:solidFill>
-                <a:prstDash val="sysDot"/>
-              </a:ln>
-            </p:spPr>
-            <p:style>
-              <a:lnRef idx="2">
-                <a:schemeClr val="accent1">
-                  <a:shade val="50000"/>
-                </a:schemeClr>
-              </a:lnRef>
-              <a:fillRef idx="1">
-                <a:schemeClr val="accent1"/>
-              </a:fillRef>
-              <a:effectRef idx="0">
-                <a:schemeClr val="accent1"/>
-              </a:effectRef>
-              <a:fontRef idx="minor">
-                <a:schemeClr val="lt1"/>
-              </a:fontRef>
-            </p:style>
-            <p:txBody>
-              <a:bodyPr rtlCol="0" anchor="ctr"/>
-              <a:lstStyle/>
-              <a:p>
-                <a:pPr algn="ctr"/>
-                <a:endParaRPr lang="en-US" dirty="0">
-                  <a:solidFill>
-                    <a:schemeClr val="tx1"/>
-                  </a:solidFill>
-                </a:endParaRPr>
-              </a:p>
-            </p:txBody>
-          </p:sp>
-        </p:grpSp>
-        <p:sp>
-          <p:nvSpPr>
-            <p:cNvPr id="99" name="TextBox 98">
-              <a:extLst>
-                <a:ext uri="{FF2B5EF4-FFF2-40B4-BE49-F238E27FC236}">
-                  <a16:creationId xmlns:a16="http://schemas.microsoft.com/office/drawing/2014/main" id="{DDFFC7ED-B194-4FC5-91B0-255B2173939F}"/>
-                </a:ext>
-              </a:extLst>
-            </p:cNvPr>
-            <p:cNvSpPr txBox="1"/>
-            <p:nvPr/>
-          </p:nvSpPr>
-          <p:spPr>
-            <a:xfrm>
-              <a:off x="545080" y="3427857"/>
-              <a:ext cx="756645" cy="1377300"/>
-            </a:xfrm>
-            <a:prstGeom prst="rect">
-              <a:avLst/>
-            </a:prstGeom>
-            <a:noFill/>
-          </p:spPr>
-          <p:txBody>
-            <a:bodyPr wrap="square" rtlCol="0">
-              <a:spAutoFit/>
-            </a:bodyPr>
-            <a:lstStyle/>
-            <a:p>
-              <a:pPr>
-                <a:spcAft>
-                  <a:spcPts val="1100"/>
-                </a:spcAft>
-              </a:pPr>
-              <a:r>
-                <a:rPr lang="en-US" sz="1400" b="1" dirty="0"/>
-                <a:t>GHT</a:t>
-              </a:r>
-            </a:p>
-            <a:p>
-              <a:pPr>
-                <a:spcAft>
-                  <a:spcPts val="1100"/>
-                </a:spcAft>
-              </a:pPr>
-              <a:r>
-                <a:rPr lang="en-US" sz="1400" b="1" dirty="0"/>
-                <a:t>Foster</a:t>
-              </a:r>
-            </a:p>
-            <a:p>
-              <a:pPr>
-                <a:spcAft>
-                  <a:spcPts val="1100"/>
-                </a:spcAft>
-              </a:pPr>
-              <a:r>
-                <a:rPr lang="en-US" sz="1400" b="1" dirty="0">
-                  <a:solidFill>
-                    <a:schemeClr val="tx1"/>
-                  </a:solidFill>
-                </a:rPr>
-                <a:t>MHPA</a:t>
-              </a:r>
-            </a:p>
-            <a:p>
-              <a:pPr>
-                <a:spcAft>
-                  <a:spcPts val="1100"/>
-                </a:spcAft>
-              </a:pPr>
-              <a:r>
-                <a:rPr lang="en-US" sz="1400" b="1" dirty="0"/>
-                <a:t>UKGTS</a:t>
-              </a:r>
-            </a:p>
-          </p:txBody>
-        </p:sp>
-        <p:sp>
-          <p:nvSpPr>
-            <p:cNvPr id="100" name="TextBox 99">
-              <a:extLst>
-                <a:ext uri="{FF2B5EF4-FFF2-40B4-BE49-F238E27FC236}">
-                  <a16:creationId xmlns:a16="http://schemas.microsoft.com/office/drawing/2014/main" id="{EAD8081A-6C91-42D7-AAC1-FEDD21D02A3C}"/>
-                </a:ext>
-              </a:extLst>
-            </p:cNvPr>
-            <p:cNvSpPr txBox="1"/>
-            <p:nvPr/>
-          </p:nvSpPr>
-          <p:spPr>
-            <a:xfrm>
-              <a:off x="102789" y="3096980"/>
-              <a:ext cx="994491" cy="338554"/>
-            </a:xfrm>
-            <a:prstGeom prst="rect">
-              <a:avLst/>
-            </a:prstGeom>
-            <a:noFill/>
-          </p:spPr>
-          <p:txBody>
-            <a:bodyPr wrap="square" rtlCol="0">
-              <a:spAutoFit/>
-            </a:bodyPr>
-            <a:lstStyle/>
-            <a:p>
-              <a:pPr>
-                <a:spcAft>
-                  <a:spcPts val="1100"/>
-                </a:spcAft>
-              </a:pPr>
-              <a:r>
-                <a:rPr lang="en-US" sz="1600" b="1" dirty="0"/>
-                <a:t>Legend</a:t>
-              </a:r>
-              <a:endParaRPr lang="en-US" sz="1600" b="1" dirty="0">
-                <a:solidFill>
-                  <a:schemeClr val="tx1"/>
-                </a:solidFill>
-              </a:endParaRPr>
-            </a:p>
-          </p:txBody>
-        </p:sp>
-      </p:grpSp>
       <p:pic>
         <p:nvPicPr>
           <p:cNvPr id="3" name="Picture 2" descr="A close up of a map&#10;&#10;Description automatically generated">
@@ -10853,28 +10517,509 @@
           </p:cNvPicPr>
           <p:nvPr/>
         </p:nvPicPr>
-        <p:blipFill>
-          <a:blip r:embed="rId4">
+        <p:blipFill rotWithShape="1">
+          <a:blip r:embed="rId3">
             <a:extLst>
               <a:ext uri="{28A0092B-C50C-407E-A947-70E740481C1C}">
                 <a14:useLocalDpi xmlns:a14="http://schemas.microsoft.com/office/drawing/2010/main" val="0"/>
               </a:ext>
             </a:extLst>
           </a:blip>
-          <a:stretch>
-            <a:fillRect/>
-          </a:stretch>
+          <a:srcRect r="16196"/>
+          <a:stretch/>
         </p:blipFill>
         <p:spPr>
           <a:xfrm>
-            <a:off x="756492" y="1366549"/>
-            <a:ext cx="10679015" cy="4124901"/>
+            <a:off x="1489917" y="1366549"/>
+            <a:ext cx="8949483" cy="4124901"/>
           </a:xfrm>
           <a:prstGeom prst="rect">
             <a:avLst/>
           </a:prstGeom>
         </p:spPr>
       </p:pic>
+      <p:grpSp>
+        <p:nvGrpSpPr>
+          <p:cNvPr id="11" name="Group 10">
+            <a:extLst>
+              <a:ext uri="{FF2B5EF4-FFF2-40B4-BE49-F238E27FC236}">
+                <a16:creationId xmlns:a16="http://schemas.microsoft.com/office/drawing/2014/main" id="{C5BC2216-A51C-405E-8D75-59D129D01C6B}"/>
+              </a:ext>
+            </a:extLst>
+          </p:cNvPr>
+          <p:cNvGrpSpPr/>
+          <p:nvPr/>
+        </p:nvGrpSpPr>
+        <p:grpSpPr>
+          <a:xfrm>
+            <a:off x="10508306" y="1898323"/>
+            <a:ext cx="1198936" cy="2064685"/>
+            <a:chOff x="10702963" y="2935785"/>
+            <a:chExt cx="1198936" cy="2064685"/>
+          </a:xfrm>
+        </p:grpSpPr>
+        <p:grpSp>
+          <p:nvGrpSpPr>
+            <p:cNvPr id="12" name="Group 11">
+              <a:extLst>
+                <a:ext uri="{FF2B5EF4-FFF2-40B4-BE49-F238E27FC236}">
+                  <a16:creationId xmlns:a16="http://schemas.microsoft.com/office/drawing/2014/main" id="{BB24C26E-E363-44DD-B918-E37C50886E11}"/>
+                </a:ext>
+              </a:extLst>
+            </p:cNvPr>
+            <p:cNvGrpSpPr/>
+            <p:nvPr/>
+          </p:nvGrpSpPr>
+          <p:grpSpPr>
+            <a:xfrm>
+              <a:off x="10702963" y="2935785"/>
+              <a:ext cx="1198936" cy="2064685"/>
+              <a:chOff x="102789" y="3096980"/>
+              <a:chExt cx="1198936" cy="2064685"/>
+            </a:xfrm>
+          </p:grpSpPr>
+          <p:grpSp>
+            <p:nvGrpSpPr>
+              <p:cNvPr id="14" name="Group 13">
+                <a:extLst>
+                  <a:ext uri="{FF2B5EF4-FFF2-40B4-BE49-F238E27FC236}">
+                    <a16:creationId xmlns:a16="http://schemas.microsoft.com/office/drawing/2014/main" id="{F0A4395F-8068-4CC0-81A8-3D811386EFF5}"/>
+                  </a:ext>
+                </a:extLst>
+              </p:cNvPr>
+              <p:cNvGrpSpPr/>
+              <p:nvPr/>
+            </p:nvGrpSpPr>
+            <p:grpSpPr>
+              <a:xfrm>
+                <a:off x="193260" y="3444337"/>
+                <a:ext cx="350327" cy="1350413"/>
+                <a:chOff x="612898" y="1152920"/>
+                <a:chExt cx="395648" cy="1647041"/>
+              </a:xfrm>
+            </p:grpSpPr>
+            <p:sp>
+              <p:nvSpPr>
+                <p:cNvPr id="17" name="Oval 16">
+                  <a:extLst>
+                    <a:ext uri="{FF2B5EF4-FFF2-40B4-BE49-F238E27FC236}">
+                      <a16:creationId xmlns:a16="http://schemas.microsoft.com/office/drawing/2014/main" id="{DCB26487-B032-495C-A744-4E28937EC28F}"/>
+                    </a:ext>
+                  </a:extLst>
+                </p:cNvPr>
+                <p:cNvSpPr/>
+                <p:nvPr/>
+              </p:nvSpPr>
+              <p:spPr>
+                <a:xfrm>
+                  <a:off x="612899" y="1585478"/>
+                  <a:ext cx="395437" cy="375797"/>
+                </a:xfrm>
+                <a:prstGeom prst="ellipse">
+                  <a:avLst/>
+                </a:prstGeom>
+                <a:solidFill>
+                  <a:srgbClr val="00B0F0">
+                    <a:alpha val="30196"/>
+                  </a:srgbClr>
+                </a:solidFill>
+                <a:ln w="19050">
+                  <a:solidFill>
+                    <a:schemeClr val="tx1"/>
+                  </a:solidFill>
+                  <a:prstDash val="sysDash"/>
+                </a:ln>
+              </p:spPr>
+              <p:style>
+                <a:lnRef idx="2">
+                  <a:schemeClr val="accent1">
+                    <a:shade val="50000"/>
+                  </a:schemeClr>
+                </a:lnRef>
+                <a:fillRef idx="1">
+                  <a:schemeClr val="accent1"/>
+                </a:fillRef>
+                <a:effectRef idx="0">
+                  <a:schemeClr val="accent1"/>
+                </a:effectRef>
+                <a:fontRef idx="minor">
+                  <a:schemeClr val="lt1"/>
+                </a:fontRef>
+              </p:style>
+              <p:txBody>
+                <a:bodyPr rtlCol="0" anchor="ctr"/>
+                <a:lstStyle/>
+                <a:p>
+                  <a:pPr algn="ctr"/>
+                  <a:endParaRPr lang="en-US"/>
+                </a:p>
+              </p:txBody>
+            </p:sp>
+            <p:sp>
+              <p:nvSpPr>
+                <p:cNvPr id="18" name="Oval 17">
+                  <a:extLst>
+                    <a:ext uri="{FF2B5EF4-FFF2-40B4-BE49-F238E27FC236}">
+                      <a16:creationId xmlns:a16="http://schemas.microsoft.com/office/drawing/2014/main" id="{BE7B6B33-C23E-4A26-9BC1-53E2F6848703}"/>
+                    </a:ext>
+                  </a:extLst>
+                </p:cNvPr>
+                <p:cNvSpPr/>
+                <p:nvPr/>
+              </p:nvSpPr>
+              <p:spPr>
+                <a:xfrm>
+                  <a:off x="612898" y="1152920"/>
+                  <a:ext cx="395438" cy="375800"/>
+                </a:xfrm>
+                <a:prstGeom prst="ellipse">
+                  <a:avLst/>
+                </a:prstGeom>
+                <a:solidFill>
+                  <a:srgbClr val="FF0000">
+                    <a:alpha val="30196"/>
+                  </a:srgbClr>
+                </a:solidFill>
+                <a:ln w="19050">
+                  <a:solidFill>
+                    <a:schemeClr val="tx1"/>
+                  </a:solidFill>
+                  <a:prstDash val="dash"/>
+                </a:ln>
+              </p:spPr>
+              <p:style>
+                <a:lnRef idx="2">
+                  <a:schemeClr val="accent1">
+                    <a:shade val="50000"/>
+                  </a:schemeClr>
+                </a:lnRef>
+                <a:fillRef idx="1">
+                  <a:schemeClr val="accent1"/>
+                </a:fillRef>
+                <a:effectRef idx="0">
+                  <a:schemeClr val="accent1"/>
+                </a:effectRef>
+                <a:fontRef idx="minor">
+                  <a:schemeClr val="lt1"/>
+                </a:fontRef>
+              </p:style>
+              <p:txBody>
+                <a:bodyPr rtlCol="0" anchor="ctr"/>
+                <a:lstStyle/>
+                <a:p>
+                  <a:pPr algn="ctr"/>
+                  <a:endParaRPr lang="en-US"/>
+                </a:p>
+              </p:txBody>
+            </p:sp>
+            <p:sp>
+              <p:nvSpPr>
+                <p:cNvPr id="19" name="Oval 18">
+                  <a:extLst>
+                    <a:ext uri="{FF2B5EF4-FFF2-40B4-BE49-F238E27FC236}">
+                      <a16:creationId xmlns:a16="http://schemas.microsoft.com/office/drawing/2014/main" id="{9E8099BA-1A3A-495F-B40A-26C0FE35FD45}"/>
+                    </a:ext>
+                  </a:extLst>
+                </p:cNvPr>
+                <p:cNvSpPr/>
+                <p:nvPr/>
+              </p:nvSpPr>
+              <p:spPr>
+                <a:xfrm>
+                  <a:off x="612899" y="2000339"/>
+                  <a:ext cx="395439" cy="375797"/>
+                </a:xfrm>
+                <a:prstGeom prst="ellipse">
+                  <a:avLst/>
+                </a:prstGeom>
+                <a:blipFill dpi="0" rotWithShape="1">
+                  <a:blip r:embed="rId4">
+                    <a:alphaModFix amt="53000"/>
+                  </a:blip>
+                  <a:srcRect/>
+                  <a:tile tx="0" ty="0" sx="100000" sy="100000" flip="none" algn="tl"/>
+                </a:blipFill>
+                <a:ln w="19050">
+                  <a:solidFill>
+                    <a:schemeClr val="tx1"/>
+                  </a:solidFill>
+                </a:ln>
+              </p:spPr>
+              <p:style>
+                <a:lnRef idx="2">
+                  <a:schemeClr val="accent1">
+                    <a:shade val="50000"/>
+                  </a:schemeClr>
+                </a:lnRef>
+                <a:fillRef idx="1">
+                  <a:schemeClr val="accent1"/>
+                </a:fillRef>
+                <a:effectRef idx="0">
+                  <a:schemeClr val="accent1"/>
+                </a:effectRef>
+                <a:fontRef idx="minor">
+                  <a:schemeClr val="lt1"/>
+                </a:fontRef>
+              </p:style>
+              <p:txBody>
+                <a:bodyPr rtlCol="0" anchor="ctr"/>
+                <a:lstStyle/>
+                <a:p>
+                  <a:pPr algn="ctr"/>
+                  <a:endParaRPr lang="en-US"/>
+                </a:p>
+              </p:txBody>
+            </p:sp>
+            <p:sp>
+              <p:nvSpPr>
+                <p:cNvPr id="20" name="Oval 19">
+                  <a:extLst>
+                    <a:ext uri="{FF2B5EF4-FFF2-40B4-BE49-F238E27FC236}">
+                      <a16:creationId xmlns:a16="http://schemas.microsoft.com/office/drawing/2014/main" id="{04E017CC-6643-4058-9B60-B9B5173254B4}"/>
+                    </a:ext>
+                  </a:extLst>
+                </p:cNvPr>
+                <p:cNvSpPr/>
+                <p:nvPr/>
+              </p:nvSpPr>
+              <p:spPr>
+                <a:xfrm>
+                  <a:off x="613107" y="2424163"/>
+                  <a:ext cx="395439" cy="375798"/>
+                </a:xfrm>
+                <a:prstGeom prst="ellipse">
+                  <a:avLst/>
+                </a:prstGeom>
+                <a:solidFill>
+                  <a:srgbClr val="FFFF00">
+                    <a:alpha val="30196"/>
+                  </a:srgbClr>
+                </a:solidFill>
+                <a:ln w="19050">
+                  <a:solidFill>
+                    <a:schemeClr val="tx1"/>
+                  </a:solidFill>
+                  <a:prstDash val="sysDot"/>
+                </a:ln>
+              </p:spPr>
+              <p:style>
+                <a:lnRef idx="2">
+                  <a:schemeClr val="accent1">
+                    <a:shade val="50000"/>
+                  </a:schemeClr>
+                </a:lnRef>
+                <a:fillRef idx="1">
+                  <a:schemeClr val="accent1"/>
+                </a:fillRef>
+                <a:effectRef idx="0">
+                  <a:schemeClr val="accent1"/>
+                </a:effectRef>
+                <a:fontRef idx="minor">
+                  <a:schemeClr val="lt1"/>
+                </a:fontRef>
+              </p:style>
+              <p:txBody>
+                <a:bodyPr rtlCol="0" anchor="ctr"/>
+                <a:lstStyle/>
+                <a:p>
+                  <a:pPr algn="ctr"/>
+                  <a:endParaRPr lang="en-US" dirty="0">
+                    <a:solidFill>
+                      <a:schemeClr val="tx1"/>
+                    </a:solidFill>
+                  </a:endParaRPr>
+                </a:p>
+              </p:txBody>
+            </p:sp>
+          </p:grpSp>
+          <p:sp>
+            <p:nvSpPr>
+              <p:cNvPr id="15" name="TextBox 14">
+                <a:extLst>
+                  <a:ext uri="{FF2B5EF4-FFF2-40B4-BE49-F238E27FC236}">
+                    <a16:creationId xmlns:a16="http://schemas.microsoft.com/office/drawing/2014/main" id="{F6C8BFF6-672F-4EB3-892D-6D1BAB2C9816}"/>
+                  </a:ext>
+                </a:extLst>
+              </p:cNvPr>
+              <p:cNvSpPr txBox="1"/>
+              <p:nvPr/>
+            </p:nvSpPr>
+            <p:spPr>
+              <a:xfrm>
+                <a:off x="545080" y="3427857"/>
+                <a:ext cx="756645" cy="1733808"/>
+              </a:xfrm>
+              <a:prstGeom prst="rect">
+                <a:avLst/>
+              </a:prstGeom>
+              <a:noFill/>
+            </p:spPr>
+            <p:txBody>
+              <a:bodyPr wrap="square" rtlCol="0">
+                <a:spAutoFit/>
+              </a:bodyPr>
+              <a:lstStyle/>
+              <a:p>
+                <a:pPr>
+                  <a:spcAft>
+                    <a:spcPts val="1100"/>
+                  </a:spcAft>
+                </a:pPr>
+                <a:r>
+                  <a:rPr lang="en-US" sz="1400" b="1" dirty="0"/>
+                  <a:t>HAP2</a:t>
+                </a:r>
+              </a:p>
+              <a:p>
+                <a:pPr>
+                  <a:spcAft>
+                    <a:spcPts val="1100"/>
+                  </a:spcAft>
+                </a:pPr>
+                <a:r>
+                  <a:rPr lang="en-US" sz="1400" b="1" dirty="0"/>
+                  <a:t>UKGTS</a:t>
+                </a:r>
+              </a:p>
+              <a:p>
+                <a:pPr>
+                  <a:spcAft>
+                    <a:spcPts val="1100"/>
+                  </a:spcAft>
+                </a:pPr>
+                <a:r>
+                  <a:rPr lang="en-US" sz="1400" b="1" dirty="0"/>
+                  <a:t>GHT</a:t>
+                </a:r>
+              </a:p>
+              <a:p>
+                <a:pPr>
+                  <a:spcAft>
+                    <a:spcPts val="1100"/>
+                  </a:spcAft>
+                </a:pPr>
+                <a:r>
+                  <a:rPr lang="en-US" sz="1400" b="1" dirty="0"/>
+                  <a:t>Foster</a:t>
+                </a:r>
+              </a:p>
+              <a:p>
+                <a:pPr>
+                  <a:spcAft>
+                    <a:spcPts val="1100"/>
+                  </a:spcAft>
+                </a:pPr>
+                <a:r>
+                  <a:rPr lang="en-US" sz="1400" b="1" dirty="0"/>
+                  <a:t>LoGTS</a:t>
+                </a:r>
+              </a:p>
+            </p:txBody>
+          </p:sp>
+          <p:sp>
+            <p:nvSpPr>
+              <p:cNvPr id="16" name="TextBox 15">
+                <a:extLst>
+                  <a:ext uri="{FF2B5EF4-FFF2-40B4-BE49-F238E27FC236}">
+                    <a16:creationId xmlns:a16="http://schemas.microsoft.com/office/drawing/2014/main" id="{13D7A135-222C-485E-A122-6EB855726031}"/>
+                  </a:ext>
+                </a:extLst>
+              </p:cNvPr>
+              <p:cNvSpPr txBox="1"/>
+              <p:nvPr/>
+            </p:nvSpPr>
+            <p:spPr>
+              <a:xfrm>
+                <a:off x="102789" y="3096980"/>
+                <a:ext cx="994491" cy="338554"/>
+              </a:xfrm>
+              <a:prstGeom prst="rect">
+                <a:avLst/>
+              </a:prstGeom>
+              <a:noFill/>
+            </p:spPr>
+            <p:txBody>
+              <a:bodyPr wrap="square" rtlCol="0">
+                <a:spAutoFit/>
+              </a:bodyPr>
+              <a:lstStyle/>
+              <a:p>
+                <a:pPr>
+                  <a:spcAft>
+                    <a:spcPts val="1100"/>
+                  </a:spcAft>
+                </a:pPr>
+                <a:r>
+                  <a:rPr lang="en-US" sz="1600" b="1" dirty="0"/>
+                  <a:t>Legend</a:t>
+                </a:r>
+                <a:endParaRPr lang="en-US" sz="1600" b="1" dirty="0">
+                  <a:solidFill>
+                    <a:schemeClr val="tx1"/>
+                  </a:solidFill>
+                </a:endParaRPr>
+              </a:p>
+            </p:txBody>
+          </p:sp>
+        </p:grpSp>
+        <p:sp>
+          <p:nvSpPr>
+            <p:cNvPr id="13" name="Oval 12">
+              <a:extLst>
+                <a:ext uri="{FF2B5EF4-FFF2-40B4-BE49-F238E27FC236}">
+                  <a16:creationId xmlns:a16="http://schemas.microsoft.com/office/drawing/2014/main" id="{E040941C-E158-438F-B6E5-6E4572B39836}"/>
+                </a:ext>
+              </a:extLst>
+            </p:cNvPr>
+            <p:cNvSpPr/>
+            <p:nvPr/>
+          </p:nvSpPr>
+          <p:spPr>
+            <a:xfrm>
+              <a:off x="10793434" y="4682948"/>
+              <a:ext cx="350140" cy="308116"/>
+            </a:xfrm>
+            <a:prstGeom prst="ellipse">
+              <a:avLst/>
+            </a:prstGeom>
+            <a:solidFill>
+              <a:schemeClr val="bg1">
+                <a:alpha val="30196"/>
+              </a:schemeClr>
+            </a:solidFill>
+            <a:ln w="19050">
+              <a:solidFill>
+                <a:schemeClr val="tx1"/>
+              </a:solidFill>
+              <a:prstDash val="dashDot"/>
+            </a:ln>
+          </p:spPr>
+          <p:style>
+            <a:lnRef idx="2">
+              <a:schemeClr val="accent1">
+                <a:shade val="50000"/>
+              </a:schemeClr>
+            </a:lnRef>
+            <a:fillRef idx="1">
+              <a:schemeClr val="accent1"/>
+            </a:fillRef>
+            <a:effectRef idx="0">
+              <a:schemeClr val="accent1"/>
+            </a:effectRef>
+            <a:fontRef idx="minor">
+              <a:schemeClr val="lt1"/>
+            </a:fontRef>
+          </p:style>
+          <p:txBody>
+            <a:bodyPr rtlCol="0" anchor="ctr"/>
+            <a:lstStyle/>
+            <a:p>
+              <a:pPr algn="ctr"/>
+              <a:endParaRPr lang="en-US"/>
+            </a:p>
+          </p:txBody>
+        </p:sp>
+      </p:grpSp>
     </p:spTree>
     <p:extLst>
       <p:ext uri="{BB962C8B-B14F-4D97-AF65-F5344CB8AC3E}">

</xml_diff>